<commit_message>
updated documentation and ppt
</commit_message>
<xml_diff>
--- a/Dokumentáció/ParKing-prezentacio.pptx
+++ b/Dokumentáció/ParKing-prezentacio.pptx
@@ -5,29 +5,17 @@
     <p:sldMasterId id="2147483648" r:id="rId1"/>
   </p:sldMasterIdLst>
   <p:notesMasterIdLst>
-    <p:notesMasterId r:id="rId22"/>
+    <p:notesMasterId r:id="rId10"/>
   </p:notesMasterIdLst>
   <p:sldIdLst>
     <p:sldId id="256" r:id="rId2"/>
     <p:sldId id="257" r:id="rId3"/>
     <p:sldId id="258" r:id="rId4"/>
     <p:sldId id="260" r:id="rId5"/>
-    <p:sldId id="263" r:id="rId6"/>
-    <p:sldId id="274" r:id="rId7"/>
-    <p:sldId id="270" r:id="rId8"/>
-    <p:sldId id="271" r:id="rId9"/>
-    <p:sldId id="272" r:id="rId10"/>
-    <p:sldId id="273" r:id="rId11"/>
-    <p:sldId id="264" r:id="rId12"/>
-    <p:sldId id="275" r:id="rId13"/>
-    <p:sldId id="261" r:id="rId14"/>
-    <p:sldId id="262" r:id="rId15"/>
-    <p:sldId id="266" r:id="rId16"/>
-    <p:sldId id="265" r:id="rId17"/>
-    <p:sldId id="267" r:id="rId18"/>
-    <p:sldId id="268" r:id="rId19"/>
-    <p:sldId id="277" r:id="rId20"/>
-    <p:sldId id="276" r:id="rId21"/>
+    <p:sldId id="267" r:id="rId6"/>
+    <p:sldId id="268" r:id="rId7"/>
+    <p:sldId id="277" r:id="rId8"/>
+    <p:sldId id="276" r:id="rId9"/>
   </p:sldIdLst>
   <p:sldSz cx="12192000" cy="6858000"/>
   <p:notesSz cx="6858000" cy="9144000"/>
@@ -216,7 +204,7 @@
           <a:p>
             <a:fld id="{D7E43DA3-60A0-49BF-B20C-62E8BF76FF0C}" type="datetimeFigureOut">
               <a:rPr lang="hu-HU" smtClean="0"/>
-              <a:t>2026.01.23.</a:t>
+              <a:t>2026.01.26.</a:t>
             </a:fld>
             <a:endParaRPr lang="hu-HU"/>
           </a:p>
@@ -720,7 +708,7 @@
           <a:p>
             <a:fld id="{837BE7DF-DD35-4B2A-8B1D-D401538C2D35}" type="datetimeFigureOut">
               <a:rPr lang="hu-HU" smtClean="0"/>
-              <a:t>2026.01.23.</a:t>
+              <a:t>2026.01.26.</a:t>
             </a:fld>
             <a:endParaRPr lang="hu-HU"/>
           </a:p>
@@ -918,7 +906,7 @@
           <a:p>
             <a:fld id="{837BE7DF-DD35-4B2A-8B1D-D401538C2D35}" type="datetimeFigureOut">
               <a:rPr lang="hu-HU" smtClean="0"/>
-              <a:t>2026.01.23.</a:t>
+              <a:t>2026.01.26.</a:t>
             </a:fld>
             <a:endParaRPr lang="hu-HU"/>
           </a:p>
@@ -1126,7 +1114,7 @@
           <a:p>
             <a:fld id="{837BE7DF-DD35-4B2A-8B1D-D401538C2D35}" type="datetimeFigureOut">
               <a:rPr lang="hu-HU" smtClean="0"/>
-              <a:t>2026.01.23.</a:t>
+              <a:t>2026.01.26.</a:t>
             </a:fld>
             <a:endParaRPr lang="hu-HU"/>
           </a:p>
@@ -1362,7 +1350,7 @@
           <a:p>
             <a:fld id="{837BE7DF-DD35-4B2A-8B1D-D401538C2D35}" type="datetimeFigureOut">
               <a:rPr lang="hu-HU" smtClean="0"/>
-              <a:t>2026.01.23.</a:t>
+              <a:t>2026.01.26.</a:t>
             </a:fld>
             <a:endParaRPr lang="hu-HU"/>
           </a:p>
@@ -1637,7 +1625,7 @@
           <a:p>
             <a:fld id="{837BE7DF-DD35-4B2A-8B1D-D401538C2D35}" type="datetimeFigureOut">
               <a:rPr lang="hu-HU" smtClean="0"/>
-              <a:t>2026.01.23.</a:t>
+              <a:t>2026.01.26.</a:t>
             </a:fld>
             <a:endParaRPr lang="hu-HU"/>
           </a:p>
@@ -1971,7 +1959,7 @@
           <a:p>
             <a:fld id="{837BE7DF-DD35-4B2A-8B1D-D401538C2D35}" type="datetimeFigureOut">
               <a:rPr lang="hu-HU" smtClean="0"/>
-              <a:t>2026.01.23.</a:t>
+              <a:t>2026.01.26.</a:t>
             </a:fld>
             <a:endParaRPr lang="hu-HU"/>
           </a:p>
@@ -2383,7 +2371,7 @@
           <a:p>
             <a:fld id="{837BE7DF-DD35-4B2A-8B1D-D401538C2D35}" type="datetimeFigureOut">
               <a:rPr lang="hu-HU" smtClean="0"/>
-              <a:t>2026.01.23.</a:t>
+              <a:t>2026.01.26.</a:t>
             </a:fld>
             <a:endParaRPr lang="hu-HU"/>
           </a:p>
@@ -2524,7 +2512,7 @@
           <a:p>
             <a:fld id="{837BE7DF-DD35-4B2A-8B1D-D401538C2D35}" type="datetimeFigureOut">
               <a:rPr lang="hu-HU" smtClean="0"/>
-              <a:t>2026.01.23.</a:t>
+              <a:t>2026.01.26.</a:t>
             </a:fld>
             <a:endParaRPr lang="hu-HU"/>
           </a:p>
@@ -2637,7 +2625,7 @@
           <a:p>
             <a:fld id="{837BE7DF-DD35-4B2A-8B1D-D401538C2D35}" type="datetimeFigureOut">
               <a:rPr lang="hu-HU" smtClean="0"/>
-              <a:t>2026.01.23.</a:t>
+              <a:t>2026.01.26.</a:t>
             </a:fld>
             <a:endParaRPr lang="hu-HU"/>
           </a:p>
@@ -2948,7 +2936,7 @@
           <a:p>
             <a:fld id="{837BE7DF-DD35-4B2A-8B1D-D401538C2D35}" type="datetimeFigureOut">
               <a:rPr lang="hu-HU" smtClean="0"/>
-              <a:t>2026.01.23.</a:t>
+              <a:t>2026.01.26.</a:t>
             </a:fld>
             <a:endParaRPr lang="hu-HU"/>
           </a:p>
@@ -3236,7 +3224,7 @@
           <a:p>
             <a:fld id="{837BE7DF-DD35-4B2A-8B1D-D401538C2D35}" type="datetimeFigureOut">
               <a:rPr lang="hu-HU" smtClean="0"/>
-              <a:t>2026.01.23.</a:t>
+              <a:t>2026.01.26.</a:t>
             </a:fld>
             <a:endParaRPr lang="hu-HU"/>
           </a:p>
@@ -3477,7 +3465,7 @@
           <a:p>
             <a:fld id="{837BE7DF-DD35-4B2A-8B1D-D401538C2D35}" type="datetimeFigureOut">
               <a:rPr lang="hu-HU" smtClean="0"/>
-              <a:t>2026.01.23.</a:t>
+              <a:t>2026.01.26.</a:t>
             </a:fld>
             <a:endParaRPr lang="hu-HU"/>
           </a:p>
@@ -4035,2583 +4023,6 @@
 </p:sld>
 </file>
 
-<file path=ppt/slides/slide10.xml><?xml version="1.0" encoding="utf-8"?>
-<p:sld xmlns:a="http://schemas.openxmlformats.org/drawingml/2006/main" xmlns:r="http://schemas.openxmlformats.org/officeDocument/2006/relationships" xmlns:p="http://schemas.openxmlformats.org/presentationml/2006/main">
-  <p:cSld>
-    <p:spTree>
-      <p:nvGrpSpPr>
-        <p:cNvPr id="1" name=""/>
-        <p:cNvGrpSpPr/>
-        <p:nvPr/>
-      </p:nvGrpSpPr>
-      <p:grpSpPr>
-        <a:xfrm>
-          <a:off x="0" y="0"/>
-          <a:ext cx="0" cy="0"/>
-          <a:chOff x="0" y="0"/>
-          <a:chExt cx="0" cy="0"/>
-        </a:xfrm>
-      </p:grpSpPr>
-      <p:sp>
-        <p:nvSpPr>
-          <p:cNvPr id="2" name="Cím 1">
-            <a:extLst>
-              <a:ext uri="{FF2B5EF4-FFF2-40B4-BE49-F238E27FC236}">
-                <a16:creationId xmlns:a16="http://schemas.microsoft.com/office/drawing/2014/main" id="{202E5C4D-4ADC-4CA2-A9A1-1A67E7F53CBB}"/>
-              </a:ext>
-            </a:extLst>
-          </p:cNvPr>
-          <p:cNvSpPr>
-            <a:spLocks noGrp="1"/>
-          </p:cNvSpPr>
-          <p:nvPr>
-            <p:ph type="title"/>
-          </p:nvPr>
-        </p:nvSpPr>
-        <p:spPr/>
-        <p:txBody>
-          <a:bodyPr/>
-          <a:lstStyle/>
-          <a:p>
-            <a:pPr algn="ctr"/>
-            <a:r>
-              <a:rPr lang="hu-HU" b="1" dirty="0"/>
-              <a:t>SQL</a:t>
-            </a:r>
-          </a:p>
-        </p:txBody>
-      </p:sp>
-      <p:sp>
-        <p:nvSpPr>
-          <p:cNvPr id="3" name="Tartalom helye 2">
-            <a:extLst>
-              <a:ext uri="{FF2B5EF4-FFF2-40B4-BE49-F238E27FC236}">
-                <a16:creationId xmlns:a16="http://schemas.microsoft.com/office/drawing/2014/main" id="{4A264D85-B5DD-40ED-90A9-BDFD310B40FB}"/>
-              </a:ext>
-            </a:extLst>
-          </p:cNvPr>
-          <p:cNvSpPr>
-            <a:spLocks noGrp="1"/>
-          </p:cNvSpPr>
-          <p:nvPr>
-            <p:ph sz="half" idx="1"/>
-          </p:nvPr>
-        </p:nvSpPr>
-        <p:spPr>
-          <a:xfrm>
-            <a:off x="838200" y="1825625"/>
-            <a:ext cx="7269480" cy="4074013"/>
-          </a:xfrm>
-        </p:spPr>
-        <p:txBody>
-          <a:bodyPr>
-            <a:normAutofit fontScale="92500" lnSpcReduction="20000"/>
-          </a:bodyPr>
-          <a:lstStyle/>
-          <a:p>
-            <a:r>
-              <a:rPr lang="hu-HU" b="1" dirty="0"/>
-              <a:t>Structured Query Language</a:t>
-            </a:r>
-          </a:p>
-          <a:p>
-            <a:r>
-              <a:rPr lang="hu-HU" b="1" dirty="0"/>
-              <a:t>Adatbázis-kezelő</a:t>
-            </a:r>
-            <a:r>
-              <a:rPr lang="hu-HU" dirty="0"/>
-              <a:t> nyelv</a:t>
-            </a:r>
-          </a:p>
-          <a:p>
-            <a:r>
-              <a:rPr lang="hu-HU" dirty="0"/>
-              <a:t>Adatokat lehet </a:t>
-            </a:r>
-            <a:r>
-              <a:rPr lang="hu-HU" b="1" dirty="0"/>
-              <a:t>lekérdezni</a:t>
-            </a:r>
-            <a:r>
-              <a:rPr lang="hu-HU" dirty="0"/>
-              <a:t>, </a:t>
-            </a:r>
-            <a:r>
-              <a:rPr lang="hu-HU" b="1" dirty="0"/>
-              <a:t>módosítani</a:t>
-            </a:r>
-            <a:r>
-              <a:rPr lang="hu-HU" dirty="0"/>
-              <a:t> és </a:t>
-            </a:r>
-            <a:r>
-              <a:rPr lang="hu-HU" b="1" dirty="0"/>
-              <a:t>kezelni</a:t>
-            </a:r>
-            <a:r>
-              <a:rPr lang="hu-HU" dirty="0"/>
-              <a:t> pl.: Felhasználó adatainak tárolása (név, email, jelszó)</a:t>
-            </a:r>
-          </a:p>
-          <a:p>
-            <a:r>
-              <a:rPr lang="hu-HU" dirty="0"/>
-              <a:t>Használható:</a:t>
-            </a:r>
-          </a:p>
-          <a:p>
-            <a:pPr lvl="1"/>
-            <a:r>
-              <a:rPr lang="hu-HU" dirty="0"/>
-              <a:t>Weboldalak </a:t>
-            </a:r>
-            <a:r>
-              <a:rPr lang="hu-HU" b="1" dirty="0"/>
-              <a:t>backend</a:t>
-            </a:r>
-            <a:r>
-              <a:rPr lang="hu-HU" dirty="0"/>
-              <a:t> részében</a:t>
-            </a:r>
-          </a:p>
-          <a:p>
-            <a:pPr lvl="1"/>
-            <a:r>
-              <a:rPr lang="hu-HU" dirty="0"/>
-              <a:t>Alkalmazások </a:t>
-            </a:r>
-            <a:r>
-              <a:rPr lang="hu-HU" b="1" dirty="0"/>
-              <a:t>adatkezelés</a:t>
-            </a:r>
-            <a:r>
-              <a:rPr lang="hu-HU" dirty="0"/>
-              <a:t>éhez </a:t>
-            </a:r>
-          </a:p>
-          <a:p>
-            <a:r>
-              <a:rPr lang="hu-HU" dirty="0"/>
-              <a:t>Gyakori alkalmazások:</a:t>
-            </a:r>
-          </a:p>
-          <a:p>
-            <a:pPr lvl="1"/>
-            <a:r>
-              <a:rPr lang="hu-HU" b="1" dirty="0"/>
-              <a:t>MySQL</a:t>
-            </a:r>
-          </a:p>
-          <a:p>
-            <a:pPr lvl="1"/>
-            <a:r>
-              <a:rPr lang="hu-HU" b="1" dirty="0"/>
-              <a:t>PostgreSQL</a:t>
-            </a:r>
-          </a:p>
-          <a:p>
-            <a:pPr lvl="1"/>
-            <a:r>
-              <a:rPr lang="hu-HU" b="1" dirty="0"/>
-              <a:t>SQLite</a:t>
-            </a:r>
-          </a:p>
-          <a:p>
-            <a:pPr lvl="1"/>
-            <a:endParaRPr lang="hu-HU" dirty="0"/>
-          </a:p>
-          <a:p>
-            <a:pPr lvl="1"/>
-            <a:endParaRPr lang="hu-HU" dirty="0"/>
-          </a:p>
-        </p:txBody>
-      </p:sp>
-      <p:pic>
-        <p:nvPicPr>
-          <p:cNvPr id="4098" name="Picture 2" descr="The Best Way to Learn SQL - Learn to code in 30 Days!">
-            <a:extLst>
-              <a:ext uri="{FF2B5EF4-FFF2-40B4-BE49-F238E27FC236}">
-                <a16:creationId xmlns:a16="http://schemas.microsoft.com/office/drawing/2014/main" id="{10528509-BE40-480F-BB3E-17AF99A56563}"/>
-              </a:ext>
-            </a:extLst>
-          </p:cNvPr>
-          <p:cNvPicPr>
-            <a:picLocks noGrp="1" noChangeAspect="1" noChangeArrowheads="1"/>
-          </p:cNvPicPr>
-          <p:nvPr>
-            <p:ph sz="half" idx="2"/>
-          </p:nvPr>
-        </p:nvPicPr>
-        <p:blipFill>
-          <a:blip r:embed="rId2">
-            <a:extLst>
-              <a:ext uri="{28A0092B-C50C-407E-A947-70E740481C1C}">
-                <a14:useLocalDpi xmlns:a14="http://schemas.microsoft.com/office/drawing/2010/main" val="0"/>
-              </a:ext>
-            </a:extLst>
-          </a:blip>
-          <a:srcRect/>
-          <a:stretch>
-            <a:fillRect/>
-          </a:stretch>
-        </p:blipFill>
-        <p:spPr bwMode="auto">
-          <a:xfrm>
-            <a:off x="7080069" y="2867547"/>
-            <a:ext cx="5181600" cy="2720340"/>
-          </a:xfrm>
-          <a:prstGeom prst="rect">
-            <a:avLst/>
-          </a:prstGeom>
-          <a:noFill/>
-          <a:extLst>
-            <a:ext uri="{909E8E84-426E-40DD-AFC4-6F175D3DCCD1}">
-              <a14:hiddenFill xmlns:a14="http://schemas.microsoft.com/office/drawing/2010/main">
-                <a:solidFill>
-                  <a:srgbClr val="FFFFFF"/>
-                </a:solidFill>
-              </a14:hiddenFill>
-            </a:ext>
-          </a:extLst>
-        </p:spPr>
-      </p:pic>
-    </p:spTree>
-    <p:extLst>
-      <p:ext uri="{BB962C8B-B14F-4D97-AF65-F5344CB8AC3E}">
-        <p14:creationId xmlns:p14="http://schemas.microsoft.com/office/powerpoint/2010/main" val="3269916879"/>
-      </p:ext>
-    </p:extLst>
-  </p:cSld>
-  <p:clrMapOvr>
-    <a:masterClrMapping/>
-  </p:clrMapOvr>
-</p:sld>
-</file>
-
-<file path=ppt/slides/slide11.xml><?xml version="1.0" encoding="utf-8"?>
-<p:sld xmlns:a="http://schemas.openxmlformats.org/drawingml/2006/main" xmlns:r="http://schemas.openxmlformats.org/officeDocument/2006/relationships" xmlns:p="http://schemas.openxmlformats.org/presentationml/2006/main">
-  <p:cSld>
-    <p:spTree>
-      <p:nvGrpSpPr>
-        <p:cNvPr id="1" name=""/>
-        <p:cNvGrpSpPr/>
-        <p:nvPr/>
-      </p:nvGrpSpPr>
-      <p:grpSpPr>
-        <a:xfrm>
-          <a:off x="0" y="0"/>
-          <a:ext cx="0" cy="0"/>
-          <a:chOff x="0" y="0"/>
-          <a:chExt cx="0" cy="0"/>
-        </a:xfrm>
-      </p:grpSpPr>
-      <p:sp>
-        <p:nvSpPr>
-          <p:cNvPr id="2" name="Cím 1">
-            <a:extLst>
-              <a:ext uri="{FF2B5EF4-FFF2-40B4-BE49-F238E27FC236}">
-                <a16:creationId xmlns:a16="http://schemas.microsoft.com/office/drawing/2014/main" id="{19DDA91B-E3C5-4F19-9176-E32111030AF2}"/>
-              </a:ext>
-            </a:extLst>
-          </p:cNvPr>
-          <p:cNvSpPr>
-            <a:spLocks noGrp="1"/>
-          </p:cNvSpPr>
-          <p:nvPr>
-            <p:ph type="title"/>
-          </p:nvPr>
-        </p:nvSpPr>
-        <p:spPr/>
-        <p:txBody>
-          <a:bodyPr/>
-          <a:lstStyle/>
-          <a:p>
-            <a:pPr algn="ctr"/>
-            <a:r>
-              <a:rPr lang="hu-HU" b="1" dirty="0"/>
-              <a:t>EJS</a:t>
-            </a:r>
-          </a:p>
-        </p:txBody>
-      </p:sp>
-      <p:sp>
-        <p:nvSpPr>
-          <p:cNvPr id="3" name="Tartalom helye 2">
-            <a:extLst>
-              <a:ext uri="{FF2B5EF4-FFF2-40B4-BE49-F238E27FC236}">
-                <a16:creationId xmlns:a16="http://schemas.microsoft.com/office/drawing/2014/main" id="{2438B136-DE12-407E-AB47-50C57564E675}"/>
-              </a:ext>
-            </a:extLst>
-          </p:cNvPr>
-          <p:cNvSpPr>
-            <a:spLocks noGrp="1"/>
-          </p:cNvSpPr>
-          <p:nvPr>
-            <p:ph sz="half" idx="1"/>
-          </p:nvPr>
-        </p:nvSpPr>
-        <p:spPr>
-          <a:xfrm>
-            <a:off x="838199" y="1825625"/>
-            <a:ext cx="6250578" cy="4351338"/>
-          </a:xfrm>
-        </p:spPr>
-        <p:txBody>
-          <a:bodyPr>
-            <a:normAutofit/>
-          </a:bodyPr>
-          <a:lstStyle/>
-          <a:p>
-            <a:r>
-              <a:rPr lang="hu-HU" dirty="0"/>
-              <a:t>Könnyen használható, szerveroldali sablonmotor</a:t>
-            </a:r>
-            <a:endParaRPr lang="hu-HU" b="1" dirty="0"/>
-          </a:p>
-          <a:p>
-            <a:r>
-              <a:rPr lang="hu-HU" b="1" dirty="0"/>
-              <a:t>Embedded JavaScript Templates</a:t>
-            </a:r>
-          </a:p>
-          <a:p>
-            <a:r>
-              <a:rPr lang="hu-HU" dirty="0"/>
-              <a:t>Lehetővé teszi </a:t>
-            </a:r>
-            <a:r>
-              <a:rPr lang="hu-HU" b="1" dirty="0"/>
-              <a:t>dinamikus</a:t>
-            </a:r>
-            <a:r>
-              <a:rPr lang="hu-HU" dirty="0"/>
-              <a:t> </a:t>
-            </a:r>
-            <a:r>
-              <a:rPr lang="hu-HU" b="1" dirty="0"/>
-              <a:t>HTML</a:t>
-            </a:r>
-            <a:r>
-              <a:rPr lang="hu-HU" dirty="0"/>
-              <a:t> oldalak generálását </a:t>
-            </a:r>
-            <a:r>
-              <a:rPr lang="hu-HU" b="1" dirty="0"/>
-              <a:t>JavaScript</a:t>
-            </a:r>
-            <a:r>
-              <a:rPr lang="hu-HU" dirty="0"/>
-              <a:t> használatával​</a:t>
-            </a:r>
-          </a:p>
-          <a:p>
-            <a:r>
-              <a:rPr lang="hu-HU" dirty="0"/>
-              <a:t>A sablonok </a:t>
-            </a:r>
-            <a:r>
-              <a:rPr lang="hu-HU" b="1" dirty="0"/>
-              <a:t>’.ejs’ </a:t>
-            </a:r>
-            <a:r>
-              <a:rPr lang="hu-HU" dirty="0"/>
-              <a:t>kiterjesztést kapnak</a:t>
-            </a:r>
-          </a:p>
-          <a:p>
-            <a:r>
-              <a:rPr lang="hu-HU" b="1" dirty="0"/>
-              <a:t>HTML markup</a:t>
-            </a:r>
-            <a:r>
-              <a:rPr lang="hu-HU" dirty="0"/>
-              <a:t>ot kombinálnak</a:t>
-            </a:r>
-          </a:p>
-          <a:p>
-            <a:r>
-              <a:rPr lang="hu-HU" dirty="0"/>
-              <a:t>Könnyen tanulható</a:t>
-            </a:r>
-          </a:p>
-          <a:p>
-            <a:endParaRPr lang="hu-HU" dirty="0"/>
-          </a:p>
-        </p:txBody>
-      </p:sp>
-      <p:pic>
-        <p:nvPicPr>
-          <p:cNvPr id="6146" name="Picture 2" descr="A képen Betűtípus, Grafika, szimbólum, embléma látható&#10;&#10;Lehet, hogy az AI által létrehozott tartalom helytelen.">
-            <a:extLst>
-              <a:ext uri="{FF2B5EF4-FFF2-40B4-BE49-F238E27FC236}">
-                <a16:creationId xmlns:a16="http://schemas.microsoft.com/office/drawing/2014/main" id="{41BF6FD1-5EFD-44C4-898A-C205033D808D}"/>
-              </a:ext>
-            </a:extLst>
-          </p:cNvPr>
-          <p:cNvPicPr>
-            <a:picLocks noGrp="1" noChangeAspect="1" noChangeArrowheads="1"/>
-          </p:cNvPicPr>
-          <p:nvPr>
-            <p:ph sz="half" idx="2"/>
-          </p:nvPr>
-        </p:nvPicPr>
-        <p:blipFill>
-          <a:blip r:embed="rId2">
-            <a:extLst>
-              <a:ext uri="{28A0092B-C50C-407E-A947-70E740481C1C}">
-                <a14:useLocalDpi xmlns:a14="http://schemas.microsoft.com/office/drawing/2010/main" val="0"/>
-              </a:ext>
-            </a:extLst>
-          </a:blip>
-          <a:srcRect/>
-          <a:stretch>
-            <a:fillRect/>
-          </a:stretch>
-        </p:blipFill>
-        <p:spPr bwMode="auto">
-          <a:xfrm>
-            <a:off x="7864742" y="2662844"/>
-            <a:ext cx="2667372" cy="2676899"/>
-          </a:xfrm>
-          <a:prstGeom prst="rect">
-            <a:avLst/>
-          </a:prstGeom>
-          <a:noFill/>
-          <a:extLst>
-            <a:ext uri="{909E8E84-426E-40DD-AFC4-6F175D3DCCD1}">
-              <a14:hiddenFill xmlns:a14="http://schemas.microsoft.com/office/drawing/2010/main">
-                <a:solidFill>
-                  <a:srgbClr val="FFFFFF"/>
-                </a:solidFill>
-              </a14:hiddenFill>
-            </a:ext>
-          </a:extLst>
-        </p:spPr>
-      </p:pic>
-    </p:spTree>
-    <p:extLst>
-      <p:ext uri="{BB962C8B-B14F-4D97-AF65-F5344CB8AC3E}">
-        <p14:creationId xmlns:p14="http://schemas.microsoft.com/office/powerpoint/2010/main" val="1449760391"/>
-      </p:ext>
-    </p:extLst>
-  </p:cSld>
-  <p:clrMapOvr>
-    <a:masterClrMapping/>
-  </p:clrMapOvr>
-</p:sld>
-</file>
-
-<file path=ppt/slides/slide12.xml><?xml version="1.0" encoding="utf-8"?>
-<p:sld xmlns:a="http://schemas.openxmlformats.org/drawingml/2006/main" xmlns:r="http://schemas.openxmlformats.org/officeDocument/2006/relationships" xmlns:p="http://schemas.openxmlformats.org/presentationml/2006/main">
-  <p:cSld>
-    <p:spTree>
-      <p:nvGrpSpPr>
-        <p:cNvPr id="1" name=""/>
-        <p:cNvGrpSpPr/>
-        <p:nvPr/>
-      </p:nvGrpSpPr>
-      <p:grpSpPr>
-        <a:xfrm>
-          <a:off x="0" y="0"/>
-          <a:ext cx="0" cy="0"/>
-          <a:chOff x="0" y="0"/>
-          <a:chExt cx="0" cy="0"/>
-        </a:xfrm>
-      </p:grpSpPr>
-      <p:sp>
-        <p:nvSpPr>
-          <p:cNvPr id="2" name="Cím 1">
-            <a:extLst>
-              <a:ext uri="{FF2B5EF4-FFF2-40B4-BE49-F238E27FC236}">
-                <a16:creationId xmlns:a16="http://schemas.microsoft.com/office/drawing/2014/main" id="{05FB818A-8187-40E4-A325-968E10318DDA}"/>
-              </a:ext>
-            </a:extLst>
-          </p:cNvPr>
-          <p:cNvSpPr>
-            <a:spLocks noGrp="1"/>
-          </p:cNvSpPr>
-          <p:nvPr>
-            <p:ph type="title"/>
-          </p:nvPr>
-        </p:nvSpPr>
-        <p:spPr/>
-        <p:txBody>
-          <a:bodyPr/>
-          <a:lstStyle/>
-          <a:p>
-            <a:pPr algn="ctr"/>
-            <a:r>
-              <a:rPr lang="hu-HU" b="1" dirty="0"/>
-              <a:t>C#</a:t>
-            </a:r>
-          </a:p>
-        </p:txBody>
-      </p:sp>
-      <p:sp>
-        <p:nvSpPr>
-          <p:cNvPr id="3" name="Tartalom helye 2">
-            <a:extLst>
-              <a:ext uri="{FF2B5EF4-FFF2-40B4-BE49-F238E27FC236}">
-                <a16:creationId xmlns:a16="http://schemas.microsoft.com/office/drawing/2014/main" id="{F44E8C85-258C-4A3B-9F95-8482285C7C18}"/>
-              </a:ext>
-            </a:extLst>
-          </p:cNvPr>
-          <p:cNvSpPr>
-            <a:spLocks noGrp="1"/>
-          </p:cNvSpPr>
-          <p:nvPr>
-            <p:ph sz="half" idx="1"/>
-          </p:nvPr>
-        </p:nvSpPr>
-        <p:spPr>
-          <a:xfrm>
-            <a:off x="838199" y="1825625"/>
-            <a:ext cx="6002216" cy="3854206"/>
-          </a:xfrm>
-        </p:spPr>
-        <p:txBody>
-          <a:bodyPr>
-            <a:normAutofit/>
-          </a:bodyPr>
-          <a:lstStyle/>
-          <a:p>
-            <a:r>
-              <a:rPr lang="hu-HU" b="1" dirty="0"/>
-              <a:t>Objektumorientált </a:t>
-            </a:r>
-            <a:r>
-              <a:rPr lang="hu-HU" dirty="0"/>
-              <a:t>programozási nyelv</a:t>
-            </a:r>
-          </a:p>
-          <a:p>
-            <a:r>
-              <a:rPr lang="hu-HU" b="1" dirty="0"/>
-              <a:t>Asztali alkalmazások </a:t>
-            </a:r>
-            <a:r>
-              <a:rPr lang="hu-HU" dirty="0"/>
-              <a:t>fejlesztése</a:t>
-            </a:r>
-          </a:p>
-          <a:p>
-            <a:r>
-              <a:rPr lang="hu-HU" b="1" dirty="0"/>
-              <a:t>Backend</a:t>
-            </a:r>
-            <a:r>
-              <a:rPr lang="hu-HU" dirty="0"/>
-              <a:t> rendszerek</a:t>
-            </a:r>
-          </a:p>
-          <a:p>
-            <a:r>
-              <a:rPr lang="hu-HU" b="1" dirty="0"/>
-              <a:t>Osztály</a:t>
-            </a:r>
-            <a:r>
-              <a:rPr lang="hu-HU" dirty="0"/>
-              <a:t> (class) – program alapegysége</a:t>
-            </a:r>
-          </a:p>
-          <a:p>
-            <a:r>
-              <a:rPr lang="hu-HU" b="1" dirty="0"/>
-              <a:t>Metódus (method)</a:t>
-            </a:r>
-            <a:r>
-              <a:rPr lang="hu-HU" dirty="0"/>
-              <a:t> – művelet végrehajtása</a:t>
-            </a:r>
-          </a:p>
-          <a:p>
-            <a:r>
-              <a:rPr lang="hu-HU" b="1" dirty="0"/>
-              <a:t>Objektum</a:t>
-            </a:r>
-            <a:r>
-              <a:rPr lang="hu-HU" dirty="0"/>
-              <a:t> – egy osztály példánya</a:t>
-            </a:r>
-          </a:p>
-          <a:p>
-            <a:endParaRPr lang="hu-HU" dirty="0"/>
-          </a:p>
-          <a:p>
-            <a:endParaRPr lang="hu-HU" dirty="0"/>
-          </a:p>
-        </p:txBody>
-      </p:sp>
-      <p:pic>
-        <p:nvPicPr>
-          <p:cNvPr id="2051" name="Picture 3">
-            <a:extLst>
-              <a:ext uri="{FF2B5EF4-FFF2-40B4-BE49-F238E27FC236}">
-                <a16:creationId xmlns:a16="http://schemas.microsoft.com/office/drawing/2014/main" id="{5E40A14A-EAE9-48D9-BDC6-B37E2AC53B9C}"/>
-              </a:ext>
-            </a:extLst>
-          </p:cNvPr>
-          <p:cNvPicPr>
-            <a:picLocks noGrp="1" noChangeAspect="1" noChangeArrowheads="1"/>
-          </p:cNvPicPr>
-          <p:nvPr>
-            <p:ph sz="half" idx="2"/>
-          </p:nvPr>
-        </p:nvPicPr>
-        <p:blipFill>
-          <a:blip r:embed="rId2">
-            <a:extLst>
-              <a:ext uri="{28A0092B-C50C-407E-A947-70E740481C1C}">
-                <a14:useLocalDpi xmlns:a14="http://schemas.microsoft.com/office/drawing/2010/main" val="0"/>
-              </a:ext>
-            </a:extLst>
-          </a:blip>
-          <a:srcRect/>
-          <a:stretch>
-            <a:fillRect/>
-          </a:stretch>
-        </p:blipFill>
-        <p:spPr bwMode="auto">
-          <a:xfrm>
-            <a:off x="7002462" y="1577059"/>
-            <a:ext cx="4351338" cy="4351338"/>
-          </a:xfrm>
-          <a:prstGeom prst="rect">
-            <a:avLst/>
-          </a:prstGeom>
-          <a:noFill/>
-          <a:extLst>
-            <a:ext uri="{909E8E84-426E-40DD-AFC4-6F175D3DCCD1}">
-              <a14:hiddenFill xmlns:a14="http://schemas.microsoft.com/office/drawing/2010/main">
-                <a:solidFill>
-                  <a:srgbClr val="FFFFFF"/>
-                </a:solidFill>
-              </a14:hiddenFill>
-            </a:ext>
-          </a:extLst>
-        </p:spPr>
-      </p:pic>
-    </p:spTree>
-    <p:extLst>
-      <p:ext uri="{BB962C8B-B14F-4D97-AF65-F5344CB8AC3E}">
-        <p14:creationId xmlns:p14="http://schemas.microsoft.com/office/powerpoint/2010/main" val="2791739312"/>
-      </p:ext>
-    </p:extLst>
-  </p:cSld>
-  <p:clrMapOvr>
-    <a:masterClrMapping/>
-  </p:clrMapOvr>
-</p:sld>
-</file>
-
-<file path=ppt/slides/slide13.xml><?xml version="1.0" encoding="utf-8"?>
-<p:sld xmlns:a="http://schemas.openxmlformats.org/drawingml/2006/main" xmlns:r="http://schemas.openxmlformats.org/officeDocument/2006/relationships" xmlns:p="http://schemas.openxmlformats.org/presentationml/2006/main">
-  <p:cSld>
-    <p:spTree>
-      <p:nvGrpSpPr>
-        <p:cNvPr id="1" name=""/>
-        <p:cNvGrpSpPr/>
-        <p:nvPr/>
-      </p:nvGrpSpPr>
-      <p:grpSpPr>
-        <a:xfrm>
-          <a:off x="0" y="0"/>
-          <a:ext cx="0" cy="0"/>
-          <a:chOff x="0" y="0"/>
-          <a:chExt cx="0" cy="0"/>
-        </a:xfrm>
-      </p:grpSpPr>
-      <p:sp>
-        <p:nvSpPr>
-          <p:cNvPr id="2" name="Cím 1">
-            <a:extLst>
-              <a:ext uri="{FF2B5EF4-FFF2-40B4-BE49-F238E27FC236}">
-                <a16:creationId xmlns:a16="http://schemas.microsoft.com/office/drawing/2014/main" id="{FD008545-464B-41ED-9A58-F60D85651E27}"/>
-              </a:ext>
-            </a:extLst>
-          </p:cNvPr>
-          <p:cNvSpPr>
-            <a:spLocks noGrp="1"/>
-          </p:cNvSpPr>
-          <p:nvPr>
-            <p:ph type="title"/>
-          </p:nvPr>
-        </p:nvSpPr>
-        <p:spPr/>
-        <p:txBody>
-          <a:bodyPr/>
-          <a:lstStyle/>
-          <a:p>
-            <a:pPr algn="ctr"/>
-            <a:r>
-              <a:rPr lang="hu-HU" b="1" dirty="0"/>
-              <a:t>XAMPP</a:t>
-            </a:r>
-          </a:p>
-        </p:txBody>
-      </p:sp>
-      <p:sp>
-        <p:nvSpPr>
-          <p:cNvPr id="3" name="Tartalom helye 2">
-            <a:extLst>
-              <a:ext uri="{FF2B5EF4-FFF2-40B4-BE49-F238E27FC236}">
-                <a16:creationId xmlns:a16="http://schemas.microsoft.com/office/drawing/2014/main" id="{B658FA1B-4B84-4442-8085-E215854563E5}"/>
-              </a:ext>
-            </a:extLst>
-          </p:cNvPr>
-          <p:cNvSpPr>
-            <a:spLocks noGrp="1"/>
-          </p:cNvSpPr>
-          <p:nvPr>
-            <p:ph sz="half" idx="1"/>
-          </p:nvPr>
-        </p:nvSpPr>
-        <p:spPr>
-          <a:xfrm>
-            <a:off x="566057" y="1825625"/>
-            <a:ext cx="8055429" cy="4047637"/>
-          </a:xfrm>
-        </p:spPr>
-        <p:txBody>
-          <a:bodyPr>
-            <a:noAutofit/>
-          </a:bodyPr>
-          <a:lstStyle/>
-          <a:p>
-            <a:r>
-              <a:rPr lang="hu-HU" sz="2400" b="0" i="0" u="none" strike="noStrike" dirty="0">
-                <a:solidFill>
-                  <a:srgbClr val="000000"/>
-                </a:solidFill>
-                <a:effectLst/>
-                <a:latin typeface="Times New Roman" panose="02020603050405020304" pitchFamily="18" charset="0"/>
-              </a:rPr>
-              <a:t>Az </a:t>
-            </a:r>
-            <a:r>
-              <a:rPr lang="hu-HU" sz="2400" b="1" i="0" u="none" strike="noStrike" dirty="0">
-                <a:solidFill>
-                  <a:srgbClr val="000000"/>
-                </a:solidFill>
-                <a:effectLst/>
-                <a:latin typeface="Times New Roman" panose="02020603050405020304" pitchFamily="18" charset="0"/>
-              </a:rPr>
-              <a:t>XAMPP</a:t>
-            </a:r>
-            <a:r>
-              <a:rPr lang="hu-HU" sz="2400" b="0" i="0" u="none" strike="noStrike" dirty="0">
-                <a:solidFill>
-                  <a:srgbClr val="000000"/>
-                </a:solidFill>
-                <a:effectLst/>
-                <a:latin typeface="Times New Roman" panose="02020603050405020304" pitchFamily="18" charset="0"/>
-              </a:rPr>
-              <a:t> egy ingyenes és nyílt forráskódú szoftvercsomag</a:t>
-            </a:r>
-          </a:p>
-          <a:p>
-            <a:pPr algn="l" rtl="0" fontAlgn="base">
-              <a:buFont typeface="Arial" panose="020B0604020202020204" pitchFamily="34" charset="0"/>
-              <a:buChar char="•"/>
-            </a:pPr>
-            <a:r>
-              <a:rPr lang="hu-HU" sz="2400" b="1" i="0" u="none" strike="noStrike" dirty="0">
-                <a:solidFill>
-                  <a:srgbClr val="000000"/>
-                </a:solidFill>
-                <a:effectLst/>
-                <a:latin typeface="Times New Roman" panose="02020603050405020304" pitchFamily="18" charset="0"/>
-              </a:rPr>
-              <a:t>X</a:t>
-            </a:r>
-            <a:r>
-              <a:rPr lang="hu-HU" sz="2400" b="0" i="0" u="none" strike="noStrike" dirty="0">
-                <a:solidFill>
-                  <a:srgbClr val="000000"/>
-                </a:solidFill>
-                <a:effectLst/>
-                <a:latin typeface="Times New Roman" panose="02020603050405020304" pitchFamily="18" charset="0"/>
-              </a:rPr>
-              <a:t> – bármilyen operációs rendszer (Windows, Linux)</a:t>
-            </a:r>
-            <a:r>
-              <a:rPr lang="en-US" sz="2400" b="0" i="0" dirty="0">
-                <a:solidFill>
-                  <a:srgbClr val="000000"/>
-                </a:solidFill>
-                <a:effectLst/>
-                <a:latin typeface="Times New Roman" panose="02020603050405020304" pitchFamily="18" charset="0"/>
-              </a:rPr>
-              <a:t>​</a:t>
-            </a:r>
-            <a:endParaRPr lang="en-US" sz="2400" b="0" i="0" dirty="0">
-              <a:solidFill>
-                <a:srgbClr val="000000"/>
-              </a:solidFill>
-              <a:effectLst/>
-              <a:latin typeface="Arial" panose="020B0604020202020204" pitchFamily="34" charset="0"/>
-            </a:endParaRPr>
-          </a:p>
-          <a:p>
-            <a:pPr algn="l" rtl="0" fontAlgn="base">
-              <a:buFont typeface="Arial" panose="020B0604020202020204" pitchFamily="34" charset="0"/>
-              <a:buChar char="•"/>
-            </a:pPr>
-            <a:r>
-              <a:rPr lang="hu-HU" sz="2400" b="1" i="0" u="none" strike="noStrike" dirty="0">
-                <a:solidFill>
-                  <a:srgbClr val="000000"/>
-                </a:solidFill>
-                <a:effectLst/>
-                <a:latin typeface="Times New Roman" panose="02020603050405020304" pitchFamily="18" charset="0"/>
-              </a:rPr>
-              <a:t>A</a:t>
-            </a:r>
-            <a:r>
-              <a:rPr lang="hu-HU" sz="2400" b="0" i="0" u="none" strike="noStrike" dirty="0">
-                <a:solidFill>
-                  <a:srgbClr val="000000"/>
-                </a:solidFill>
-                <a:effectLst/>
-                <a:latin typeface="Times New Roman" panose="02020603050405020304" pitchFamily="18" charset="0"/>
-              </a:rPr>
-              <a:t> – Apache (webszerver)</a:t>
-            </a:r>
-            <a:r>
-              <a:rPr lang="en-US" sz="2400" b="0" i="0" dirty="0">
-                <a:solidFill>
-                  <a:srgbClr val="000000"/>
-                </a:solidFill>
-                <a:effectLst/>
-                <a:latin typeface="Times New Roman" panose="02020603050405020304" pitchFamily="18" charset="0"/>
-              </a:rPr>
-              <a:t>​</a:t>
-            </a:r>
-            <a:endParaRPr lang="en-US" sz="2400" b="0" i="0" dirty="0">
-              <a:solidFill>
-                <a:srgbClr val="000000"/>
-              </a:solidFill>
-              <a:effectLst/>
-              <a:latin typeface="Arial" panose="020B0604020202020204" pitchFamily="34" charset="0"/>
-            </a:endParaRPr>
-          </a:p>
-          <a:p>
-            <a:pPr algn="l" rtl="0" fontAlgn="base">
-              <a:buFont typeface="Arial" panose="020B0604020202020204" pitchFamily="34" charset="0"/>
-              <a:buChar char="•"/>
-            </a:pPr>
-            <a:r>
-              <a:rPr lang="hu-HU" sz="2400" b="1" i="0" u="none" strike="noStrike" dirty="0">
-                <a:solidFill>
-                  <a:srgbClr val="000000"/>
-                </a:solidFill>
-                <a:effectLst/>
-                <a:latin typeface="Times New Roman" panose="02020603050405020304" pitchFamily="18" charset="0"/>
-              </a:rPr>
-              <a:t>M</a:t>
-            </a:r>
-            <a:r>
-              <a:rPr lang="hu-HU" sz="2400" b="0" i="0" u="none" strike="noStrike" dirty="0">
-                <a:solidFill>
-                  <a:srgbClr val="000000"/>
-                </a:solidFill>
-                <a:effectLst/>
-                <a:latin typeface="Times New Roman" panose="02020603050405020304" pitchFamily="18" charset="0"/>
-              </a:rPr>
-              <a:t> – MySQL vagy MariaDB (adatbázis-kezelő rendszer)</a:t>
-            </a:r>
-            <a:r>
-              <a:rPr lang="en-US" sz="2400" b="0" i="0" dirty="0">
-                <a:solidFill>
-                  <a:srgbClr val="000000"/>
-                </a:solidFill>
-                <a:effectLst/>
-                <a:latin typeface="Times New Roman" panose="02020603050405020304" pitchFamily="18" charset="0"/>
-              </a:rPr>
-              <a:t>​</a:t>
-            </a:r>
-            <a:endParaRPr lang="en-US" sz="2400" b="0" i="0" dirty="0">
-              <a:solidFill>
-                <a:srgbClr val="000000"/>
-              </a:solidFill>
-              <a:effectLst/>
-              <a:latin typeface="Arial" panose="020B0604020202020204" pitchFamily="34" charset="0"/>
-            </a:endParaRPr>
-          </a:p>
-          <a:p>
-            <a:pPr algn="l" rtl="0" fontAlgn="base">
-              <a:buFont typeface="Arial" panose="020B0604020202020204" pitchFamily="34" charset="0"/>
-              <a:buChar char="•"/>
-            </a:pPr>
-            <a:r>
-              <a:rPr lang="hu-HU" sz="2400" b="1" i="0" u="none" strike="noStrike" dirty="0">
-                <a:solidFill>
-                  <a:srgbClr val="000000"/>
-                </a:solidFill>
-                <a:effectLst/>
-                <a:latin typeface="Times New Roman" panose="02020603050405020304" pitchFamily="18" charset="0"/>
-              </a:rPr>
-              <a:t>P</a:t>
-            </a:r>
-            <a:r>
-              <a:rPr lang="hu-HU" sz="2400" b="0" i="0" u="none" strike="noStrike" dirty="0">
-                <a:solidFill>
-                  <a:srgbClr val="000000"/>
-                </a:solidFill>
-                <a:effectLst/>
-                <a:latin typeface="Times New Roman" panose="02020603050405020304" pitchFamily="18" charset="0"/>
-              </a:rPr>
-              <a:t> – PHP (szerveroldali programozási nyelv)</a:t>
-            </a:r>
-            <a:r>
-              <a:rPr lang="en-US" sz="2400" b="0" i="0" dirty="0">
-                <a:solidFill>
-                  <a:srgbClr val="000000"/>
-                </a:solidFill>
-                <a:effectLst/>
-                <a:latin typeface="Times New Roman" panose="02020603050405020304" pitchFamily="18" charset="0"/>
-              </a:rPr>
-              <a:t>​</a:t>
-            </a:r>
-            <a:endParaRPr lang="en-US" sz="2400" b="0" i="0" dirty="0">
-              <a:solidFill>
-                <a:srgbClr val="000000"/>
-              </a:solidFill>
-              <a:effectLst/>
-              <a:latin typeface="Arial" panose="020B0604020202020204" pitchFamily="34" charset="0"/>
-            </a:endParaRPr>
-          </a:p>
-          <a:p>
-            <a:pPr algn="l" rtl="0" fontAlgn="base">
-              <a:buFont typeface="Arial" panose="020B0604020202020204" pitchFamily="34" charset="0"/>
-              <a:buChar char="•"/>
-            </a:pPr>
-            <a:r>
-              <a:rPr lang="hu-HU" sz="2400" b="1" i="0" u="none" strike="noStrike" dirty="0">
-                <a:solidFill>
-                  <a:srgbClr val="000000"/>
-                </a:solidFill>
-                <a:effectLst/>
-                <a:latin typeface="Times New Roman" panose="02020603050405020304" pitchFamily="18" charset="0"/>
-              </a:rPr>
-              <a:t>P</a:t>
-            </a:r>
-            <a:r>
-              <a:rPr lang="hu-HU" sz="2400" b="0" i="0" u="none" strike="noStrike" dirty="0">
-                <a:solidFill>
-                  <a:srgbClr val="000000"/>
-                </a:solidFill>
-                <a:effectLst/>
-                <a:latin typeface="Times New Roman" panose="02020603050405020304" pitchFamily="18" charset="0"/>
-              </a:rPr>
-              <a:t> – Perl (szintén programozási nyelv)</a:t>
-            </a:r>
-            <a:r>
-              <a:rPr lang="hu-HU" sz="2400" b="0" i="0" dirty="0">
-                <a:solidFill>
-                  <a:srgbClr val="000000"/>
-                </a:solidFill>
-                <a:effectLst/>
-                <a:latin typeface="Times New Roman" panose="02020603050405020304" pitchFamily="18" charset="0"/>
-              </a:rPr>
-              <a:t>​</a:t>
-            </a:r>
-            <a:endParaRPr lang="hu-HU" sz="2400" b="0" i="0" u="none" strike="noStrike" dirty="0">
-              <a:solidFill>
-                <a:srgbClr val="000000"/>
-              </a:solidFill>
-              <a:effectLst/>
-              <a:latin typeface="Times New Roman" panose="02020603050405020304" pitchFamily="18" charset="0"/>
-            </a:endParaRPr>
-          </a:p>
-          <a:p>
-            <a:r>
-              <a:rPr lang="hu-HU" sz="2400" b="0" i="0" u="none" strike="noStrike" dirty="0">
-                <a:solidFill>
-                  <a:srgbClr val="000000"/>
-                </a:solidFill>
-                <a:effectLst/>
-                <a:latin typeface="Times New Roman" panose="02020603050405020304" pitchFamily="18" charset="0"/>
-              </a:rPr>
-              <a:t>Segítségével </a:t>
-            </a:r>
-            <a:r>
-              <a:rPr lang="hu-HU" sz="2400" b="1" i="0" u="none" strike="noStrike" dirty="0">
-                <a:solidFill>
-                  <a:srgbClr val="000000"/>
-                </a:solidFill>
-                <a:effectLst/>
-                <a:latin typeface="Times New Roman" panose="02020603050405020304" pitchFamily="18" charset="0"/>
-              </a:rPr>
-              <a:t>egyszerűen l</a:t>
-            </a:r>
-            <a:r>
-              <a:rPr lang="hu-HU" sz="2400" b="1" dirty="0">
-                <a:solidFill>
-                  <a:srgbClr val="000000"/>
-                </a:solidFill>
-              </a:rPr>
-              <a:t>étrehozható </a:t>
-            </a:r>
-            <a:r>
-              <a:rPr lang="hu-HU" sz="2400" dirty="0">
-                <a:solidFill>
-                  <a:srgbClr val="000000"/>
-                </a:solidFill>
-              </a:rPr>
-              <a:t>egy </a:t>
-            </a:r>
-            <a:r>
-              <a:rPr lang="hu-HU" sz="2400" b="1" dirty="0">
-                <a:solidFill>
-                  <a:srgbClr val="000000"/>
-                </a:solidFill>
-              </a:rPr>
-              <a:t>helyi webszerver</a:t>
-            </a:r>
-          </a:p>
-          <a:p>
-            <a:r>
-              <a:rPr lang="hu-HU" sz="2400" b="0" i="0" u="none" strike="noStrike" dirty="0">
-                <a:solidFill>
-                  <a:srgbClr val="000000"/>
-                </a:solidFill>
-                <a:effectLst/>
-                <a:latin typeface="Times New Roman" panose="02020603050405020304" pitchFamily="18" charset="0"/>
-              </a:rPr>
-              <a:t>A fejlesztők </a:t>
-            </a:r>
-            <a:r>
-              <a:rPr lang="hu-HU" sz="2400" b="1" i="0" u="none" strike="noStrike" dirty="0">
-                <a:solidFill>
-                  <a:srgbClr val="000000"/>
-                </a:solidFill>
-                <a:effectLst/>
-                <a:latin typeface="Times New Roman" panose="02020603050405020304" pitchFamily="18" charset="0"/>
-              </a:rPr>
-              <a:t>helyben futtathatják </a:t>
-            </a:r>
-            <a:r>
-              <a:rPr lang="hu-HU" sz="2400" b="0" i="0" u="none" strike="noStrike" dirty="0">
-                <a:solidFill>
-                  <a:srgbClr val="000000"/>
-                </a:solidFill>
-                <a:effectLst/>
-                <a:latin typeface="Times New Roman" panose="02020603050405020304" pitchFamily="18" charset="0"/>
-              </a:rPr>
-              <a:t>és </a:t>
-            </a:r>
-            <a:r>
-              <a:rPr lang="hu-HU" sz="2400" b="1" i="0" u="none" strike="noStrike" dirty="0">
-                <a:solidFill>
-                  <a:srgbClr val="000000"/>
-                </a:solidFill>
-                <a:effectLst/>
-                <a:latin typeface="Times New Roman" panose="02020603050405020304" pitchFamily="18" charset="0"/>
-              </a:rPr>
-              <a:t>tesztelhetik</a:t>
-            </a:r>
-            <a:r>
-              <a:rPr lang="hu-HU" sz="2400" b="0" i="0" u="none" strike="noStrike" dirty="0">
-                <a:solidFill>
-                  <a:srgbClr val="000000"/>
-                </a:solidFill>
-                <a:effectLst/>
-                <a:latin typeface="Times New Roman" panose="02020603050405020304" pitchFamily="18" charset="0"/>
-              </a:rPr>
-              <a:t> webes alkalmazásaikat a felületen</a:t>
-            </a:r>
-            <a:endParaRPr lang="hu-HU" sz="2400" dirty="0">
-              <a:solidFill>
-                <a:srgbClr val="000000"/>
-              </a:solidFill>
-            </a:endParaRPr>
-          </a:p>
-        </p:txBody>
-      </p:sp>
-      <p:pic>
-        <p:nvPicPr>
-          <p:cNvPr id="3074" name="Picture 2" descr="A képen Grafika, szimbólum, clipart, embléma látható&#10;&#10;Lehet, hogy az AI által létrehozott tartalom helytelen.">
-            <a:extLst>
-              <a:ext uri="{FF2B5EF4-FFF2-40B4-BE49-F238E27FC236}">
-                <a16:creationId xmlns:a16="http://schemas.microsoft.com/office/drawing/2014/main" id="{0232ACF3-161E-4534-9268-5243A5FB3223}"/>
-              </a:ext>
-            </a:extLst>
-          </p:cNvPr>
-          <p:cNvPicPr>
-            <a:picLocks noGrp="1" noChangeAspect="1" noChangeArrowheads="1"/>
-          </p:cNvPicPr>
-          <p:nvPr>
-            <p:ph sz="half" idx="2"/>
-          </p:nvPr>
-        </p:nvPicPr>
-        <p:blipFill>
-          <a:blip r:embed="rId2">
-            <a:extLst>
-              <a:ext uri="{28A0092B-C50C-407E-A947-70E740481C1C}">
-                <a14:useLocalDpi xmlns:a14="http://schemas.microsoft.com/office/drawing/2010/main" val="0"/>
-              </a:ext>
-            </a:extLst>
-          </a:blip>
-          <a:srcRect/>
-          <a:stretch>
-            <a:fillRect/>
-          </a:stretch>
-        </p:blipFill>
-        <p:spPr bwMode="auto">
-          <a:xfrm>
-            <a:off x="8830491" y="2590443"/>
-            <a:ext cx="2795452" cy="2821701"/>
-          </a:xfrm>
-          <a:prstGeom prst="rect">
-            <a:avLst/>
-          </a:prstGeom>
-          <a:noFill/>
-          <a:extLst>
-            <a:ext uri="{909E8E84-426E-40DD-AFC4-6F175D3DCCD1}">
-              <a14:hiddenFill xmlns:a14="http://schemas.microsoft.com/office/drawing/2010/main">
-                <a:solidFill>
-                  <a:srgbClr val="FFFFFF"/>
-                </a:solidFill>
-              </a14:hiddenFill>
-            </a:ext>
-          </a:extLst>
-        </p:spPr>
-      </p:pic>
-    </p:spTree>
-    <p:extLst>
-      <p:ext uri="{BB962C8B-B14F-4D97-AF65-F5344CB8AC3E}">
-        <p14:creationId xmlns:p14="http://schemas.microsoft.com/office/powerpoint/2010/main" val="3231710478"/>
-      </p:ext>
-    </p:extLst>
-  </p:cSld>
-  <p:clrMapOvr>
-    <a:masterClrMapping/>
-  </p:clrMapOvr>
-</p:sld>
-</file>
-
-<file path=ppt/slides/slide14.xml><?xml version="1.0" encoding="utf-8"?>
-<p:sld xmlns:a="http://schemas.openxmlformats.org/drawingml/2006/main" xmlns:r="http://schemas.openxmlformats.org/officeDocument/2006/relationships" xmlns:p="http://schemas.openxmlformats.org/presentationml/2006/main">
-  <p:cSld>
-    <p:spTree>
-      <p:nvGrpSpPr>
-        <p:cNvPr id="1" name=""/>
-        <p:cNvGrpSpPr/>
-        <p:nvPr/>
-      </p:nvGrpSpPr>
-      <p:grpSpPr>
-        <a:xfrm>
-          <a:off x="0" y="0"/>
-          <a:ext cx="0" cy="0"/>
-          <a:chOff x="0" y="0"/>
-          <a:chExt cx="0" cy="0"/>
-        </a:xfrm>
-      </p:grpSpPr>
-      <p:sp>
-        <p:nvSpPr>
-          <p:cNvPr id="2" name="Cím 1">
-            <a:extLst>
-              <a:ext uri="{FF2B5EF4-FFF2-40B4-BE49-F238E27FC236}">
-                <a16:creationId xmlns:a16="http://schemas.microsoft.com/office/drawing/2014/main" id="{20C307D6-464B-4532-96E8-F8D087B37A8F}"/>
-              </a:ext>
-            </a:extLst>
-          </p:cNvPr>
-          <p:cNvSpPr>
-            <a:spLocks noGrp="1"/>
-          </p:cNvSpPr>
-          <p:nvPr>
-            <p:ph type="title"/>
-          </p:nvPr>
-        </p:nvSpPr>
-        <p:spPr/>
-        <p:txBody>
-          <a:bodyPr/>
-          <a:lstStyle/>
-          <a:p>
-            <a:pPr algn="ctr"/>
-            <a:r>
-              <a:rPr lang="hu-HU" b="1" dirty="0"/>
-              <a:t>MySQL</a:t>
-            </a:r>
-          </a:p>
-        </p:txBody>
-      </p:sp>
-      <p:sp>
-        <p:nvSpPr>
-          <p:cNvPr id="3" name="Tartalom helye 2">
-            <a:extLst>
-              <a:ext uri="{FF2B5EF4-FFF2-40B4-BE49-F238E27FC236}">
-                <a16:creationId xmlns:a16="http://schemas.microsoft.com/office/drawing/2014/main" id="{111B29F4-E1E8-4C39-86FB-2E704EB1DE06}"/>
-              </a:ext>
-            </a:extLst>
-          </p:cNvPr>
-          <p:cNvSpPr>
-            <a:spLocks noGrp="1"/>
-          </p:cNvSpPr>
-          <p:nvPr>
-            <p:ph sz="half" idx="1"/>
-          </p:nvPr>
-        </p:nvSpPr>
-        <p:spPr>
-          <a:xfrm>
-            <a:off x="838200" y="1825625"/>
-            <a:ext cx="6781800" cy="4012467"/>
-          </a:xfrm>
-        </p:spPr>
-        <p:txBody>
-          <a:bodyPr/>
-          <a:lstStyle/>
-          <a:p>
-            <a:r>
-              <a:rPr lang="hu-HU" dirty="0"/>
-              <a:t>A </a:t>
-            </a:r>
-            <a:r>
-              <a:rPr lang="hu-HU" b="1" dirty="0"/>
-              <a:t>MySQL</a:t>
-            </a:r>
-            <a:r>
-              <a:rPr lang="hu-HU" dirty="0"/>
-              <a:t> egy nyílt forráskódú relációs adatbázis-kezelő rendszer</a:t>
-            </a:r>
-          </a:p>
-          <a:p>
-            <a:r>
-              <a:rPr lang="hu-HU" dirty="0"/>
-              <a:t>Az adatok </a:t>
-            </a:r>
-            <a:r>
-              <a:rPr lang="hu-HU" b="1" dirty="0"/>
-              <a:t>táblákban</a:t>
-            </a:r>
-            <a:r>
-              <a:rPr lang="hu-HU" dirty="0"/>
-              <a:t> kerülnek tárolásra</a:t>
-            </a:r>
-          </a:p>
-          <a:p>
-            <a:r>
-              <a:rPr lang="hu-HU" dirty="0"/>
-              <a:t>Strukturált lekérdezési nyelvet (</a:t>
-            </a:r>
-            <a:r>
-              <a:rPr lang="hu-HU" b="1" dirty="0"/>
-              <a:t>SQL</a:t>
-            </a:r>
-            <a:r>
-              <a:rPr lang="hu-HU" dirty="0"/>
-              <a:t>) használja az adatok lekérdezésére, módosítására és kezelésére​</a:t>
-            </a:r>
-          </a:p>
-          <a:p>
-            <a:r>
-              <a:rPr lang="hu-HU" dirty="0"/>
-              <a:t>Gyakran használatos </a:t>
-            </a:r>
-            <a:r>
-              <a:rPr lang="hu-HU" b="1" dirty="0"/>
-              <a:t>PHP</a:t>
-            </a:r>
-            <a:r>
-              <a:rPr lang="hu-HU" dirty="0"/>
-              <a:t> </a:t>
-            </a:r>
-            <a:r>
-              <a:rPr lang="hu-HU" b="1" dirty="0"/>
-              <a:t>alapú weboldalak </a:t>
-            </a:r>
-            <a:r>
-              <a:rPr lang="hu-HU" dirty="0"/>
-              <a:t>és </a:t>
-            </a:r>
-            <a:r>
-              <a:rPr lang="hu-HU" b="1" dirty="0"/>
-              <a:t>dinamikus alkalmazások</a:t>
-            </a:r>
-            <a:r>
-              <a:rPr lang="hu-HU" dirty="0"/>
-              <a:t> adatbázisaként pl.:</a:t>
-            </a:r>
-            <a:r>
-              <a:rPr lang="hu-HU" dirty="0">
-                <a:sym typeface="Wingdings" panose="05000000000000000000" pitchFamily="2" charset="2"/>
-              </a:rPr>
-              <a:t>(</a:t>
-            </a:r>
-            <a:r>
-              <a:rPr lang="hu-HU" b="1" dirty="0">
-                <a:sym typeface="Wingdings" panose="05000000000000000000" pitchFamily="2" charset="2"/>
-              </a:rPr>
-              <a:t>WordPress</a:t>
-            </a:r>
-            <a:r>
-              <a:rPr lang="hu-HU" dirty="0">
-                <a:sym typeface="Wingdings" panose="05000000000000000000" pitchFamily="2" charset="2"/>
-              </a:rPr>
-              <a:t>)</a:t>
-            </a:r>
-            <a:endParaRPr lang="hu-HU" dirty="0"/>
-          </a:p>
-        </p:txBody>
-      </p:sp>
-      <p:pic>
-        <p:nvPicPr>
-          <p:cNvPr id="4100" name="Picture 4" descr="A képen Grafika, Betűtípus, embléma, Grafikus tervezés látható&#10;&#10;Lehet, hogy az AI által létrehozott tartalom helytelen.">
-            <a:extLst>
-              <a:ext uri="{FF2B5EF4-FFF2-40B4-BE49-F238E27FC236}">
-                <a16:creationId xmlns:a16="http://schemas.microsoft.com/office/drawing/2014/main" id="{098D544E-7498-47E6-9F07-3CFB0FBA0C37}"/>
-              </a:ext>
-            </a:extLst>
-          </p:cNvPr>
-          <p:cNvPicPr>
-            <a:picLocks noGrp="1" noChangeAspect="1" noChangeArrowheads="1"/>
-          </p:cNvPicPr>
-          <p:nvPr>
-            <p:ph sz="half" idx="2"/>
-          </p:nvPr>
-        </p:nvPicPr>
-        <p:blipFill>
-          <a:blip r:embed="rId2">
-            <a:extLst>
-              <a:ext uri="{28A0092B-C50C-407E-A947-70E740481C1C}">
-                <a14:useLocalDpi xmlns:a14="http://schemas.microsoft.com/office/drawing/2010/main" val="0"/>
-              </a:ext>
-            </a:extLst>
-          </a:blip>
-          <a:srcRect/>
-          <a:stretch>
-            <a:fillRect/>
-          </a:stretch>
-        </p:blipFill>
-        <p:spPr bwMode="auto">
-          <a:xfrm>
-            <a:off x="8549345" y="2464912"/>
-            <a:ext cx="3072763" cy="3072763"/>
-          </a:xfrm>
-          <a:prstGeom prst="rect">
-            <a:avLst/>
-          </a:prstGeom>
-          <a:noFill/>
-          <a:extLst>
-            <a:ext uri="{909E8E84-426E-40DD-AFC4-6F175D3DCCD1}">
-              <a14:hiddenFill xmlns:a14="http://schemas.microsoft.com/office/drawing/2010/main">
-                <a:solidFill>
-                  <a:srgbClr val="FFFFFF"/>
-                </a:solidFill>
-              </a14:hiddenFill>
-            </a:ext>
-          </a:extLst>
-        </p:spPr>
-      </p:pic>
-    </p:spTree>
-    <p:extLst>
-      <p:ext uri="{BB962C8B-B14F-4D97-AF65-F5344CB8AC3E}">
-        <p14:creationId xmlns:p14="http://schemas.microsoft.com/office/powerpoint/2010/main" val="1632070811"/>
-      </p:ext>
-    </p:extLst>
-  </p:cSld>
-  <p:clrMapOvr>
-    <a:masterClrMapping/>
-  </p:clrMapOvr>
-</p:sld>
-</file>
-
-<file path=ppt/slides/slide15.xml><?xml version="1.0" encoding="utf-8"?>
-<p:sld xmlns:a="http://schemas.openxmlformats.org/drawingml/2006/main" xmlns:r="http://schemas.openxmlformats.org/officeDocument/2006/relationships" xmlns:p="http://schemas.openxmlformats.org/presentationml/2006/main">
-  <p:cSld>
-    <p:spTree>
-      <p:nvGrpSpPr>
-        <p:cNvPr id="1" name=""/>
-        <p:cNvGrpSpPr/>
-        <p:nvPr/>
-      </p:nvGrpSpPr>
-      <p:grpSpPr>
-        <a:xfrm>
-          <a:off x="0" y="0"/>
-          <a:ext cx="0" cy="0"/>
-          <a:chOff x="0" y="0"/>
-          <a:chExt cx="0" cy="0"/>
-        </a:xfrm>
-      </p:grpSpPr>
-      <p:sp>
-        <p:nvSpPr>
-          <p:cNvPr id="2" name="Cím 1">
-            <a:extLst>
-              <a:ext uri="{FF2B5EF4-FFF2-40B4-BE49-F238E27FC236}">
-                <a16:creationId xmlns:a16="http://schemas.microsoft.com/office/drawing/2014/main" id="{D79052FA-7280-4750-96F9-85B2FFA301CC}"/>
-              </a:ext>
-            </a:extLst>
-          </p:cNvPr>
-          <p:cNvSpPr>
-            <a:spLocks noGrp="1"/>
-          </p:cNvSpPr>
-          <p:nvPr>
-            <p:ph type="title"/>
-          </p:nvPr>
-        </p:nvSpPr>
-        <p:spPr/>
-        <p:txBody>
-          <a:bodyPr/>
-          <a:lstStyle/>
-          <a:p>
-            <a:pPr algn="ctr"/>
-            <a:r>
-              <a:rPr lang="hu-HU" b="1" dirty="0"/>
-              <a:t>Node Package Manager</a:t>
-            </a:r>
-          </a:p>
-        </p:txBody>
-      </p:sp>
-      <p:sp>
-        <p:nvSpPr>
-          <p:cNvPr id="3" name="Tartalom helye 2">
-            <a:extLst>
-              <a:ext uri="{FF2B5EF4-FFF2-40B4-BE49-F238E27FC236}">
-                <a16:creationId xmlns:a16="http://schemas.microsoft.com/office/drawing/2014/main" id="{9E14CC74-C4D5-482A-AE6B-5514A6F6BC09}"/>
-              </a:ext>
-            </a:extLst>
-          </p:cNvPr>
-          <p:cNvSpPr>
-            <a:spLocks noGrp="1"/>
-          </p:cNvSpPr>
-          <p:nvPr>
-            <p:ph sz="half" idx="1"/>
-          </p:nvPr>
-        </p:nvSpPr>
-        <p:spPr>
-          <a:xfrm>
-            <a:off x="838199" y="1825625"/>
-            <a:ext cx="6154783" cy="4081622"/>
-          </a:xfrm>
-        </p:spPr>
-        <p:txBody>
-          <a:bodyPr>
-            <a:normAutofit lnSpcReduction="10000"/>
-          </a:bodyPr>
-          <a:lstStyle/>
-          <a:p>
-            <a:r>
-              <a:rPr lang="hu-HU" b="1" dirty="0"/>
-              <a:t>Node Package Manager (npm)</a:t>
-            </a:r>
-          </a:p>
-          <a:p>
-            <a:r>
-              <a:rPr lang="hu-HU" b="1" dirty="0"/>
-              <a:t>Node.js </a:t>
-            </a:r>
-            <a:r>
-              <a:rPr lang="hu-HU" dirty="0"/>
-              <a:t>platformhoz tartozó </a:t>
-            </a:r>
-            <a:r>
-              <a:rPr lang="hu-HU" b="1" dirty="0"/>
-              <a:t>csomagkezelő rendszer</a:t>
-            </a:r>
-          </a:p>
-          <a:p>
-            <a:r>
-              <a:rPr lang="hu-HU" b="1" dirty="0"/>
-              <a:t>JavaScript</a:t>
-            </a:r>
-            <a:r>
-              <a:rPr lang="hu-HU" dirty="0"/>
-              <a:t> és </a:t>
-            </a:r>
-            <a:r>
-              <a:rPr lang="hu-HU" b="1" dirty="0"/>
-              <a:t>TypeScript</a:t>
-            </a:r>
-            <a:r>
-              <a:rPr lang="hu-HU" dirty="0"/>
-              <a:t> alapú projektekben használnak​</a:t>
-            </a:r>
-          </a:p>
-          <a:p>
-            <a:r>
-              <a:rPr lang="hu-HU" dirty="0"/>
-              <a:t>Segítségével könnyen telepíthetőek, frissíthetőek és kezelhetőek különböző </a:t>
-            </a:r>
-            <a:r>
-              <a:rPr lang="hu-HU" b="1" dirty="0"/>
-              <a:t>modulok</a:t>
-            </a:r>
-            <a:r>
-              <a:rPr lang="hu-HU" dirty="0"/>
-              <a:t>, </a:t>
-            </a:r>
-            <a:r>
-              <a:rPr lang="hu-HU" b="1" dirty="0"/>
-              <a:t>könyvtárak</a:t>
-            </a:r>
-          </a:p>
-          <a:p>
-            <a:r>
-              <a:rPr lang="hu-HU" dirty="0"/>
-              <a:t>Kulcsszerepet játszik modern keretrendszerekben pl.: Angular, React</a:t>
-            </a:r>
-          </a:p>
-        </p:txBody>
-      </p:sp>
-      <p:pic>
-        <p:nvPicPr>
-          <p:cNvPr id="8194" name="Picture 2" descr="A képen Betűtípus, Grafika, embléma, tervezés látható&#10;&#10;Lehet, hogy az AI által létrehozott tartalom helytelen.">
-            <a:extLst>
-              <a:ext uri="{FF2B5EF4-FFF2-40B4-BE49-F238E27FC236}">
-                <a16:creationId xmlns:a16="http://schemas.microsoft.com/office/drawing/2014/main" id="{327C619E-B8F0-46E8-B597-84C3FA91AEB9}"/>
-              </a:ext>
-            </a:extLst>
-          </p:cNvPr>
-          <p:cNvPicPr>
-            <a:picLocks noGrp="1" noChangeAspect="1" noChangeArrowheads="1"/>
-          </p:cNvPicPr>
-          <p:nvPr>
-            <p:ph sz="half" idx="2"/>
-          </p:nvPr>
-        </p:nvPicPr>
-        <p:blipFill>
-          <a:blip r:embed="rId2">
-            <a:extLst>
-              <a:ext uri="{28A0092B-C50C-407E-A947-70E740481C1C}">
-                <a14:useLocalDpi xmlns:a14="http://schemas.microsoft.com/office/drawing/2010/main" val="0"/>
-              </a:ext>
-            </a:extLst>
-          </a:blip>
-          <a:srcRect/>
-          <a:stretch>
-            <a:fillRect/>
-          </a:stretch>
-        </p:blipFill>
-        <p:spPr bwMode="auto">
-          <a:xfrm>
-            <a:off x="7893368" y="2540431"/>
-            <a:ext cx="3366816" cy="3366816"/>
-          </a:xfrm>
-          <a:prstGeom prst="rect">
-            <a:avLst/>
-          </a:prstGeom>
-          <a:noFill/>
-          <a:extLst>
-            <a:ext uri="{909E8E84-426E-40DD-AFC4-6F175D3DCCD1}">
-              <a14:hiddenFill xmlns:a14="http://schemas.microsoft.com/office/drawing/2010/main">
-                <a:solidFill>
-                  <a:srgbClr val="FFFFFF"/>
-                </a:solidFill>
-              </a14:hiddenFill>
-            </a:ext>
-          </a:extLst>
-        </p:spPr>
-      </p:pic>
-    </p:spTree>
-    <p:extLst>
-      <p:ext uri="{BB962C8B-B14F-4D97-AF65-F5344CB8AC3E}">
-        <p14:creationId xmlns:p14="http://schemas.microsoft.com/office/powerpoint/2010/main" val="3264776877"/>
-      </p:ext>
-    </p:extLst>
-  </p:cSld>
-  <p:clrMapOvr>
-    <a:masterClrMapping/>
-  </p:clrMapOvr>
-</p:sld>
-</file>
-
-<file path=ppt/slides/slide16.xml><?xml version="1.0" encoding="utf-8"?>
-<p:sld xmlns:a="http://schemas.openxmlformats.org/drawingml/2006/main" xmlns:r="http://schemas.openxmlformats.org/officeDocument/2006/relationships" xmlns:p="http://schemas.openxmlformats.org/presentationml/2006/main">
-  <p:cSld>
-    <p:spTree>
-      <p:nvGrpSpPr>
-        <p:cNvPr id="1" name=""/>
-        <p:cNvGrpSpPr/>
-        <p:nvPr/>
-      </p:nvGrpSpPr>
-      <p:grpSpPr>
-        <a:xfrm>
-          <a:off x="0" y="0"/>
-          <a:ext cx="0" cy="0"/>
-          <a:chOff x="0" y="0"/>
-          <a:chExt cx="0" cy="0"/>
-        </a:xfrm>
-      </p:grpSpPr>
-      <p:sp>
-        <p:nvSpPr>
-          <p:cNvPr id="2" name="Cím 1">
-            <a:extLst>
-              <a:ext uri="{FF2B5EF4-FFF2-40B4-BE49-F238E27FC236}">
-                <a16:creationId xmlns:a16="http://schemas.microsoft.com/office/drawing/2014/main" id="{F44EC5D3-BE0C-4D6C-8A5C-DB7316943730}"/>
-              </a:ext>
-            </a:extLst>
-          </p:cNvPr>
-          <p:cNvSpPr>
-            <a:spLocks noGrp="1"/>
-          </p:cNvSpPr>
-          <p:nvPr>
-            <p:ph type="title"/>
-          </p:nvPr>
-        </p:nvSpPr>
-        <p:spPr/>
-        <p:txBody>
-          <a:bodyPr/>
-          <a:lstStyle/>
-          <a:p>
-            <a:pPr algn="ctr"/>
-            <a:r>
-              <a:rPr lang="hu-HU" b="1" dirty="0"/>
-              <a:t>Node.js</a:t>
-            </a:r>
-          </a:p>
-        </p:txBody>
-      </p:sp>
-      <p:sp>
-        <p:nvSpPr>
-          <p:cNvPr id="3" name="Tartalom helye 2">
-            <a:extLst>
-              <a:ext uri="{FF2B5EF4-FFF2-40B4-BE49-F238E27FC236}">
-                <a16:creationId xmlns:a16="http://schemas.microsoft.com/office/drawing/2014/main" id="{4680158E-DA1B-4781-AEEB-E7A506A88E9E}"/>
-              </a:ext>
-            </a:extLst>
-          </p:cNvPr>
-          <p:cNvSpPr>
-            <a:spLocks noGrp="1"/>
-          </p:cNvSpPr>
-          <p:nvPr>
-            <p:ph sz="half" idx="1"/>
-          </p:nvPr>
-        </p:nvSpPr>
-        <p:spPr>
-          <a:xfrm>
-            <a:off x="838199" y="1825625"/>
-            <a:ext cx="6854859" cy="4144352"/>
-          </a:xfrm>
-        </p:spPr>
-        <p:txBody>
-          <a:bodyPr>
-            <a:normAutofit fontScale="92500" lnSpcReduction="10000"/>
-          </a:bodyPr>
-          <a:lstStyle/>
-          <a:p>
-            <a:r>
-              <a:rPr lang="hu-HU" dirty="0"/>
-              <a:t>A </a:t>
-            </a:r>
-            <a:r>
-              <a:rPr lang="hu-HU" b="1" dirty="0"/>
-              <a:t>Node.js </a:t>
-            </a:r>
-            <a:r>
-              <a:rPr lang="hu-HU" dirty="0"/>
-              <a:t>egy nyílt forráskódú, </a:t>
-            </a:r>
-            <a:r>
-              <a:rPr lang="hu-HU" b="1" dirty="0"/>
-              <a:t>JavaScript-alapú </a:t>
-            </a:r>
-            <a:r>
-              <a:rPr lang="hu-HU" dirty="0"/>
-              <a:t>futtatókörnyezet</a:t>
-            </a:r>
-          </a:p>
-          <a:p>
-            <a:r>
-              <a:rPr lang="hu-HU" dirty="0"/>
-              <a:t>Lehetővé teszi, hogy a </a:t>
-            </a:r>
-            <a:r>
-              <a:rPr lang="hu-HU" b="1" dirty="0"/>
-              <a:t>JavaScriptet</a:t>
-            </a:r>
-            <a:r>
-              <a:rPr lang="hu-HU" dirty="0"/>
-              <a:t> ne csak a böngészőben, hanem a </a:t>
-            </a:r>
-            <a:r>
-              <a:rPr lang="hu-HU" b="1" dirty="0"/>
-              <a:t>szerveroldalon</a:t>
-            </a:r>
-            <a:r>
-              <a:rPr lang="hu-HU" dirty="0"/>
-              <a:t> is használjuk​</a:t>
-            </a:r>
-          </a:p>
-          <a:p>
-            <a:r>
-              <a:rPr lang="hu-HU" dirty="0"/>
-              <a:t>A </a:t>
-            </a:r>
-            <a:r>
-              <a:rPr lang="hu-HU" b="1" dirty="0"/>
-              <a:t>Node.js</a:t>
-            </a:r>
-            <a:r>
-              <a:rPr lang="hu-HU" dirty="0"/>
-              <a:t> a </a:t>
-            </a:r>
-            <a:r>
-              <a:rPr lang="hu-HU" b="1" dirty="0"/>
-              <a:t>Google Chrome</a:t>
-            </a:r>
-            <a:r>
-              <a:rPr lang="hu-HU" dirty="0"/>
-              <a:t> motorjára épül</a:t>
-            </a:r>
-          </a:p>
-          <a:p>
-            <a:r>
-              <a:rPr lang="hu-HU" b="1" dirty="0"/>
-              <a:t>Jól skálázható </a:t>
-            </a:r>
-            <a:r>
-              <a:rPr lang="hu-HU" dirty="0"/>
-              <a:t>– gyakran alkalmazzák </a:t>
-            </a:r>
-            <a:r>
-              <a:rPr lang="hu-HU" b="1" dirty="0"/>
-              <a:t>chatprogramok</a:t>
-            </a:r>
-            <a:r>
-              <a:rPr lang="hu-HU" dirty="0"/>
-              <a:t> vagy </a:t>
-            </a:r>
-            <a:r>
-              <a:rPr lang="hu-HU" b="1" dirty="0"/>
-              <a:t>online játékok </a:t>
-            </a:r>
-            <a:r>
-              <a:rPr lang="hu-HU" dirty="0"/>
-              <a:t>fejlesztésére</a:t>
-            </a:r>
-          </a:p>
-          <a:p>
-            <a:r>
-              <a:rPr lang="hu-HU" dirty="0"/>
-              <a:t>A </a:t>
-            </a:r>
-            <a:r>
-              <a:rPr lang="hu-HU" b="1" dirty="0"/>
-              <a:t>Node.js </a:t>
-            </a:r>
-            <a:r>
-              <a:rPr lang="hu-HU" dirty="0"/>
-              <a:t>szorosan </a:t>
-            </a:r>
-            <a:r>
-              <a:rPr lang="hu-HU" b="1" dirty="0"/>
-              <a:t>együttműködik</a:t>
-            </a:r>
-            <a:r>
-              <a:rPr lang="hu-HU" dirty="0"/>
-              <a:t> az </a:t>
-            </a:r>
-            <a:r>
-              <a:rPr lang="hu-HU" b="1" dirty="0"/>
-              <a:t>npm csomagkezelővel</a:t>
-            </a:r>
-          </a:p>
-          <a:p>
-            <a:endParaRPr lang="hu-HU" dirty="0"/>
-          </a:p>
-        </p:txBody>
-      </p:sp>
-      <p:pic>
-        <p:nvPicPr>
-          <p:cNvPr id="7170" name="Picture 2" descr="A képen képernyőkép, Grafika, tervezés látható&#10;&#10;Lehet, hogy az AI által létrehozott tartalom helytelen.">
-            <a:extLst>
-              <a:ext uri="{FF2B5EF4-FFF2-40B4-BE49-F238E27FC236}">
-                <a16:creationId xmlns:a16="http://schemas.microsoft.com/office/drawing/2014/main" id="{B84397AA-5833-4C2D-9DED-1FAD94627168}"/>
-              </a:ext>
-            </a:extLst>
-          </p:cNvPr>
-          <p:cNvPicPr>
-            <a:picLocks noGrp="1" noChangeAspect="1" noChangeArrowheads="1"/>
-          </p:cNvPicPr>
-          <p:nvPr>
-            <p:ph sz="half" idx="2"/>
-          </p:nvPr>
-        </p:nvPicPr>
-        <p:blipFill>
-          <a:blip r:embed="rId2">
-            <a:extLst>
-              <a:ext uri="{28A0092B-C50C-407E-A947-70E740481C1C}">
-                <a14:useLocalDpi xmlns:a14="http://schemas.microsoft.com/office/drawing/2010/main" val="0"/>
-              </a:ext>
-            </a:extLst>
-          </a:blip>
-          <a:srcRect/>
-          <a:stretch>
-            <a:fillRect/>
-          </a:stretch>
-        </p:blipFill>
-        <p:spPr bwMode="auto">
-          <a:xfrm>
-            <a:off x="7693059" y="2742122"/>
-            <a:ext cx="3660741" cy="2628225"/>
-          </a:xfrm>
-          <a:prstGeom prst="rect">
-            <a:avLst/>
-          </a:prstGeom>
-          <a:noFill/>
-          <a:extLst>
-            <a:ext uri="{909E8E84-426E-40DD-AFC4-6F175D3DCCD1}">
-              <a14:hiddenFill xmlns:a14="http://schemas.microsoft.com/office/drawing/2010/main">
-                <a:solidFill>
-                  <a:srgbClr val="FFFFFF"/>
-                </a:solidFill>
-              </a14:hiddenFill>
-            </a:ext>
-          </a:extLst>
-        </p:spPr>
-      </p:pic>
-    </p:spTree>
-    <p:extLst>
-      <p:ext uri="{BB962C8B-B14F-4D97-AF65-F5344CB8AC3E}">
-        <p14:creationId xmlns:p14="http://schemas.microsoft.com/office/powerpoint/2010/main" val="1455124277"/>
-      </p:ext>
-    </p:extLst>
-  </p:cSld>
-  <p:clrMapOvr>
-    <a:masterClrMapping/>
-  </p:clrMapOvr>
-</p:sld>
-</file>
-
-<file path=ppt/slides/slide17.xml><?xml version="1.0" encoding="utf-8"?>
-<p:sld xmlns:a="http://schemas.openxmlformats.org/drawingml/2006/main" xmlns:r="http://schemas.openxmlformats.org/officeDocument/2006/relationships" xmlns:p="http://schemas.openxmlformats.org/presentationml/2006/main">
-  <p:cSld>
-    <p:spTree>
-      <p:nvGrpSpPr>
-        <p:cNvPr id="1" name=""/>
-        <p:cNvGrpSpPr/>
-        <p:nvPr/>
-      </p:nvGrpSpPr>
-      <p:grpSpPr>
-        <a:xfrm>
-          <a:off x="0" y="0"/>
-          <a:ext cx="0" cy="0"/>
-          <a:chOff x="0" y="0"/>
-          <a:chExt cx="0" cy="0"/>
-        </a:xfrm>
-      </p:grpSpPr>
-      <p:sp>
-        <p:nvSpPr>
-          <p:cNvPr id="2" name="Cím 1">
-            <a:extLst>
-              <a:ext uri="{FF2B5EF4-FFF2-40B4-BE49-F238E27FC236}">
-                <a16:creationId xmlns:a16="http://schemas.microsoft.com/office/drawing/2014/main" id="{944D50DE-9756-4147-A6DF-0DE540659D5B}"/>
-              </a:ext>
-            </a:extLst>
-          </p:cNvPr>
-          <p:cNvSpPr>
-            <a:spLocks noGrp="1"/>
-          </p:cNvSpPr>
-          <p:nvPr>
-            <p:ph type="title"/>
-          </p:nvPr>
-        </p:nvSpPr>
-        <p:spPr>
-          <a:xfrm>
-            <a:off x="838200" y="365125"/>
-            <a:ext cx="11353800" cy="1325563"/>
-          </a:xfrm>
-        </p:spPr>
-        <p:txBody>
-          <a:bodyPr/>
-          <a:lstStyle/>
-          <a:p>
-            <a:r>
-              <a:rPr lang="hu-HU" b="1" dirty="0"/>
-              <a:t>Rendszeráttekintés - hardwarekövetelmények</a:t>
-            </a:r>
-          </a:p>
-        </p:txBody>
-      </p:sp>
-      <p:sp>
-        <p:nvSpPr>
-          <p:cNvPr id="3" name="Tartalom helye 2">
-            <a:extLst>
-              <a:ext uri="{FF2B5EF4-FFF2-40B4-BE49-F238E27FC236}">
-                <a16:creationId xmlns:a16="http://schemas.microsoft.com/office/drawing/2014/main" id="{327C03E9-4E2C-4846-907B-B8CE8E3F2052}"/>
-              </a:ext>
-            </a:extLst>
-          </p:cNvPr>
-          <p:cNvSpPr>
-            <a:spLocks noGrp="1"/>
-          </p:cNvSpPr>
-          <p:nvPr>
-            <p:ph idx="1"/>
-          </p:nvPr>
-        </p:nvSpPr>
-        <p:spPr>
-          <a:xfrm>
-            <a:off x="838200" y="1825625"/>
-            <a:ext cx="10961914" cy="4153144"/>
-          </a:xfrm>
-        </p:spPr>
-        <p:txBody>
-          <a:bodyPr>
-            <a:normAutofit/>
-          </a:bodyPr>
-          <a:lstStyle/>
-          <a:p>
-            <a:r>
-              <a:rPr lang="hu-HU" dirty="0"/>
-              <a:t>A weboldal általánosságban </a:t>
-            </a:r>
-            <a:r>
-              <a:rPr lang="hu-HU" b="1" dirty="0"/>
-              <a:t>nem igényel nagy számítási teljesítményt</a:t>
-            </a:r>
-            <a:r>
-              <a:rPr lang="hu-HU" dirty="0"/>
-              <a:t>​</a:t>
-            </a:r>
-          </a:p>
-          <a:p>
-            <a:r>
-              <a:rPr lang="hu-HU" b="1" dirty="0"/>
-              <a:t>Processzor:</a:t>
-            </a:r>
-            <a:r>
-              <a:rPr lang="hu-HU" dirty="0"/>
-              <a:t> Minimális követelmény: </a:t>
-            </a:r>
-            <a:r>
-              <a:rPr lang="hu-HU" b="1" dirty="0"/>
-              <a:t>1.2 GHz</a:t>
-            </a:r>
-            <a:r>
-              <a:rPr lang="hu-HU" dirty="0"/>
-              <a:t>-es egy- vagy </a:t>
-            </a:r>
-            <a:r>
-              <a:rPr lang="hu-HU" b="1" dirty="0"/>
-              <a:t>kétmagos</a:t>
-            </a:r>
-            <a:r>
-              <a:rPr lang="hu-HU" dirty="0"/>
-              <a:t> processzor​</a:t>
-            </a:r>
-          </a:p>
-          <a:p>
-            <a:pPr lvl="1"/>
-            <a:r>
-              <a:rPr lang="hu-HU" dirty="0"/>
-              <a:t>Ajánlott: </a:t>
-            </a:r>
-            <a:r>
-              <a:rPr lang="hu-HU" b="1" dirty="0"/>
-              <a:t>1.6 GHz</a:t>
-            </a:r>
-            <a:r>
-              <a:rPr lang="hu-HU" dirty="0"/>
-              <a:t> vagy gyorsabb, </a:t>
-            </a:r>
-            <a:r>
-              <a:rPr lang="hu-HU" b="1" dirty="0"/>
-              <a:t>többmagos</a:t>
-            </a:r>
-            <a:r>
-              <a:rPr lang="hu-HU" dirty="0"/>
-              <a:t> </a:t>
-            </a:r>
-            <a:r>
-              <a:rPr lang="hu-HU" b="1" dirty="0"/>
-              <a:t>CPU</a:t>
-            </a:r>
-            <a:r>
-              <a:rPr lang="hu-HU" dirty="0"/>
-              <a:t>​</a:t>
-            </a:r>
-          </a:p>
-          <a:p>
-            <a:r>
-              <a:rPr lang="hu-HU" b="1" dirty="0"/>
-              <a:t>Memória</a:t>
-            </a:r>
-            <a:r>
-              <a:rPr lang="hu-HU" dirty="0"/>
-              <a:t>: Legalább </a:t>
-            </a:r>
-            <a:r>
-              <a:rPr lang="hu-HU" b="1" dirty="0"/>
-              <a:t>4 GB RAM</a:t>
-            </a:r>
-            <a:r>
-              <a:rPr lang="hu-HU" dirty="0"/>
-              <a:t>​</a:t>
-            </a:r>
-          </a:p>
-          <a:p>
-            <a:r>
-              <a:rPr lang="hu-HU" b="1" dirty="0"/>
-              <a:t>Kijelző</a:t>
-            </a:r>
-            <a:r>
-              <a:rPr lang="hu-HU" dirty="0"/>
-              <a:t>: A weboldal </a:t>
-            </a:r>
-            <a:r>
-              <a:rPr lang="hu-HU" b="1" dirty="0"/>
-              <a:t>reszponzív</a:t>
-            </a:r>
-            <a:r>
-              <a:rPr lang="hu-HU" dirty="0"/>
-              <a:t>, így bármilyen eszközön megfelelően jelenik meg a tartalom​</a:t>
-            </a:r>
-          </a:p>
-          <a:p>
-            <a:r>
-              <a:rPr lang="hu-HU" b="1" dirty="0"/>
-              <a:t>Internetkapcsolat</a:t>
-            </a:r>
-            <a:r>
-              <a:rPr lang="hu-HU" dirty="0"/>
-              <a:t>: A weboldalnak szüksége van </a:t>
-            </a:r>
-            <a:r>
-              <a:rPr lang="hu-HU" b="1" dirty="0"/>
-              <a:t>stabil internetkapcsolat</a:t>
-            </a:r>
-            <a:r>
-              <a:rPr lang="hu-HU" dirty="0"/>
-              <a:t>ra. Minimális sebesség: </a:t>
-            </a:r>
-            <a:r>
-              <a:rPr lang="hu-HU" b="1" dirty="0"/>
-              <a:t>2-4 Mbps</a:t>
-            </a:r>
-            <a:r>
-              <a:rPr lang="hu-HU" dirty="0"/>
-              <a:t>​</a:t>
-            </a:r>
-          </a:p>
-        </p:txBody>
-      </p:sp>
-    </p:spTree>
-    <p:extLst>
-      <p:ext uri="{BB962C8B-B14F-4D97-AF65-F5344CB8AC3E}">
-        <p14:creationId xmlns:p14="http://schemas.microsoft.com/office/powerpoint/2010/main" val="3022616349"/>
-      </p:ext>
-    </p:extLst>
-  </p:cSld>
-  <p:clrMapOvr>
-    <a:masterClrMapping/>
-  </p:clrMapOvr>
-</p:sld>
-</file>
-
-<file path=ppt/slides/slide18.xml><?xml version="1.0" encoding="utf-8"?>
-<p:sld xmlns:a="http://schemas.openxmlformats.org/drawingml/2006/main" xmlns:r="http://schemas.openxmlformats.org/officeDocument/2006/relationships" xmlns:p="http://schemas.openxmlformats.org/presentationml/2006/main">
-  <p:cSld>
-    <p:spTree>
-      <p:nvGrpSpPr>
-        <p:cNvPr id="1" name=""/>
-        <p:cNvGrpSpPr/>
-        <p:nvPr/>
-      </p:nvGrpSpPr>
-      <p:grpSpPr>
-        <a:xfrm>
-          <a:off x="0" y="0"/>
-          <a:ext cx="0" cy="0"/>
-          <a:chOff x="0" y="0"/>
-          <a:chExt cx="0" cy="0"/>
-        </a:xfrm>
-      </p:grpSpPr>
-      <p:sp>
-        <p:nvSpPr>
-          <p:cNvPr id="2" name="Cím 1">
-            <a:extLst>
-              <a:ext uri="{FF2B5EF4-FFF2-40B4-BE49-F238E27FC236}">
-                <a16:creationId xmlns:a16="http://schemas.microsoft.com/office/drawing/2014/main" id="{81E021EF-A0DD-461D-B635-667CD64B0439}"/>
-              </a:ext>
-            </a:extLst>
-          </p:cNvPr>
-          <p:cNvSpPr>
-            <a:spLocks noGrp="1"/>
-          </p:cNvSpPr>
-          <p:nvPr>
-            <p:ph type="title"/>
-          </p:nvPr>
-        </p:nvSpPr>
-        <p:spPr>
-          <a:xfrm>
-            <a:off x="838200" y="365125"/>
-            <a:ext cx="10770326" cy="1325563"/>
-          </a:xfrm>
-        </p:spPr>
-        <p:txBody>
-          <a:bodyPr/>
-          <a:lstStyle/>
-          <a:p>
-            <a:r>
-              <a:rPr lang="hu-HU" b="1" dirty="0"/>
-              <a:t>Rendszeráttekintés - szoftverkövetelmények​</a:t>
-            </a:r>
-          </a:p>
-        </p:txBody>
-      </p:sp>
-      <p:sp>
-        <p:nvSpPr>
-          <p:cNvPr id="3" name="Tartalom helye 2">
-            <a:extLst>
-              <a:ext uri="{FF2B5EF4-FFF2-40B4-BE49-F238E27FC236}">
-                <a16:creationId xmlns:a16="http://schemas.microsoft.com/office/drawing/2014/main" id="{32CE4E5A-CC29-4C83-93BC-FFD438B8D423}"/>
-              </a:ext>
-            </a:extLst>
-          </p:cNvPr>
-          <p:cNvSpPr>
-            <a:spLocks noGrp="1"/>
-          </p:cNvSpPr>
-          <p:nvPr>
-            <p:ph idx="1"/>
-          </p:nvPr>
-        </p:nvSpPr>
-        <p:spPr/>
-        <p:txBody>
-          <a:bodyPr>
-            <a:normAutofit/>
-          </a:bodyPr>
-          <a:lstStyle/>
-          <a:p>
-            <a:pPr lvl="1"/>
-            <a:r>
-              <a:rPr lang="hu-HU" b="1" dirty="0"/>
-              <a:t>Operációs rendszer:</a:t>
-            </a:r>
-            <a:r>
-              <a:rPr lang="hu-HU" dirty="0"/>
-              <a:t> A weboldal a legtöbb modern platformon problémamentesen futtatható.​</a:t>
-            </a:r>
-          </a:p>
-          <a:p>
-            <a:pPr lvl="1"/>
-            <a:r>
-              <a:rPr lang="hu-HU" b="1" dirty="0"/>
-              <a:t>Támogatott rendszerek: </a:t>
-            </a:r>
-            <a:r>
-              <a:rPr lang="hu-HU" dirty="0"/>
-              <a:t>​</a:t>
-            </a:r>
-          </a:p>
-          <a:p>
-            <a:pPr lvl="2"/>
-            <a:r>
-              <a:rPr lang="hu-HU" dirty="0"/>
-              <a:t>Windows 10 minimum​</a:t>
-            </a:r>
-          </a:p>
-          <a:p>
-            <a:pPr lvl="2"/>
-            <a:r>
-              <a:rPr lang="hu-HU" dirty="0"/>
-              <a:t>Linux disztribúciók (Ubuntu, Debian)​</a:t>
-            </a:r>
-          </a:p>
-          <a:p>
-            <a:pPr lvl="2"/>
-            <a:r>
-              <a:rPr lang="hu-HU" dirty="0"/>
-              <a:t>Android 8.0/iOs 13 (vagy újabb verzió)​</a:t>
-            </a:r>
-          </a:p>
-          <a:p>
-            <a:pPr lvl="1"/>
-            <a:r>
-              <a:rPr lang="hu-HU" b="1" dirty="0"/>
-              <a:t>Böngészőkövetelmények</a:t>
-            </a:r>
-            <a:r>
-              <a:rPr lang="hu-HU" dirty="0"/>
-              <a:t>: Az oldal előnyben részesíti az olyan böngészőket, amelyek </a:t>
-            </a:r>
-            <a:r>
-              <a:rPr lang="hu-HU" b="1" dirty="0"/>
-              <a:t>gyors</a:t>
-            </a:r>
-            <a:r>
-              <a:rPr lang="hu-HU" dirty="0"/>
-              <a:t> </a:t>
-            </a:r>
-            <a:r>
-              <a:rPr lang="hu-HU" b="1" dirty="0"/>
-              <a:t>JavaScript-futtatást</a:t>
-            </a:r>
-            <a:r>
-              <a:rPr lang="hu-HU" dirty="0"/>
-              <a:t> kínálnak​</a:t>
-            </a:r>
-          </a:p>
-          <a:p>
-            <a:pPr lvl="1"/>
-            <a:r>
-              <a:rPr lang="hu-HU" b="1" dirty="0"/>
-              <a:t>Ajánlott böngészők:​</a:t>
-            </a:r>
-          </a:p>
-          <a:p>
-            <a:pPr lvl="2"/>
-            <a:r>
-              <a:rPr lang="hu-HU" dirty="0"/>
-              <a:t>Google Chrome​</a:t>
-            </a:r>
-          </a:p>
-          <a:p>
-            <a:pPr lvl="2"/>
-            <a:r>
-              <a:rPr lang="hu-HU" dirty="0"/>
-              <a:t>Mozilla Firefox​</a:t>
-            </a:r>
-          </a:p>
-          <a:p>
-            <a:pPr lvl="2"/>
-            <a:r>
-              <a:rPr lang="hu-HU" dirty="0"/>
-              <a:t>Microsoft Edge​</a:t>
-            </a:r>
-          </a:p>
-          <a:p>
-            <a:pPr lvl="1"/>
-            <a:endParaRPr lang="hu-HU" dirty="0"/>
-          </a:p>
-        </p:txBody>
-      </p:sp>
-    </p:spTree>
-    <p:extLst>
-      <p:ext uri="{BB962C8B-B14F-4D97-AF65-F5344CB8AC3E}">
-        <p14:creationId xmlns:p14="http://schemas.microsoft.com/office/powerpoint/2010/main" val="2768260902"/>
-      </p:ext>
-    </p:extLst>
-  </p:cSld>
-  <p:clrMapOvr>
-    <a:masterClrMapping/>
-  </p:clrMapOvr>
-</p:sld>
-</file>
-
-<file path=ppt/slides/slide19.xml><?xml version="1.0" encoding="utf-8"?>
-<p:sld xmlns:a="http://schemas.openxmlformats.org/drawingml/2006/main" xmlns:r="http://schemas.openxmlformats.org/officeDocument/2006/relationships" xmlns:p="http://schemas.openxmlformats.org/presentationml/2006/main">
-  <p:cSld>
-    <p:spTree>
-      <p:nvGrpSpPr>
-        <p:cNvPr id="1" name=""/>
-        <p:cNvGrpSpPr/>
-        <p:nvPr/>
-      </p:nvGrpSpPr>
-      <p:grpSpPr>
-        <a:xfrm>
-          <a:off x="0" y="0"/>
-          <a:ext cx="0" cy="0"/>
-          <a:chOff x="0" y="0"/>
-          <a:chExt cx="0" cy="0"/>
-        </a:xfrm>
-      </p:grpSpPr>
-      <p:sp>
-        <p:nvSpPr>
-          <p:cNvPr id="2" name="Cím 1">
-            <a:extLst>
-              <a:ext uri="{FF2B5EF4-FFF2-40B4-BE49-F238E27FC236}">
-                <a16:creationId xmlns:a16="http://schemas.microsoft.com/office/drawing/2014/main" id="{AF523BCB-D4DD-4A43-9673-C199A67B894E}"/>
-              </a:ext>
-            </a:extLst>
-          </p:cNvPr>
-          <p:cNvSpPr>
-            <a:spLocks noGrp="1"/>
-          </p:cNvSpPr>
-          <p:nvPr>
-            <p:ph type="title"/>
-          </p:nvPr>
-        </p:nvSpPr>
-        <p:spPr/>
-        <p:txBody>
-          <a:bodyPr/>
-          <a:lstStyle/>
-          <a:p>
-            <a:pPr algn="ctr"/>
-            <a:r>
-              <a:rPr lang="hu-HU" b="1" dirty="0"/>
-              <a:t>A weboldal elindítása</a:t>
-            </a:r>
-          </a:p>
-        </p:txBody>
-      </p:sp>
-      <p:sp>
-        <p:nvSpPr>
-          <p:cNvPr id="3" name="Tartalom helye 2">
-            <a:extLst>
-              <a:ext uri="{FF2B5EF4-FFF2-40B4-BE49-F238E27FC236}">
-                <a16:creationId xmlns:a16="http://schemas.microsoft.com/office/drawing/2014/main" id="{E56CB79F-96BE-45C1-AD00-EDA15071539E}"/>
-              </a:ext>
-            </a:extLst>
-          </p:cNvPr>
-          <p:cNvSpPr>
-            <a:spLocks noGrp="1"/>
-          </p:cNvSpPr>
-          <p:nvPr>
-            <p:ph idx="1"/>
-          </p:nvPr>
-        </p:nvSpPr>
-        <p:spPr>
-          <a:xfrm>
-            <a:off x="838200" y="1440180"/>
-            <a:ext cx="10515600" cy="4736783"/>
-          </a:xfrm>
-        </p:spPr>
-        <p:txBody>
-          <a:bodyPr>
-            <a:normAutofit fontScale="70000" lnSpcReduction="20000"/>
-          </a:bodyPr>
-          <a:lstStyle/>
-          <a:p>
-            <a:pPr marL="514350" indent="-514350">
-              <a:buFont typeface="+mj-lt"/>
-              <a:buAutoNum type="arabicPeriod"/>
-            </a:pPr>
-            <a:r>
-              <a:rPr lang="hu-HU" b="1" dirty="0"/>
-              <a:t>Internetkapcsolat</a:t>
-            </a:r>
-            <a:r>
-              <a:rPr lang="hu-HU" dirty="0"/>
-              <a:t> ellenőrzése</a:t>
-            </a:r>
-          </a:p>
-          <a:p>
-            <a:pPr marL="514350" indent="-514350">
-              <a:buFont typeface="+mj-lt"/>
-              <a:buAutoNum type="arabicPeriod"/>
-            </a:pPr>
-            <a:r>
-              <a:rPr lang="hu-HU" dirty="0"/>
-              <a:t>XAMPP elindítása: </a:t>
-            </a:r>
-          </a:p>
-          <a:p>
-            <a:pPr lvl="1"/>
-            <a:r>
-              <a:rPr lang="hu-HU" b="1" dirty="0"/>
-              <a:t>Apache, MySQL futtatása</a:t>
-            </a:r>
-          </a:p>
-          <a:p>
-            <a:pPr marL="514350" indent="-514350">
-              <a:buFont typeface="+mj-lt"/>
-              <a:buAutoNum type="arabicPeriod"/>
-            </a:pPr>
-            <a:r>
-              <a:rPr lang="hu-HU" dirty="0"/>
-              <a:t>Adatbázis </a:t>
-            </a:r>
-            <a:r>
-              <a:rPr lang="hu-HU" b="1" dirty="0"/>
-              <a:t>importálás</a:t>
-            </a:r>
-            <a:r>
-              <a:rPr lang="hu-HU" dirty="0"/>
-              <a:t>a</a:t>
-            </a:r>
-          </a:p>
-          <a:p>
-            <a:pPr marL="514350" indent="-514350">
-              <a:buFont typeface="+mj-lt"/>
-              <a:buAutoNum type="arabicPeriod"/>
-            </a:pPr>
-            <a:r>
-              <a:rPr lang="hu-HU" dirty="0"/>
-              <a:t>Projektmappa megnyitása (ajánlott: </a:t>
-            </a:r>
-            <a:r>
-              <a:rPr lang="hu-HU" b="1" dirty="0"/>
-              <a:t>Visual Studio Code</a:t>
-            </a:r>
-            <a:r>
-              <a:rPr lang="hu-HU" dirty="0"/>
-              <a:t>-ban)</a:t>
-            </a:r>
-          </a:p>
-          <a:p>
-            <a:pPr marL="514350" indent="-514350">
-              <a:buFont typeface="+mj-lt"/>
-              <a:buAutoNum type="arabicPeriod"/>
-            </a:pPr>
-            <a:r>
-              <a:rPr lang="hu-HU" b="1" dirty="0"/>
-              <a:t>Terminál</a:t>
-            </a:r>
-            <a:r>
-              <a:rPr lang="hu-HU" dirty="0"/>
-              <a:t> megnyitása</a:t>
-            </a:r>
-          </a:p>
-          <a:p>
-            <a:pPr marL="971550" lvl="1" indent="-514350">
-              <a:buFont typeface="+mj-lt"/>
-              <a:buAutoNum type="arabicPeriod"/>
-            </a:pPr>
-            <a:r>
-              <a:rPr lang="hu-HU" dirty="0"/>
-              <a:t>Szükséges verziók a futtatáshoz:</a:t>
-            </a:r>
-          </a:p>
-          <a:p>
-            <a:pPr lvl="2"/>
-            <a:r>
-              <a:rPr lang="hu-HU" b="1" dirty="0"/>
-              <a:t>Node.js v18.20.5 </a:t>
-            </a:r>
-          </a:p>
-          <a:p>
-            <a:pPr lvl="2"/>
-            <a:r>
-              <a:rPr lang="hu-HU" b="1" dirty="0"/>
-              <a:t>Npm v10.8.2</a:t>
-            </a:r>
-          </a:p>
-          <a:p>
-            <a:pPr marL="971550" lvl="1" indent="-514350">
-              <a:buFont typeface="+mj-lt"/>
-              <a:buAutoNum type="arabicPeriod"/>
-            </a:pPr>
-            <a:r>
-              <a:rPr lang="hu-HU" b="1" dirty="0"/>
-              <a:t>.env</a:t>
-            </a:r>
-            <a:r>
-              <a:rPr lang="hu-HU" dirty="0"/>
-              <a:t> fájl létrehozása a mappán belül:</a:t>
-            </a:r>
-          </a:p>
-          <a:p>
-            <a:pPr marL="1428750" lvl="2" indent="-514350">
-              <a:buFont typeface="+mj-lt"/>
-              <a:buAutoNum type="arabicPeriod"/>
-            </a:pPr>
-            <a:r>
-              <a:rPr lang="hu-HU" dirty="0"/>
-              <a:t>.env.example fájl tartalmának átmásolása</a:t>
-            </a:r>
-          </a:p>
-          <a:p>
-            <a:pPr marL="1428750" lvl="2" indent="-514350">
-              <a:buFont typeface="+mj-lt"/>
-              <a:buAutoNum type="arabicPeriod"/>
-            </a:pPr>
-            <a:r>
-              <a:rPr lang="hu-HU" dirty="0"/>
-              <a:t>Szükséges adatok megadása:</a:t>
-            </a:r>
-          </a:p>
-          <a:p>
-            <a:pPr lvl="3"/>
-            <a:r>
-              <a:rPr lang="hu-HU" dirty="0"/>
-              <a:t>DB_NAME=</a:t>
-            </a:r>
-            <a:r>
-              <a:rPr lang="hu-HU" b="1" dirty="0"/>
-              <a:t>parking</a:t>
-            </a:r>
-            <a:r>
-              <a:rPr lang="hu-HU" dirty="0"/>
-              <a:t>, DB_USER=</a:t>
-            </a:r>
-            <a:r>
-              <a:rPr lang="hu-HU" b="1" dirty="0"/>
-              <a:t>root</a:t>
-            </a:r>
-            <a:r>
-              <a:rPr lang="hu-HU" dirty="0"/>
-              <a:t>, DB_PASSWORD=</a:t>
-            </a:r>
-            <a:r>
-              <a:rPr lang="hu-HU" b="1" dirty="0"/>
-              <a:t>””</a:t>
-            </a:r>
-            <a:r>
-              <a:rPr lang="hu-HU" dirty="0"/>
-              <a:t>, DB_HOST=</a:t>
-            </a:r>
-            <a:r>
-              <a:rPr lang="hu-HU" b="1" dirty="0"/>
-              <a:t>localhost</a:t>
-            </a:r>
-            <a:r>
-              <a:rPr lang="hu-HU" dirty="0"/>
-              <a:t>, DB_DIALECT=</a:t>
-            </a:r>
-            <a:r>
-              <a:rPr lang="hu-HU" b="1" dirty="0"/>
-              <a:t>mysql</a:t>
-            </a:r>
-          </a:p>
-          <a:p>
-            <a:pPr marL="971550" lvl="1" indent="-514350">
-              <a:buFont typeface="+mj-lt"/>
-              <a:buAutoNum type="arabicPeriod"/>
-            </a:pPr>
-            <a:r>
-              <a:rPr lang="hu-HU" dirty="0"/>
-              <a:t>Parancsok megadása:</a:t>
-            </a:r>
-          </a:p>
-          <a:p>
-            <a:pPr lvl="1"/>
-            <a:r>
-              <a:rPr lang="hu-HU" dirty="0"/>
-              <a:t>Fontos, hogy a parancsokat a </a:t>
-            </a:r>
-            <a:r>
-              <a:rPr lang="hu-HU" b="1" dirty="0"/>
-              <a:t>ParKing/main </a:t>
-            </a:r>
-            <a:r>
-              <a:rPr lang="hu-HU" dirty="0"/>
-              <a:t>mappán belül kell megadni!</a:t>
-            </a:r>
-          </a:p>
-          <a:p>
-            <a:pPr lvl="2"/>
-            <a:r>
-              <a:rPr lang="hu-HU" b="1" dirty="0"/>
-              <a:t>npm update</a:t>
-            </a:r>
-          </a:p>
-          <a:p>
-            <a:pPr lvl="2"/>
-            <a:r>
-              <a:rPr lang="hu-HU" b="1" dirty="0"/>
-              <a:t>npm run setup</a:t>
-            </a:r>
-          </a:p>
-          <a:p>
-            <a:pPr lvl="2"/>
-            <a:r>
-              <a:rPr lang="hu-HU" b="1" dirty="0"/>
-              <a:t>node server.js</a:t>
-            </a:r>
-          </a:p>
-          <a:p>
-            <a:pPr marL="971550" lvl="1" indent="-514350">
-              <a:buFont typeface="+mj-lt"/>
-              <a:buAutoNum type="arabicPeriod"/>
-            </a:pPr>
-            <a:endParaRPr lang="hu-HU" dirty="0"/>
-          </a:p>
-        </p:txBody>
-      </p:sp>
-    </p:spTree>
-    <p:extLst>
-      <p:ext uri="{BB962C8B-B14F-4D97-AF65-F5344CB8AC3E}">
-        <p14:creationId xmlns:p14="http://schemas.microsoft.com/office/powerpoint/2010/main" val="4221804046"/>
-      </p:ext>
-    </p:extLst>
-  </p:cSld>
-  <p:clrMapOvr>
-    <a:masterClrMapping/>
-  </p:clrMapOvr>
-</p:sld>
-</file>
-
 <file path=ppt/slides/slide2.xml><?xml version="1.0" encoding="utf-8"?>
 <p:sld xmlns:a="http://schemas.openxmlformats.org/drawingml/2006/main" xmlns:r="http://schemas.openxmlformats.org/officeDocument/2006/relationships" xmlns:p="http://schemas.openxmlformats.org/presentationml/2006/main">
   <p:cSld>
@@ -6679,21 +4090,57 @@
           <a:lstStyle/>
           <a:p>
             <a:r>
-              <a:rPr lang="hu-HU" dirty="0"/>
+              <a:rPr lang="hu-HU" dirty="0">
+                <a:hlinkClick r:id="rId2" action="ppaction://hlinksldjump"/>
+              </a:rPr>
               <a:t>ParKing bemutatása</a:t>
             </a:r>
-          </a:p>
-          <a:p>
-            <a:r>
-              <a:rPr lang="hu-HU" dirty="0"/>
+            <a:endParaRPr lang="hu-HU" dirty="0"/>
+          </a:p>
+          <a:p>
+            <a:r>
+              <a:rPr lang="hu-HU" dirty="0">
+                <a:hlinkClick r:id="rId3" action="ppaction://hlinksldjump"/>
+              </a:rPr>
               <a:t>A projektben használt webfejlesztési technológiák</a:t>
             </a:r>
-          </a:p>
-          <a:p>
-            <a:r>
-              <a:rPr lang="hu-HU" dirty="0"/>
-              <a:t>Rendszeráttekintés</a:t>
-            </a:r>
+            <a:endParaRPr lang="hu-HU" dirty="0"/>
+          </a:p>
+          <a:p>
+            <a:r>
+              <a:rPr lang="hu-HU" dirty="0">
+                <a:hlinkClick r:id="rId4" action="ppaction://hlinksldjump"/>
+              </a:rPr>
+              <a:t>Rendszeráttekintés – hardverkövetelmények</a:t>
+            </a:r>
+            <a:endParaRPr lang="hu-HU" dirty="0"/>
+          </a:p>
+          <a:p>
+            <a:r>
+              <a:rPr lang="hu-HU" dirty="0">
+                <a:hlinkClick r:id="rId5" action="ppaction://hlinksldjump"/>
+              </a:rPr>
+              <a:t>Rendszeráttekintés - szoftverkövetelmények</a:t>
+            </a:r>
+            <a:endParaRPr lang="hu-HU" dirty="0"/>
+          </a:p>
+          <a:p>
+            <a:r>
+              <a:rPr lang="hu-HU" dirty="0">
+                <a:hlinkClick r:id="rId6" action="ppaction://hlinksldjump"/>
+              </a:rPr>
+              <a:t>A weboldal elindítása</a:t>
+            </a:r>
+            <a:endParaRPr lang="hu-HU" dirty="0"/>
+          </a:p>
+          <a:p>
+            <a:r>
+              <a:rPr lang="hu-HU" dirty="0">
+                <a:hlinkClick r:id="rId7" action="ppaction://hlinksldjump"/>
+              </a:rPr>
+              <a:t>A weboldal bemutatása</a:t>
+            </a:r>
+            <a:endParaRPr lang="hu-HU" dirty="0"/>
           </a:p>
         </p:txBody>
       </p:sp>
@@ -6701,154 +4148,6 @@
     <p:extLst>
       <p:ext uri="{BB962C8B-B14F-4D97-AF65-F5344CB8AC3E}">
         <p14:creationId xmlns:p14="http://schemas.microsoft.com/office/powerpoint/2010/main" val="2802551947"/>
-      </p:ext>
-    </p:extLst>
-  </p:cSld>
-  <p:clrMapOvr>
-    <a:masterClrMapping/>
-  </p:clrMapOvr>
-</p:sld>
-</file>
-
-<file path=ppt/slides/slide20.xml><?xml version="1.0" encoding="utf-8"?>
-<p:sld xmlns:a="http://schemas.openxmlformats.org/drawingml/2006/main" xmlns:r="http://schemas.openxmlformats.org/officeDocument/2006/relationships" xmlns:p="http://schemas.openxmlformats.org/presentationml/2006/main">
-  <p:cSld>
-    <p:spTree>
-      <p:nvGrpSpPr>
-        <p:cNvPr id="1" name=""/>
-        <p:cNvGrpSpPr/>
-        <p:nvPr/>
-      </p:nvGrpSpPr>
-      <p:grpSpPr>
-        <a:xfrm>
-          <a:off x="0" y="0"/>
-          <a:ext cx="0" cy="0"/>
-          <a:chOff x="0" y="0"/>
-          <a:chExt cx="0" cy="0"/>
-        </a:xfrm>
-      </p:grpSpPr>
-      <p:sp>
-        <p:nvSpPr>
-          <p:cNvPr id="2" name="Cím 1">
-            <a:extLst>
-              <a:ext uri="{FF2B5EF4-FFF2-40B4-BE49-F238E27FC236}">
-                <a16:creationId xmlns:a16="http://schemas.microsoft.com/office/drawing/2014/main" id="{2D5701B9-334C-48B2-8DCB-F146D1579426}"/>
-              </a:ext>
-            </a:extLst>
-          </p:cNvPr>
-          <p:cNvSpPr>
-            <a:spLocks noGrp="1"/>
-          </p:cNvSpPr>
-          <p:nvPr>
-            <p:ph type="title"/>
-          </p:nvPr>
-        </p:nvSpPr>
-        <p:spPr/>
-        <p:txBody>
-          <a:bodyPr/>
-          <a:lstStyle/>
-          <a:p>
-            <a:pPr algn="ctr"/>
-            <a:r>
-              <a:rPr lang="hu-HU" b="1" dirty="0"/>
-              <a:t>A weboldal bemutatása</a:t>
-            </a:r>
-          </a:p>
-        </p:txBody>
-      </p:sp>
-      <p:pic>
-        <p:nvPicPr>
-          <p:cNvPr id="5" name="Tartalom helye 4">
-            <a:extLst>
-              <a:ext uri="{FF2B5EF4-FFF2-40B4-BE49-F238E27FC236}">
-                <a16:creationId xmlns:a16="http://schemas.microsoft.com/office/drawing/2014/main" id="{5E975318-F171-47CA-BD46-FFB26D2FD5E0}"/>
-              </a:ext>
-            </a:extLst>
-          </p:cNvPr>
-          <p:cNvPicPr>
-            <a:picLocks noGrp="1" noChangeAspect="1"/>
-          </p:cNvPicPr>
-          <p:nvPr>
-            <p:ph idx="1"/>
-          </p:nvPr>
-        </p:nvPicPr>
-        <p:blipFill>
-          <a:blip r:embed="rId2"/>
-          <a:stretch>
-            <a:fillRect/>
-          </a:stretch>
-        </p:blipFill>
-        <p:spPr>
-          <a:xfrm>
-            <a:off x="968619" y="1514842"/>
-            <a:ext cx="5676901" cy="3193257"/>
-          </a:xfrm>
-        </p:spPr>
-      </p:pic>
-      <p:pic>
-        <p:nvPicPr>
-          <p:cNvPr id="7" name="Kép 6">
-            <a:extLst>
-              <a:ext uri="{FF2B5EF4-FFF2-40B4-BE49-F238E27FC236}">
-                <a16:creationId xmlns:a16="http://schemas.microsoft.com/office/drawing/2014/main" id="{74FBFF79-483C-48DF-AD92-FEB22EA5B2D7}"/>
-              </a:ext>
-            </a:extLst>
-          </p:cNvPr>
-          <p:cNvPicPr>
-            <a:picLocks noChangeAspect="1"/>
-          </p:cNvPicPr>
-          <p:nvPr/>
-        </p:nvPicPr>
-        <p:blipFill>
-          <a:blip r:embed="rId3"/>
-          <a:stretch>
-            <a:fillRect/>
-          </a:stretch>
-        </p:blipFill>
-        <p:spPr>
-          <a:xfrm>
-            <a:off x="3042136" y="2449940"/>
-            <a:ext cx="5676902" cy="3193258"/>
-          </a:xfrm>
-          <a:prstGeom prst="rect">
-            <a:avLst/>
-          </a:prstGeom>
-        </p:spPr>
-      </p:pic>
-      <p:pic>
-        <p:nvPicPr>
-          <p:cNvPr id="9" name="Kép 8">
-            <a:extLst>
-              <a:ext uri="{FF2B5EF4-FFF2-40B4-BE49-F238E27FC236}">
-                <a16:creationId xmlns:a16="http://schemas.microsoft.com/office/drawing/2014/main" id="{18D477BE-AD14-40F3-A5BE-E4EF28291297}"/>
-              </a:ext>
-            </a:extLst>
-          </p:cNvPr>
-          <p:cNvPicPr>
-            <a:picLocks noChangeAspect="1"/>
-          </p:cNvPicPr>
-          <p:nvPr/>
-        </p:nvPicPr>
-        <p:blipFill>
-          <a:blip r:embed="rId4"/>
-          <a:stretch>
-            <a:fillRect/>
-          </a:stretch>
-        </p:blipFill>
-        <p:spPr>
-          <a:xfrm>
-            <a:off x="5546479" y="3299617"/>
-            <a:ext cx="5676902" cy="3193258"/>
-          </a:xfrm>
-          <a:prstGeom prst="rect">
-            <a:avLst/>
-          </a:prstGeom>
-        </p:spPr>
-      </p:pic>
-    </p:spTree>
-    <p:extLst>
-      <p:ext uri="{BB962C8B-B14F-4D97-AF65-F5344CB8AC3E}">
-        <p14:creationId xmlns:p14="http://schemas.microsoft.com/office/powerpoint/2010/main" val="4264932517"/>
       </p:ext>
     </p:extLst>
   </p:cSld>
@@ -7461,7 +4760,7 @@
             <a:pPr lvl="1"/>
             <a:r>
               <a:rPr lang="hu-HU" dirty="0"/>
-              <a:t>Node Package Manager (npm)</a:t>
+              <a:t>Node Package Manager</a:t>
             </a:r>
           </a:p>
           <a:p>
@@ -7477,6 +4776,570 @@
           </a:p>
         </p:txBody>
       </p:sp>
+      <p:pic>
+        <p:nvPicPr>
+          <p:cNvPr id="6" name="Picture 2" descr="A képen Grafika, képernyőkép, szimbólum, Grafikus tervezés látható&#10;&#10;Lehet, hogy az AI által létrehozott tartalom helytelen.">
+            <a:extLst>
+              <a:ext uri="{FF2B5EF4-FFF2-40B4-BE49-F238E27FC236}">
+                <a16:creationId xmlns:a16="http://schemas.microsoft.com/office/drawing/2014/main" id="{9B7D3179-5112-4711-B066-9C07B41559E6}"/>
+              </a:ext>
+            </a:extLst>
+          </p:cNvPr>
+          <p:cNvPicPr>
+            <a:picLocks noChangeAspect="1" noChangeArrowheads="1"/>
+          </p:cNvPicPr>
+          <p:nvPr/>
+        </p:nvPicPr>
+        <p:blipFill>
+          <a:blip r:embed="rId2">
+            <a:extLst>
+              <a:ext uri="{28A0092B-C50C-407E-A947-70E740481C1C}">
+                <a14:useLocalDpi xmlns:a14="http://schemas.microsoft.com/office/drawing/2010/main" val="0"/>
+              </a:ext>
+            </a:extLst>
+          </a:blip>
+          <a:srcRect/>
+          <a:stretch>
+            <a:fillRect/>
+          </a:stretch>
+        </p:blipFill>
+        <p:spPr bwMode="auto">
+          <a:xfrm>
+            <a:off x="4127259" y="2262990"/>
+            <a:ext cx="485668" cy="485668"/>
+          </a:xfrm>
+          <a:prstGeom prst="rect">
+            <a:avLst/>
+          </a:prstGeom>
+          <a:noFill/>
+          <a:extLst>
+            <a:ext uri="{909E8E84-426E-40DD-AFC4-6F175D3DCCD1}">
+              <a14:hiddenFill xmlns:a14="http://schemas.microsoft.com/office/drawing/2010/main">
+                <a:solidFill>
+                  <a:srgbClr val="FFFFFF"/>
+                </a:solidFill>
+              </a14:hiddenFill>
+            </a:ext>
+          </a:extLst>
+        </p:spPr>
+      </p:pic>
+      <p:pic>
+        <p:nvPicPr>
+          <p:cNvPr id="7" name="Picture 2">
+            <a:extLst>
+              <a:ext uri="{FF2B5EF4-FFF2-40B4-BE49-F238E27FC236}">
+                <a16:creationId xmlns:a16="http://schemas.microsoft.com/office/drawing/2014/main" id="{E57E36E7-2575-4E4B-9486-39A131848BD6}"/>
+              </a:ext>
+            </a:extLst>
+          </p:cNvPr>
+          <p:cNvPicPr>
+            <a:picLocks noChangeAspect="1" noChangeArrowheads="1"/>
+          </p:cNvPicPr>
+          <p:nvPr/>
+        </p:nvPicPr>
+        <p:blipFill>
+          <a:blip r:embed="rId3">
+            <a:extLst>
+              <a:ext uri="{28A0092B-C50C-407E-A947-70E740481C1C}">
+                <a14:useLocalDpi xmlns:a14="http://schemas.microsoft.com/office/drawing/2010/main" val="0"/>
+              </a:ext>
+            </a:extLst>
+          </a:blip>
+          <a:srcRect/>
+          <a:stretch>
+            <a:fillRect/>
+          </a:stretch>
+        </p:blipFill>
+        <p:spPr bwMode="auto">
+          <a:xfrm>
+            <a:off x="3452816" y="2716645"/>
+            <a:ext cx="365998" cy="365998"/>
+          </a:xfrm>
+          <a:prstGeom prst="rect">
+            <a:avLst/>
+          </a:prstGeom>
+          <a:noFill/>
+          <a:extLst>
+            <a:ext uri="{909E8E84-426E-40DD-AFC4-6F175D3DCCD1}">
+              <a14:hiddenFill xmlns:a14="http://schemas.microsoft.com/office/drawing/2010/main">
+                <a:solidFill>
+                  <a:srgbClr val="FFFFFF"/>
+                </a:solidFill>
+              </a14:hiddenFill>
+            </a:ext>
+          </a:extLst>
+        </p:spPr>
+      </p:pic>
+      <p:pic>
+        <p:nvPicPr>
+          <p:cNvPr id="8" name="Picture 2" descr="HTML5 - Wikipedia">
+            <a:extLst>
+              <a:ext uri="{FF2B5EF4-FFF2-40B4-BE49-F238E27FC236}">
+                <a16:creationId xmlns:a16="http://schemas.microsoft.com/office/drawing/2014/main" id="{C71F1B9E-7E33-4E76-BBC2-D91DD8B016D4}"/>
+              </a:ext>
+            </a:extLst>
+          </p:cNvPr>
+          <p:cNvPicPr>
+            <a:picLocks noChangeAspect="1" noChangeArrowheads="1"/>
+          </p:cNvPicPr>
+          <p:nvPr/>
+        </p:nvPicPr>
+        <p:blipFill>
+          <a:blip r:embed="rId4">
+            <a:extLst>
+              <a:ext uri="{28A0092B-C50C-407E-A947-70E740481C1C}">
+                <a14:useLocalDpi xmlns:a14="http://schemas.microsoft.com/office/drawing/2010/main" val="0"/>
+              </a:ext>
+            </a:extLst>
+          </a:blip>
+          <a:srcRect/>
+          <a:stretch>
+            <a:fillRect/>
+          </a:stretch>
+        </p:blipFill>
+        <p:spPr bwMode="auto">
+          <a:xfrm>
+            <a:off x="7856645" y="2252610"/>
+            <a:ext cx="436756" cy="436756"/>
+          </a:xfrm>
+          <a:prstGeom prst="rect">
+            <a:avLst/>
+          </a:prstGeom>
+          <a:noFill/>
+          <a:extLst>
+            <a:ext uri="{909E8E84-426E-40DD-AFC4-6F175D3DCCD1}">
+              <a14:hiddenFill xmlns:a14="http://schemas.microsoft.com/office/drawing/2010/main">
+                <a:solidFill>
+                  <a:srgbClr val="FFFFFF"/>
+                </a:solidFill>
+              </a14:hiddenFill>
+            </a:ext>
+          </a:extLst>
+        </p:spPr>
+      </p:pic>
+      <p:pic>
+        <p:nvPicPr>
+          <p:cNvPr id="9" name="Picture 2">
+            <a:extLst>
+              <a:ext uri="{FF2B5EF4-FFF2-40B4-BE49-F238E27FC236}">
+                <a16:creationId xmlns:a16="http://schemas.microsoft.com/office/drawing/2014/main" id="{6ECD169C-CCAB-4CEB-AF37-9CF41904B754}"/>
+              </a:ext>
+            </a:extLst>
+          </p:cNvPr>
+          <p:cNvPicPr>
+            <a:picLocks noChangeAspect="1" noChangeArrowheads="1"/>
+          </p:cNvPicPr>
+          <p:nvPr/>
+        </p:nvPicPr>
+        <p:blipFill>
+          <a:blip r:embed="rId5">
+            <a:extLst>
+              <a:ext uri="{28A0092B-C50C-407E-A947-70E740481C1C}">
+                <a14:useLocalDpi xmlns:a14="http://schemas.microsoft.com/office/drawing/2010/main" val="0"/>
+              </a:ext>
+            </a:extLst>
+          </a:blip>
+          <a:srcRect/>
+          <a:stretch>
+            <a:fillRect/>
+          </a:stretch>
+        </p:blipFill>
+        <p:spPr bwMode="auto">
+          <a:xfrm>
+            <a:off x="7547437" y="2634205"/>
+            <a:ext cx="309208" cy="436756"/>
+          </a:xfrm>
+          <a:prstGeom prst="rect">
+            <a:avLst/>
+          </a:prstGeom>
+          <a:noFill/>
+          <a:extLst>
+            <a:ext uri="{909E8E84-426E-40DD-AFC4-6F175D3DCCD1}">
+              <a14:hiddenFill xmlns:a14="http://schemas.microsoft.com/office/drawing/2010/main">
+                <a:solidFill>
+                  <a:srgbClr val="FFFFFF"/>
+                </a:solidFill>
+              </a14:hiddenFill>
+            </a:ext>
+          </a:extLst>
+        </p:spPr>
+      </p:pic>
+      <p:pic>
+        <p:nvPicPr>
+          <p:cNvPr id="10" name="Picture 2" descr="Live Instructor-Led JavaScript Training - Hands-on Interactive Course">
+            <a:extLst>
+              <a:ext uri="{FF2B5EF4-FFF2-40B4-BE49-F238E27FC236}">
+                <a16:creationId xmlns:a16="http://schemas.microsoft.com/office/drawing/2014/main" id="{431B8E77-8BD6-46D0-B419-16BC7A6D62D9}"/>
+              </a:ext>
+            </a:extLst>
+          </p:cNvPr>
+          <p:cNvPicPr>
+            <a:picLocks noChangeAspect="1" noChangeArrowheads="1"/>
+          </p:cNvPicPr>
+          <p:nvPr/>
+        </p:nvPicPr>
+        <p:blipFill>
+          <a:blip r:embed="rId6">
+            <a:extLst>
+              <a:ext uri="{28A0092B-C50C-407E-A947-70E740481C1C}">
+                <a14:useLocalDpi xmlns:a14="http://schemas.microsoft.com/office/drawing/2010/main" val="0"/>
+              </a:ext>
+            </a:extLst>
+          </a:blip>
+          <a:srcRect/>
+          <a:stretch>
+            <a:fillRect/>
+          </a:stretch>
+        </p:blipFill>
+        <p:spPr bwMode="auto">
+          <a:xfrm>
+            <a:off x="8293401" y="3137452"/>
+            <a:ext cx="289579" cy="326390"/>
+          </a:xfrm>
+          <a:prstGeom prst="rect">
+            <a:avLst/>
+          </a:prstGeom>
+          <a:noFill/>
+          <a:extLst>
+            <a:ext uri="{909E8E84-426E-40DD-AFC4-6F175D3DCCD1}">
+              <a14:hiddenFill xmlns:a14="http://schemas.microsoft.com/office/drawing/2010/main">
+                <a:solidFill>
+                  <a:srgbClr val="FFFFFF"/>
+                </a:solidFill>
+              </a14:hiddenFill>
+            </a:ext>
+          </a:extLst>
+        </p:spPr>
+      </p:pic>
+      <p:pic>
+        <p:nvPicPr>
+          <p:cNvPr id="11" name="Picture 2" descr="The Best Way to Learn SQL - Learn to code in 30 Days!">
+            <a:extLst>
+              <a:ext uri="{FF2B5EF4-FFF2-40B4-BE49-F238E27FC236}">
+                <a16:creationId xmlns:a16="http://schemas.microsoft.com/office/drawing/2014/main" id="{1479B6AD-867D-4F03-BE2F-DC03FB6C1A60}"/>
+              </a:ext>
+            </a:extLst>
+          </p:cNvPr>
+          <p:cNvPicPr>
+            <a:picLocks noChangeAspect="1" noChangeArrowheads="1"/>
+          </p:cNvPicPr>
+          <p:nvPr/>
+        </p:nvPicPr>
+        <p:blipFill>
+          <a:blip r:embed="rId7">
+            <a:extLst>
+              <a:ext uri="{28A0092B-C50C-407E-A947-70E740481C1C}">
+                <a14:useLocalDpi xmlns:a14="http://schemas.microsoft.com/office/drawing/2010/main" val="0"/>
+              </a:ext>
+            </a:extLst>
+          </a:blip>
+          <a:srcRect/>
+          <a:stretch>
+            <a:fillRect/>
+          </a:stretch>
+        </p:blipFill>
+        <p:spPr bwMode="auto">
+          <a:xfrm>
+            <a:off x="7372321" y="3472551"/>
+            <a:ext cx="709066" cy="372259"/>
+          </a:xfrm>
+          <a:prstGeom prst="rect">
+            <a:avLst/>
+          </a:prstGeom>
+          <a:noFill/>
+          <a:extLst>
+            <a:ext uri="{909E8E84-426E-40DD-AFC4-6F175D3DCCD1}">
+              <a14:hiddenFill xmlns:a14="http://schemas.microsoft.com/office/drawing/2010/main">
+                <a:solidFill>
+                  <a:srgbClr val="FFFFFF"/>
+                </a:solidFill>
+              </a14:hiddenFill>
+            </a:ext>
+          </a:extLst>
+        </p:spPr>
+      </p:pic>
+      <p:pic>
+        <p:nvPicPr>
+          <p:cNvPr id="12" name="Picture 2" descr="A képen Betűtípus, Grafika, szimbólum, embléma látható&#10;&#10;Lehet, hogy az AI által létrehozott tartalom helytelen.">
+            <a:extLst>
+              <a:ext uri="{FF2B5EF4-FFF2-40B4-BE49-F238E27FC236}">
+                <a16:creationId xmlns:a16="http://schemas.microsoft.com/office/drawing/2014/main" id="{E442CF20-B1F8-4A1B-AF6F-69C9337A3B02}"/>
+              </a:ext>
+            </a:extLst>
+          </p:cNvPr>
+          <p:cNvPicPr>
+            <a:picLocks noChangeAspect="1" noChangeArrowheads="1"/>
+          </p:cNvPicPr>
+          <p:nvPr/>
+        </p:nvPicPr>
+        <p:blipFill>
+          <a:blip r:embed="rId8">
+            <a:extLst>
+              <a:ext uri="{28A0092B-C50C-407E-A947-70E740481C1C}">
+                <a14:useLocalDpi xmlns:a14="http://schemas.microsoft.com/office/drawing/2010/main" val="0"/>
+              </a:ext>
+            </a:extLst>
+          </a:blip>
+          <a:srcRect/>
+          <a:stretch>
+            <a:fillRect/>
+          </a:stretch>
+        </p:blipFill>
+        <p:spPr bwMode="auto">
+          <a:xfrm>
+            <a:off x="7449759" y="3810464"/>
+            <a:ext cx="487145" cy="488885"/>
+          </a:xfrm>
+          <a:prstGeom prst="rect">
+            <a:avLst/>
+          </a:prstGeom>
+          <a:noFill/>
+          <a:extLst>
+            <a:ext uri="{909E8E84-426E-40DD-AFC4-6F175D3DCCD1}">
+              <a14:hiddenFill xmlns:a14="http://schemas.microsoft.com/office/drawing/2010/main">
+                <a:solidFill>
+                  <a:srgbClr val="FFFFFF"/>
+                </a:solidFill>
+              </a14:hiddenFill>
+            </a:ext>
+          </a:extLst>
+        </p:spPr>
+      </p:pic>
+      <p:pic>
+        <p:nvPicPr>
+          <p:cNvPr id="13" name="Picture 3">
+            <a:extLst>
+              <a:ext uri="{FF2B5EF4-FFF2-40B4-BE49-F238E27FC236}">
+                <a16:creationId xmlns:a16="http://schemas.microsoft.com/office/drawing/2014/main" id="{92A03FA7-0B33-451D-B0DE-424E7753CCFA}"/>
+              </a:ext>
+            </a:extLst>
+          </p:cNvPr>
+          <p:cNvPicPr>
+            <a:picLocks noChangeAspect="1" noChangeArrowheads="1"/>
+          </p:cNvPicPr>
+          <p:nvPr/>
+        </p:nvPicPr>
+        <p:blipFill>
+          <a:blip r:embed="rId9">
+            <a:extLst>
+              <a:ext uri="{28A0092B-C50C-407E-A947-70E740481C1C}">
+                <a14:useLocalDpi xmlns:a14="http://schemas.microsoft.com/office/drawing/2010/main" val="0"/>
+              </a:ext>
+            </a:extLst>
+          </a:blip>
+          <a:srcRect/>
+          <a:stretch>
+            <a:fillRect/>
+          </a:stretch>
+        </p:blipFill>
+        <p:spPr bwMode="auto">
+          <a:xfrm>
+            <a:off x="7247299" y="4162365"/>
+            <a:ext cx="565801" cy="565801"/>
+          </a:xfrm>
+          <a:prstGeom prst="rect">
+            <a:avLst/>
+          </a:prstGeom>
+          <a:noFill/>
+          <a:extLst>
+            <a:ext uri="{909E8E84-426E-40DD-AFC4-6F175D3DCCD1}">
+              <a14:hiddenFill xmlns:a14="http://schemas.microsoft.com/office/drawing/2010/main">
+                <a:solidFill>
+                  <a:srgbClr val="FFFFFF"/>
+                </a:solidFill>
+              </a14:hiddenFill>
+            </a:ext>
+          </a:extLst>
+        </p:spPr>
+      </p:pic>
+      <p:pic>
+        <p:nvPicPr>
+          <p:cNvPr id="14" name="Picture 2" descr="A képen Grafika, szimbólum, clipart, embléma látható&#10;&#10;Lehet, hogy az AI által létrehozott tartalom helytelen.">
+            <a:extLst>
+              <a:ext uri="{FF2B5EF4-FFF2-40B4-BE49-F238E27FC236}">
+                <a16:creationId xmlns:a16="http://schemas.microsoft.com/office/drawing/2014/main" id="{14FFCA80-D6F9-4BCB-840B-98E22B43BF84}"/>
+              </a:ext>
+            </a:extLst>
+          </p:cNvPr>
+          <p:cNvPicPr>
+            <a:picLocks noChangeAspect="1" noChangeArrowheads="1"/>
+          </p:cNvPicPr>
+          <p:nvPr/>
+        </p:nvPicPr>
+        <p:blipFill>
+          <a:blip r:embed="rId10">
+            <a:extLst>
+              <a:ext uri="{28A0092B-C50C-407E-A947-70E740481C1C}">
+                <a14:useLocalDpi xmlns:a14="http://schemas.microsoft.com/office/drawing/2010/main" val="0"/>
+              </a:ext>
+            </a:extLst>
+          </a:blip>
+          <a:srcRect/>
+          <a:stretch>
+            <a:fillRect/>
+          </a:stretch>
+        </p:blipFill>
+        <p:spPr bwMode="auto">
+          <a:xfrm>
+            <a:off x="2758103" y="3846241"/>
+            <a:ext cx="486486" cy="491054"/>
+          </a:xfrm>
+          <a:prstGeom prst="rect">
+            <a:avLst/>
+          </a:prstGeom>
+          <a:noFill/>
+          <a:extLst>
+            <a:ext uri="{909E8E84-426E-40DD-AFC4-6F175D3DCCD1}">
+              <a14:hiddenFill xmlns:a14="http://schemas.microsoft.com/office/drawing/2010/main">
+                <a:solidFill>
+                  <a:srgbClr val="FFFFFF"/>
+                </a:solidFill>
+              </a14:hiddenFill>
+            </a:ext>
+          </a:extLst>
+        </p:spPr>
+      </p:pic>
+      <p:pic>
+        <p:nvPicPr>
+          <p:cNvPr id="15" name="Picture 4" descr="A képen Grafika, Betűtípus, embléma, Grafikus tervezés látható&#10;&#10;Lehet, hogy az AI által létrehozott tartalom helytelen.">
+            <a:extLst>
+              <a:ext uri="{FF2B5EF4-FFF2-40B4-BE49-F238E27FC236}">
+                <a16:creationId xmlns:a16="http://schemas.microsoft.com/office/drawing/2014/main" id="{075C5926-C733-4DD0-9FF8-9F4F4E1B972E}"/>
+              </a:ext>
+            </a:extLst>
+          </p:cNvPr>
+          <p:cNvPicPr>
+            <a:picLocks noChangeAspect="1" noChangeArrowheads="1"/>
+          </p:cNvPicPr>
+          <p:nvPr/>
+        </p:nvPicPr>
+        <p:blipFill>
+          <a:blip r:embed="rId11">
+            <a:extLst>
+              <a:ext uri="{28A0092B-C50C-407E-A947-70E740481C1C}">
+                <a14:useLocalDpi xmlns:a14="http://schemas.microsoft.com/office/drawing/2010/main" val="0"/>
+              </a:ext>
+            </a:extLst>
+          </a:blip>
+          <a:srcRect/>
+          <a:stretch>
+            <a:fillRect/>
+          </a:stretch>
+        </p:blipFill>
+        <p:spPr bwMode="auto">
+          <a:xfrm>
+            <a:off x="2631500" y="4112021"/>
+            <a:ext cx="713798" cy="713798"/>
+          </a:xfrm>
+          <a:prstGeom prst="rect">
+            <a:avLst/>
+          </a:prstGeom>
+          <a:noFill/>
+          <a:extLst>
+            <a:ext uri="{909E8E84-426E-40DD-AFC4-6F175D3DCCD1}">
+              <a14:hiddenFill xmlns:a14="http://schemas.microsoft.com/office/drawing/2010/main">
+                <a:solidFill>
+                  <a:srgbClr val="FFFFFF"/>
+                </a:solidFill>
+              </a14:hiddenFill>
+            </a:ext>
+          </a:extLst>
+        </p:spPr>
+      </p:pic>
+      <p:pic>
+        <p:nvPicPr>
+          <p:cNvPr id="16" name="Picture 2" descr="A képen Betűtípus, Grafika, embléma, tervezés látható&#10;&#10;Lehet, hogy az AI által létrehozott tartalom helytelen.">
+            <a:extLst>
+              <a:ext uri="{FF2B5EF4-FFF2-40B4-BE49-F238E27FC236}">
+                <a16:creationId xmlns:a16="http://schemas.microsoft.com/office/drawing/2014/main" id="{308771A7-7F15-4CC9-BB9E-5C110B92BD68}"/>
+              </a:ext>
+            </a:extLst>
+          </p:cNvPr>
+          <p:cNvPicPr>
+            <a:picLocks noChangeAspect="1" noChangeArrowheads="1"/>
+          </p:cNvPicPr>
+          <p:nvPr/>
+        </p:nvPicPr>
+        <p:blipFill>
+          <a:blip r:embed="rId12">
+            <a:extLst>
+              <a:ext uri="{28A0092B-C50C-407E-A947-70E740481C1C}">
+                <a14:useLocalDpi xmlns:a14="http://schemas.microsoft.com/office/drawing/2010/main" val="0"/>
+              </a:ext>
+            </a:extLst>
+          </a:blip>
+          <a:srcRect/>
+          <a:stretch>
+            <a:fillRect/>
+          </a:stretch>
+        </p:blipFill>
+        <p:spPr bwMode="auto">
+          <a:xfrm>
+            <a:off x="4578091" y="4637261"/>
+            <a:ext cx="548640" cy="548640"/>
+          </a:xfrm>
+          <a:prstGeom prst="rect">
+            <a:avLst/>
+          </a:prstGeom>
+          <a:noFill/>
+          <a:extLst>
+            <a:ext uri="{909E8E84-426E-40DD-AFC4-6F175D3DCCD1}">
+              <a14:hiddenFill xmlns:a14="http://schemas.microsoft.com/office/drawing/2010/main">
+                <a:solidFill>
+                  <a:srgbClr val="FFFFFF"/>
+                </a:solidFill>
+              </a14:hiddenFill>
+            </a:ext>
+          </a:extLst>
+        </p:spPr>
+      </p:pic>
+      <p:pic>
+        <p:nvPicPr>
+          <p:cNvPr id="17" name="Picture 2" descr="A képen képernyőkép, Grafika, tervezés látható&#10;&#10;Lehet, hogy az AI által létrehozott tartalom helytelen.">
+            <a:extLst>
+              <a:ext uri="{FF2B5EF4-FFF2-40B4-BE49-F238E27FC236}">
+                <a16:creationId xmlns:a16="http://schemas.microsoft.com/office/drawing/2014/main" id="{70FDB678-6AEA-403B-9193-72A0EC5957CE}"/>
+              </a:ext>
+            </a:extLst>
+          </p:cNvPr>
+          <p:cNvPicPr>
+            <a:picLocks noChangeAspect="1" noChangeArrowheads="1"/>
+          </p:cNvPicPr>
+          <p:nvPr/>
+        </p:nvPicPr>
+        <p:blipFill>
+          <a:blip r:embed="rId13">
+            <a:extLst>
+              <a:ext uri="{28A0092B-C50C-407E-A947-70E740481C1C}">
+                <a14:useLocalDpi xmlns:a14="http://schemas.microsoft.com/office/drawing/2010/main" val="0"/>
+              </a:ext>
+            </a:extLst>
+          </a:blip>
+          <a:srcRect/>
+          <a:stretch>
+            <a:fillRect/>
+          </a:stretch>
+        </p:blipFill>
+        <p:spPr bwMode="auto">
+          <a:xfrm>
+            <a:off x="2636200" y="5073740"/>
+            <a:ext cx="655420" cy="470558"/>
+          </a:xfrm>
+          <a:prstGeom prst="rect">
+            <a:avLst/>
+          </a:prstGeom>
+          <a:noFill/>
+          <a:extLst>
+            <a:ext uri="{909E8E84-426E-40DD-AFC4-6F175D3DCCD1}">
+              <a14:hiddenFill xmlns:a14="http://schemas.microsoft.com/office/drawing/2010/main">
+                <a:solidFill>
+                  <a:srgbClr val="FFFFFF"/>
+                </a:solidFill>
+              </a14:hiddenFill>
+            </a:ext>
+          </a:extLst>
+        </p:spPr>
+      </p:pic>
     </p:spTree>
     <p:extLst>
       <p:ext uri="{BB962C8B-B14F-4D97-AF65-F5344CB8AC3E}">
@@ -7512,7 +5375,7 @@
           <p:cNvPr id="2" name="Cím 1">
             <a:extLst>
               <a:ext uri="{FF2B5EF4-FFF2-40B4-BE49-F238E27FC236}">
-                <a16:creationId xmlns:a16="http://schemas.microsoft.com/office/drawing/2014/main" id="{276671AA-82B3-4D47-8770-4A1A72DE7207}"/>
+                <a16:creationId xmlns:a16="http://schemas.microsoft.com/office/drawing/2014/main" id="{944D50DE-9756-4147-A6DF-0DE540659D5B}"/>
               </a:ext>
             </a:extLst>
           </p:cNvPr>
@@ -7523,15 +5386,19 @@
             <p:ph type="title"/>
           </p:nvPr>
         </p:nvSpPr>
-        <p:spPr/>
+        <p:spPr>
+          <a:xfrm>
+            <a:off x="838200" y="365125"/>
+            <a:ext cx="11353800" cy="1325563"/>
+          </a:xfrm>
+        </p:spPr>
         <p:txBody>
           <a:bodyPr/>
           <a:lstStyle/>
           <a:p>
-            <a:pPr algn="ctr"/>
             <a:r>
               <a:rPr lang="hu-HU" b="1" dirty="0"/>
-              <a:t>Visual Studio Code</a:t>
+              <a:t>Rendszeráttekintés - hardverkövetelmények</a:t>
             </a:r>
           </a:p>
         </p:txBody>
@@ -7541,140 +5408,167 @@
           <p:cNvPr id="3" name="Tartalom helye 2">
             <a:extLst>
               <a:ext uri="{FF2B5EF4-FFF2-40B4-BE49-F238E27FC236}">
-                <a16:creationId xmlns:a16="http://schemas.microsoft.com/office/drawing/2014/main" id="{832EB196-65E0-445A-9403-9E52C7D63A6A}"/>
-              </a:ext>
-            </a:extLst>
-          </p:cNvPr>
-          <p:cNvSpPr>
-            <a:spLocks noGrp="1"/>
-          </p:cNvSpPr>
-          <p:nvPr>
-            <p:ph sz="half" idx="1"/>
+                <a16:creationId xmlns:a16="http://schemas.microsoft.com/office/drawing/2014/main" id="{327C03E9-4E2C-4846-907B-B8CE8E3F2052}"/>
+              </a:ext>
+            </a:extLst>
+          </p:cNvPr>
+          <p:cNvSpPr>
+            <a:spLocks noGrp="1"/>
+          </p:cNvSpPr>
+          <p:nvPr>
+            <p:ph idx="1"/>
           </p:nvPr>
         </p:nvSpPr>
         <p:spPr>
           <a:xfrm>
-            <a:off x="838199" y="1825625"/>
-            <a:ext cx="6189617" cy="3546475"/>
+            <a:off x="838200" y="1825625"/>
+            <a:ext cx="10961914" cy="4153144"/>
           </a:xfrm>
         </p:spPr>
         <p:txBody>
-          <a:bodyPr/>
+          <a:bodyPr>
+            <a:normAutofit/>
+          </a:bodyPr>
           <a:lstStyle/>
           <a:p>
             <a:r>
               <a:rPr lang="hu-HU" dirty="0"/>
-              <a:t>A </a:t>
+              <a:t>A weboldal általánosságban </a:t>
             </a:r>
             <a:r>
               <a:rPr lang="hu-HU" b="1" dirty="0"/>
-              <a:t>Visual Studio Code</a:t>
-            </a:r>
-            <a:r>
-              <a:rPr lang="hu-HU" dirty="0"/>
-              <a:t> egy ingyenes, nyílt forráskódú fejlesztői környezet</a:t>
-            </a:r>
-          </a:p>
-          <a:p>
-            <a:r>
-              <a:rPr lang="hu-HU" dirty="0"/>
-              <a:t>Széles körben használják különböző </a:t>
-            </a:r>
+              <a:t>nem igényel nagy számítási teljesítményt</a:t>
+            </a:r>
+            <a:r>
+              <a:rPr lang="hu-HU" dirty="0"/>
+              <a:t>​</a:t>
+            </a:r>
+          </a:p>
+          <a:p>
             <a:r>
               <a:rPr lang="hu-HU" b="1" dirty="0"/>
-              <a:t>programozási nyelvekhez</a:t>
-            </a:r>
-            <a:r>
-              <a:rPr lang="hu-HU" dirty="0"/>
-              <a:t>, például </a:t>
+              <a:t>Processzor:</a:t>
+            </a:r>
+            <a:r>
+              <a:rPr lang="hu-HU" dirty="0"/>
+              <a:t> Minimális követelmény: </a:t>
             </a:r>
             <a:r>
               <a:rPr lang="hu-HU" b="1" dirty="0"/>
-              <a:t>Python, JavaScript, C++, PHP</a:t>
-            </a:r>
-            <a:r>
-              <a:rPr lang="hu-HU" dirty="0"/>
-              <a:t> és </a:t>
+              <a:t>1.2 GHz</a:t>
+            </a:r>
+            <a:r>
+              <a:rPr lang="hu-HU" dirty="0"/>
+              <a:t>-es egy- vagy </a:t>
             </a:r>
             <a:r>
               <a:rPr lang="hu-HU" b="1" dirty="0"/>
-              <a:t>HTML/CSS </a:t>
-            </a:r>
-            <a:r>
-              <a:rPr lang="hu-HU" dirty="0"/>
-              <a:t>fejlesztéséhez</a:t>
-            </a:r>
-          </a:p>
-          <a:p>
-            <a:r>
-              <a:rPr lang="hu-HU" dirty="0"/>
-              <a:t>Egyszerű kezelőfelület</a:t>
-            </a:r>
-          </a:p>
-          <a:p>
-            <a:r>
-              <a:rPr lang="hu-HU" dirty="0"/>
-              <a:t>Beépített terminál</a:t>
-            </a:r>
-          </a:p>
-          <a:p>
-            <a:endParaRPr lang="hu-HU" dirty="0"/>
-          </a:p>
-        </p:txBody>
-      </p:sp>
-      <p:pic>
-        <p:nvPicPr>
-          <p:cNvPr id="5122" name="Picture 2" descr="A képen Grafika, képernyőkép, szimbólum, Grafikus tervezés látható&#10;&#10;Lehet, hogy az AI által létrehozott tartalom helytelen.">
-            <a:extLst>
-              <a:ext uri="{FF2B5EF4-FFF2-40B4-BE49-F238E27FC236}">
-                <a16:creationId xmlns:a16="http://schemas.microsoft.com/office/drawing/2014/main" id="{E4194B34-95C7-40C0-9C4E-C82D70EEF370}"/>
-              </a:ext>
-            </a:extLst>
-          </p:cNvPr>
-          <p:cNvPicPr>
-            <a:picLocks noGrp="1" noChangeAspect="1" noChangeArrowheads="1"/>
-          </p:cNvPicPr>
-          <p:nvPr>
-            <p:ph sz="half" idx="2"/>
-          </p:nvPr>
-        </p:nvPicPr>
-        <p:blipFill>
-          <a:blip r:embed="rId2">
-            <a:extLst>
-              <a:ext uri="{28A0092B-C50C-407E-A947-70E740481C1C}">
-                <a14:useLocalDpi xmlns:a14="http://schemas.microsoft.com/office/drawing/2010/main" val="0"/>
-              </a:ext>
-            </a:extLst>
-          </a:blip>
-          <a:srcRect/>
-          <a:stretch>
-            <a:fillRect/>
-          </a:stretch>
-        </p:blipFill>
-        <p:spPr bwMode="auto">
-          <a:xfrm>
-            <a:off x="7577248" y="2113018"/>
-            <a:ext cx="3776552" cy="3776552"/>
-          </a:xfrm>
-          <a:prstGeom prst="rect">
-            <a:avLst/>
-          </a:prstGeom>
-          <a:noFill/>
-          <a:extLst>
-            <a:ext uri="{909E8E84-426E-40DD-AFC4-6F175D3DCCD1}">
-              <a14:hiddenFill xmlns:a14="http://schemas.microsoft.com/office/drawing/2010/main">
-                <a:solidFill>
-                  <a:srgbClr val="FFFFFF"/>
-                </a:solidFill>
-              </a14:hiddenFill>
-            </a:ext>
-          </a:extLst>
-        </p:spPr>
-      </p:pic>
+              <a:t>kétmagos</a:t>
+            </a:r>
+            <a:r>
+              <a:rPr lang="hu-HU" dirty="0"/>
+              <a:t> processzor​</a:t>
+            </a:r>
+          </a:p>
+          <a:p>
+            <a:pPr lvl="1"/>
+            <a:r>
+              <a:rPr lang="hu-HU" dirty="0"/>
+              <a:t>Ajánlott: </a:t>
+            </a:r>
+            <a:r>
+              <a:rPr lang="hu-HU" b="1" dirty="0"/>
+              <a:t>1.6 GHz</a:t>
+            </a:r>
+            <a:r>
+              <a:rPr lang="hu-HU" dirty="0"/>
+              <a:t> vagy gyorsabb, </a:t>
+            </a:r>
+            <a:r>
+              <a:rPr lang="hu-HU" b="1" dirty="0"/>
+              <a:t>többmagos</a:t>
+            </a:r>
+            <a:r>
+              <a:rPr lang="hu-HU" dirty="0"/>
+              <a:t> </a:t>
+            </a:r>
+            <a:r>
+              <a:rPr lang="hu-HU" b="1" dirty="0"/>
+              <a:t>CPU</a:t>
+            </a:r>
+            <a:r>
+              <a:rPr lang="hu-HU" dirty="0"/>
+              <a:t>​</a:t>
+            </a:r>
+          </a:p>
+          <a:p>
+            <a:r>
+              <a:rPr lang="hu-HU" b="1" dirty="0"/>
+              <a:t>Memória</a:t>
+            </a:r>
+            <a:r>
+              <a:rPr lang="hu-HU" dirty="0"/>
+              <a:t>: Legalább </a:t>
+            </a:r>
+            <a:r>
+              <a:rPr lang="hu-HU" b="1" dirty="0"/>
+              <a:t>4 GB RAM</a:t>
+            </a:r>
+            <a:r>
+              <a:rPr lang="hu-HU" dirty="0"/>
+              <a:t>​</a:t>
+            </a:r>
+          </a:p>
+          <a:p>
+            <a:r>
+              <a:rPr lang="hu-HU" b="1" dirty="0"/>
+              <a:t>Kijelző</a:t>
+            </a:r>
+            <a:r>
+              <a:rPr lang="hu-HU" dirty="0"/>
+              <a:t>: A weboldal </a:t>
+            </a:r>
+            <a:r>
+              <a:rPr lang="hu-HU" b="1" dirty="0"/>
+              <a:t>reszponzív</a:t>
+            </a:r>
+            <a:r>
+              <a:rPr lang="hu-HU" dirty="0"/>
+              <a:t>, így bármilyen eszközön megfelelően jelenik meg a tartalom​</a:t>
+            </a:r>
+          </a:p>
+          <a:p>
+            <a:r>
+              <a:rPr lang="hu-HU" b="1" dirty="0"/>
+              <a:t>Internetkapcsolat</a:t>
+            </a:r>
+            <a:r>
+              <a:rPr lang="hu-HU" dirty="0"/>
+              <a:t>: A weboldalnak szüksége van </a:t>
+            </a:r>
+            <a:r>
+              <a:rPr lang="hu-HU" b="1" dirty="0"/>
+              <a:t>stabil internetkapcsolat</a:t>
+            </a:r>
+            <a:r>
+              <a:rPr lang="hu-HU" dirty="0"/>
+              <a:t>ra. Minimális sebesség: </a:t>
+            </a:r>
+            <a:r>
+              <a:rPr lang="hu-HU" b="1" dirty="0"/>
+              <a:t>2-4 Mbps</a:t>
+            </a:r>
+            <a:r>
+              <a:rPr lang="hu-HU" dirty="0"/>
+              <a:t>​</a:t>
+            </a:r>
+          </a:p>
+        </p:txBody>
+      </p:sp>
     </p:spTree>
     <p:extLst>
       <p:ext uri="{BB962C8B-B14F-4D97-AF65-F5344CB8AC3E}">
-        <p14:creationId xmlns:p14="http://schemas.microsoft.com/office/powerpoint/2010/main" val="2550344881"/>
+        <p14:creationId xmlns:p14="http://schemas.microsoft.com/office/powerpoint/2010/main" val="3022616349"/>
       </p:ext>
     </p:extLst>
   </p:cSld>
@@ -7706,7 +5600,7 @@
           <p:cNvPr id="2" name="Cím 1">
             <a:extLst>
               <a:ext uri="{FF2B5EF4-FFF2-40B4-BE49-F238E27FC236}">
-                <a16:creationId xmlns:a16="http://schemas.microsoft.com/office/drawing/2014/main" id="{40471ADF-8549-4C8D-A71F-2F7E91D7D1D8}"/>
+                <a16:creationId xmlns:a16="http://schemas.microsoft.com/office/drawing/2014/main" id="{81E021EF-A0DD-461D-B635-667CD64B0439}"/>
               </a:ext>
             </a:extLst>
           </p:cNvPr>
@@ -7717,15 +5611,19 @@
             <p:ph type="title"/>
           </p:nvPr>
         </p:nvSpPr>
-        <p:spPr/>
+        <p:spPr>
+          <a:xfrm>
+            <a:off x="838200" y="365125"/>
+            <a:ext cx="10770326" cy="1325563"/>
+          </a:xfrm>
+        </p:spPr>
         <p:txBody>
           <a:bodyPr/>
           <a:lstStyle/>
           <a:p>
-            <a:pPr algn="ctr"/>
             <a:r>
               <a:rPr lang="hu-HU" b="1" dirty="0"/>
-              <a:t>Visual Studio</a:t>
+              <a:t>Rendszeráttekintés - szoftverkövetelmények​</a:t>
             </a:r>
           </a:p>
         </p:txBody>
@@ -7735,134 +5633,131 @@
           <p:cNvPr id="3" name="Tartalom helye 2">
             <a:extLst>
               <a:ext uri="{FF2B5EF4-FFF2-40B4-BE49-F238E27FC236}">
-                <a16:creationId xmlns:a16="http://schemas.microsoft.com/office/drawing/2014/main" id="{5FE79256-A273-4A4E-B5DB-79C075BD6FA4}"/>
-              </a:ext>
-            </a:extLst>
-          </p:cNvPr>
-          <p:cNvSpPr>
-            <a:spLocks noGrp="1"/>
-          </p:cNvSpPr>
-          <p:nvPr>
-            <p:ph sz="half" idx="1"/>
-          </p:nvPr>
-        </p:nvSpPr>
-        <p:spPr>
-          <a:xfrm>
-            <a:off x="838199" y="1825625"/>
-            <a:ext cx="5923085" cy="3722321"/>
-          </a:xfrm>
-        </p:spPr>
-        <p:txBody>
-          <a:bodyPr/>
+                <a16:creationId xmlns:a16="http://schemas.microsoft.com/office/drawing/2014/main" id="{32CE4E5A-CC29-4C83-93BC-FFD438B8D423}"/>
+              </a:ext>
+            </a:extLst>
+          </p:cNvPr>
+          <p:cNvSpPr>
+            <a:spLocks noGrp="1"/>
+          </p:cNvSpPr>
+          <p:nvPr>
+            <p:ph idx="1"/>
+          </p:nvPr>
+        </p:nvSpPr>
+        <p:spPr/>
+        <p:txBody>
+          <a:bodyPr>
+            <a:normAutofit/>
+          </a:bodyPr>
           <a:lstStyle/>
           <a:p>
-            <a:r>
-              <a:rPr lang="hu-HU" dirty="0"/>
-              <a:t>Programozáshoz használt </a:t>
-            </a:r>
+            <a:pPr lvl="1"/>
             <a:r>
               <a:rPr lang="hu-HU" b="1" dirty="0"/>
-              <a:t>fejlesztői környezet </a:t>
-            </a:r>
-            <a:r>
-              <a:rPr lang="hu-HU" dirty="0"/>
-              <a:t>(</a:t>
-            </a:r>
+              <a:t>Operációs rendszer:</a:t>
+            </a:r>
+            <a:r>
+              <a:rPr lang="hu-HU" dirty="0"/>
+              <a:t> A weboldal a legtöbb modern platformon problémamentesen futtatható.​</a:t>
+            </a:r>
+          </a:p>
+          <a:p>
+            <a:pPr lvl="1"/>
             <a:r>
               <a:rPr lang="hu-HU" b="1" dirty="0"/>
-              <a:t>IDE</a:t>
-            </a:r>
-            <a:r>
-              <a:rPr lang="hu-HU" dirty="0"/>
-              <a:t>)</a:t>
-            </a:r>
-          </a:p>
-          <a:p>
-            <a:r>
-              <a:rPr lang="hu-HU" dirty="0"/>
-              <a:t>Asztali alkalmazások fejlesztése</a:t>
-            </a:r>
-          </a:p>
-          <a:p>
-            <a:r>
-              <a:rPr lang="hu-HU" dirty="0"/>
-              <a:t>Leginkább használt programozási nyelvek:</a:t>
+              <a:t>Támogatott rendszerek: </a:t>
+            </a:r>
+            <a:r>
+              <a:rPr lang="hu-HU" dirty="0"/>
+              <a:t>​</a:t>
+            </a:r>
+          </a:p>
+          <a:p>
+            <a:pPr lvl="2"/>
+            <a:r>
+              <a:rPr lang="hu-HU" dirty="0"/>
+              <a:t>Windows 10 minimum​</a:t>
+            </a:r>
+          </a:p>
+          <a:p>
+            <a:pPr lvl="2"/>
+            <a:r>
+              <a:rPr lang="hu-HU" dirty="0"/>
+              <a:t>Linux disztribúciók (Ubuntu, Debian)​</a:t>
+            </a:r>
+          </a:p>
+          <a:p>
+            <a:pPr lvl="2"/>
+            <a:r>
+              <a:rPr lang="hu-HU" dirty="0"/>
+              <a:t>Android 8.0/iOs 13 (vagy újabb verzió)​</a:t>
             </a:r>
           </a:p>
           <a:p>
             <a:pPr lvl="1"/>
             <a:r>
               <a:rPr lang="hu-HU" b="1" dirty="0"/>
-              <a:t>C#, .NET, C++</a:t>
-            </a:r>
-          </a:p>
-          <a:p>
-            <a:r>
-              <a:rPr lang="hu-HU" dirty="0"/>
-              <a:t> Hibakeresés</a:t>
-            </a:r>
-          </a:p>
-          <a:p>
-            <a:r>
-              <a:rPr lang="hu-HU" dirty="0"/>
-              <a:t>Beépített terminál</a:t>
-            </a:r>
-          </a:p>
-        </p:txBody>
-      </p:sp>
-      <p:pic>
-        <p:nvPicPr>
-          <p:cNvPr id="1026" name="Picture 2">
-            <a:extLst>
-              <a:ext uri="{FF2B5EF4-FFF2-40B4-BE49-F238E27FC236}">
-                <a16:creationId xmlns:a16="http://schemas.microsoft.com/office/drawing/2014/main" id="{4C8A921B-EF72-47FF-B6B0-522E88EC4A02}"/>
-              </a:ext>
-            </a:extLst>
-          </p:cNvPr>
-          <p:cNvPicPr>
-            <a:picLocks noGrp="1" noChangeAspect="1" noChangeArrowheads="1"/>
-          </p:cNvPicPr>
-          <p:nvPr>
-            <p:ph sz="half" idx="2"/>
-          </p:nvPr>
-        </p:nvPicPr>
-        <p:blipFill>
-          <a:blip r:embed="rId2">
-            <a:extLst>
-              <a:ext uri="{28A0092B-C50C-407E-A947-70E740481C1C}">
-                <a14:useLocalDpi xmlns:a14="http://schemas.microsoft.com/office/drawing/2010/main" val="0"/>
-              </a:ext>
-            </a:extLst>
-          </a:blip>
-          <a:srcRect/>
-          <a:stretch>
-            <a:fillRect/>
-          </a:stretch>
-        </p:blipFill>
-        <p:spPr bwMode="auto">
-          <a:xfrm>
-            <a:off x="8104370" y="2444901"/>
-            <a:ext cx="2763655" cy="2763655"/>
-          </a:xfrm>
-          <a:prstGeom prst="rect">
-            <a:avLst/>
-          </a:prstGeom>
-          <a:noFill/>
-          <a:extLst>
-            <a:ext uri="{909E8E84-426E-40DD-AFC4-6F175D3DCCD1}">
-              <a14:hiddenFill xmlns:a14="http://schemas.microsoft.com/office/drawing/2010/main">
-                <a:solidFill>
-                  <a:srgbClr val="FFFFFF"/>
-                </a:solidFill>
-              </a14:hiddenFill>
-            </a:ext>
-          </a:extLst>
-        </p:spPr>
-      </p:pic>
+              <a:t>Böngészőkövetelmények</a:t>
+            </a:r>
+            <a:r>
+              <a:rPr lang="hu-HU" dirty="0"/>
+              <a:t>: Az oldal előnyben részesíti az olyan böngészőket, amelyek </a:t>
+            </a:r>
+            <a:r>
+              <a:rPr lang="hu-HU" b="1" dirty="0"/>
+              <a:t>gyors</a:t>
+            </a:r>
+            <a:r>
+              <a:rPr lang="hu-HU" dirty="0"/>
+              <a:t> </a:t>
+            </a:r>
+            <a:r>
+              <a:rPr lang="hu-HU" b="1" dirty="0"/>
+              <a:t>JavaScript-futtatást</a:t>
+            </a:r>
+            <a:r>
+              <a:rPr lang="hu-HU" dirty="0"/>
+              <a:t> kínálnak​</a:t>
+            </a:r>
+          </a:p>
+          <a:p>
+            <a:pPr lvl="1"/>
+            <a:r>
+              <a:rPr lang="hu-HU" b="1" dirty="0"/>
+              <a:t>Ajánlott böngészők:​</a:t>
+            </a:r>
+          </a:p>
+          <a:p>
+            <a:pPr lvl="2"/>
+            <a:r>
+              <a:rPr lang="hu-HU" dirty="0"/>
+              <a:t>Google Chrome​</a:t>
+            </a:r>
+          </a:p>
+          <a:p>
+            <a:pPr lvl="2"/>
+            <a:r>
+              <a:rPr lang="hu-HU" dirty="0"/>
+              <a:t>Mozilla Firefox​</a:t>
+            </a:r>
+          </a:p>
+          <a:p>
+            <a:pPr lvl="2"/>
+            <a:r>
+              <a:rPr lang="hu-HU" dirty="0"/>
+              <a:t>Microsoft Edge​</a:t>
+            </a:r>
+          </a:p>
+          <a:p>
+            <a:pPr lvl="1"/>
+            <a:endParaRPr lang="hu-HU" dirty="0"/>
+          </a:p>
+        </p:txBody>
+      </p:sp>
     </p:spTree>
     <p:extLst>
       <p:ext uri="{BB962C8B-B14F-4D97-AF65-F5344CB8AC3E}">
-        <p14:creationId xmlns:p14="http://schemas.microsoft.com/office/powerpoint/2010/main" val="4120614296"/>
+        <p14:creationId xmlns:p14="http://schemas.microsoft.com/office/powerpoint/2010/main" val="2768260902"/>
       </p:ext>
     </p:extLst>
   </p:cSld>
@@ -7894,7 +5789,7 @@
           <p:cNvPr id="2" name="Cím 1">
             <a:extLst>
               <a:ext uri="{FF2B5EF4-FFF2-40B4-BE49-F238E27FC236}">
-                <a16:creationId xmlns:a16="http://schemas.microsoft.com/office/drawing/2014/main" id="{C8C8D12D-6C90-4E0A-A623-F709589B7D29}"/>
+                <a16:creationId xmlns:a16="http://schemas.microsoft.com/office/drawing/2014/main" id="{AF523BCB-D4DD-4A43-9673-C199A67B894E}"/>
               </a:ext>
             </a:extLst>
           </p:cNvPr>
@@ -7913,7 +5808,7 @@
             <a:pPr algn="ctr"/>
             <a:r>
               <a:rPr lang="hu-HU" b="1" dirty="0"/>
-              <a:t>HTML</a:t>
+              <a:t>A weboldal elindítása</a:t>
             </a:r>
           </a:p>
         </p:txBody>
@@ -7923,148 +5818,269 @@
           <p:cNvPr id="3" name="Tartalom helye 2">
             <a:extLst>
               <a:ext uri="{FF2B5EF4-FFF2-40B4-BE49-F238E27FC236}">
-                <a16:creationId xmlns:a16="http://schemas.microsoft.com/office/drawing/2014/main" id="{1A990279-5021-463C-8D5A-8DECE415F467}"/>
-              </a:ext>
-            </a:extLst>
-          </p:cNvPr>
-          <p:cNvSpPr>
-            <a:spLocks noGrp="1"/>
-          </p:cNvSpPr>
-          <p:nvPr>
-            <p:ph sz="half" idx="1"/>
+                <a16:creationId xmlns:a16="http://schemas.microsoft.com/office/drawing/2014/main" id="{E56CB79F-96BE-45C1-AD00-EDA15071539E}"/>
+              </a:ext>
+            </a:extLst>
+          </p:cNvPr>
+          <p:cNvSpPr>
+            <a:spLocks noGrp="1"/>
+          </p:cNvSpPr>
+          <p:nvPr>
+            <p:ph idx="1"/>
           </p:nvPr>
         </p:nvSpPr>
         <p:spPr>
           <a:xfrm>
-            <a:off x="838199" y="1825625"/>
-            <a:ext cx="7182395" cy="4346575"/>
+            <a:off x="838200" y="1440180"/>
+            <a:ext cx="10515600" cy="4736783"/>
           </a:xfrm>
         </p:spPr>
         <p:txBody>
           <a:bodyPr>
-            <a:normAutofit lnSpcReduction="10000"/>
+            <a:normAutofit fontScale="70000" lnSpcReduction="20000"/>
           </a:bodyPr>
           <a:lstStyle/>
           <a:p>
+            <a:pPr marL="514350" indent="-514350">
+              <a:buFont typeface="+mj-lt"/>
+              <a:buAutoNum type="arabicPeriod"/>
+            </a:pPr>
             <a:r>
               <a:rPr lang="hu-HU" b="1" dirty="0"/>
-              <a:t>HyperText Markup Language</a:t>
-            </a:r>
-          </a:p>
-          <a:p>
+              <a:t>Internetkapcsolat</a:t>
+            </a:r>
+            <a:r>
+              <a:rPr lang="hu-HU" dirty="0"/>
+              <a:t> ellenőrzése</a:t>
+            </a:r>
+          </a:p>
+          <a:p>
+            <a:pPr marL="514350" indent="-514350">
+              <a:buFont typeface="+mj-lt"/>
+              <a:buAutoNum type="arabicPeriod"/>
+            </a:pPr>
+            <a:r>
+              <a:rPr lang="hu-HU" dirty="0"/>
+              <a:t>XAMPP elindítása: </a:t>
+            </a:r>
+          </a:p>
+          <a:p>
+            <a:pPr lvl="1"/>
             <a:r>
               <a:rPr lang="hu-HU" b="1" dirty="0"/>
-              <a:t>Weboldalak</a:t>
-            </a:r>
-            <a:r>
-              <a:rPr lang="hu-HU" dirty="0"/>
-              <a:t> és webes alkalmazások készítésére használnak.</a:t>
-            </a:r>
-          </a:p>
-          <a:p>
+              <a:t>Apache, MySQL futtatása</a:t>
+            </a:r>
+          </a:p>
+          <a:p>
+            <a:pPr marL="514350" indent="-514350">
+              <a:buFont typeface="+mj-lt"/>
+              <a:buAutoNum type="arabicPeriod"/>
+            </a:pPr>
+            <a:r>
+              <a:rPr lang="hu-HU" dirty="0"/>
+              <a:t>Adatbázis </a:t>
+            </a:r>
             <a:r>
               <a:rPr lang="hu-HU" b="1" dirty="0"/>
-              <a:t>Tartalom megjelenítése</a:t>
-            </a:r>
-            <a:r>
-              <a:rPr lang="hu-HU" dirty="0"/>
-              <a:t>: szöveg, képek, videók, linkek</a:t>
-            </a:r>
-          </a:p>
-          <a:p>
+              <a:t>importálás</a:t>
+            </a:r>
+            <a:r>
+              <a:rPr lang="hu-HU" dirty="0"/>
+              <a:t>a</a:t>
+            </a:r>
+          </a:p>
+          <a:p>
+            <a:pPr marL="514350" indent="-514350">
+              <a:buFont typeface="+mj-lt"/>
+              <a:buAutoNum type="arabicPeriod"/>
+            </a:pPr>
+            <a:r>
+              <a:rPr lang="hu-HU" dirty="0"/>
+              <a:t>Projektmappa megnyitása (ajánlott: </a:t>
+            </a:r>
             <a:r>
               <a:rPr lang="hu-HU" b="1" dirty="0"/>
-              <a:t>Szerkezet kialakítása</a:t>
-            </a:r>
-            <a:r>
-              <a:rPr lang="hu-HU" dirty="0"/>
-              <a:t>: címek, bekezdések, listák, táblázatok</a:t>
-            </a:r>
-          </a:p>
-          <a:p>
+              <a:t>Visual Studio Code</a:t>
+            </a:r>
+            <a:r>
+              <a:rPr lang="hu-HU" dirty="0"/>
+              <a:t>-ban)</a:t>
+            </a:r>
+          </a:p>
+          <a:p>
+            <a:pPr marL="514350" indent="-514350">
+              <a:buFont typeface="+mj-lt"/>
+              <a:buAutoNum type="arabicPeriod"/>
+            </a:pPr>
             <a:r>
               <a:rPr lang="hu-HU" b="1" dirty="0"/>
-              <a:t>Linkelés</a:t>
-            </a:r>
-            <a:r>
-              <a:rPr lang="hu-HU" dirty="0"/>
-              <a:t>: oldalak összekapcsolása (hiperhivatkozások)</a:t>
-            </a:r>
-          </a:p>
-          <a:p>
+              <a:t>Terminál</a:t>
+            </a:r>
+            <a:r>
+              <a:rPr lang="hu-HU" dirty="0"/>
+              <a:t> megnyitása</a:t>
+            </a:r>
+          </a:p>
+          <a:p>
+            <a:pPr marL="971550" lvl="1" indent="-514350">
+              <a:buFont typeface="+mj-lt"/>
+              <a:buAutoNum type="arabicPeriod"/>
+            </a:pPr>
+            <a:r>
+              <a:rPr lang="hu-HU" dirty="0"/>
+              <a:t>Szükséges verziók a futtatáshoz:</a:t>
+            </a:r>
+          </a:p>
+          <a:p>
+            <a:pPr lvl="2"/>
             <a:r>
               <a:rPr lang="hu-HU" b="1" dirty="0"/>
-              <a:t>Űrlapok</a:t>
-            </a:r>
-            <a:r>
-              <a:rPr lang="hu-HU" dirty="0"/>
-              <a:t>: bejelentkezés, regisztráció, keresés</a:t>
-            </a:r>
-          </a:p>
-          <a:p>
+              <a:t>Node.js v18.20.5 </a:t>
+            </a:r>
+          </a:p>
+          <a:p>
+            <a:pPr lvl="2"/>
+            <a:r>
+              <a:rPr lang="hu-HU" b="1" dirty="0"/>
+              <a:t>Npm v10.8.2</a:t>
+            </a:r>
+          </a:p>
+          <a:p>
+            <a:pPr marL="971550" lvl="1" indent="-514350">
+              <a:buFont typeface="+mj-lt"/>
+              <a:buAutoNum type="arabicPeriod"/>
+            </a:pPr>
+            <a:r>
+              <a:rPr lang="hu-HU" b="1" dirty="0"/>
+              <a:t>.env</a:t>
+            </a:r>
+            <a:r>
+              <a:rPr lang="hu-HU" dirty="0"/>
+              <a:t> fájl létrehozása a mappán belül:</a:t>
+            </a:r>
+          </a:p>
+          <a:p>
+            <a:pPr marL="1428750" lvl="2" indent="-514350">
+              <a:buFont typeface="+mj-lt"/>
+              <a:buAutoNum type="arabicPeriod"/>
+            </a:pPr>
+            <a:r>
+              <a:rPr lang="hu-HU" dirty="0"/>
+              <a:t>.env.example fájl tartalmának átmásolása</a:t>
+            </a:r>
+          </a:p>
+          <a:p>
+            <a:pPr marL="1428750" lvl="2" indent="-514350">
+              <a:buFont typeface="+mj-lt"/>
+              <a:buAutoNum type="arabicPeriod"/>
+            </a:pPr>
+            <a:r>
+              <a:rPr lang="hu-HU" dirty="0"/>
+              <a:t>Szükséges adatok megadása:</a:t>
+            </a:r>
+          </a:p>
+          <a:p>
+            <a:pPr lvl="3"/>
+            <a:r>
+              <a:rPr lang="hu-HU" dirty="0"/>
+              <a:t>DB_NAME=</a:t>
+            </a:r>
+            <a:r>
+              <a:rPr lang="hu-HU" b="1" dirty="0"/>
+              <a:t>parking</a:t>
+            </a:r>
+            <a:r>
+              <a:rPr lang="hu-HU" dirty="0"/>
+              <a:t>, DB_USER=</a:t>
+            </a:r>
+            <a:r>
+              <a:rPr lang="hu-HU" b="1" dirty="0"/>
+              <a:t>root</a:t>
+            </a:r>
+            <a:r>
+              <a:rPr lang="hu-HU" dirty="0"/>
+              <a:t>, DB_PASSWORD=</a:t>
+            </a:r>
+            <a:r>
+              <a:rPr lang="hu-HU" b="1" dirty="0"/>
+              <a:t>””</a:t>
+            </a:r>
+            <a:r>
+              <a:rPr lang="hu-HU" dirty="0"/>
+              <a:t>, DB_HOST=</a:t>
+            </a:r>
+            <a:r>
+              <a:rPr lang="hu-HU" b="1" dirty="0"/>
+              <a:t>localhost</a:t>
+            </a:r>
+            <a:r>
+              <a:rPr lang="hu-HU" dirty="0"/>
+              <a:t>, DB_DIALECT=</a:t>
+            </a:r>
+            <a:r>
+              <a:rPr lang="hu-HU" b="1" dirty="0"/>
+              <a:t>mysql</a:t>
+            </a:r>
+          </a:p>
+          <a:p>
+            <a:pPr marL="971550" lvl="1" indent="-514350">
+              <a:buFont typeface="+mj-lt"/>
+              <a:buAutoNum type="arabicPeriod"/>
+            </a:pPr>
+            <a:r>
+              <a:rPr lang="hu-HU" dirty="0"/>
+              <a:t>Parancsok megadása:</a:t>
+            </a:r>
+          </a:p>
+          <a:p>
+            <a:pPr lvl="1"/>
+            <a:r>
+              <a:rPr lang="hu-HU" dirty="0"/>
+              <a:t>Fontos, hogy a parancsokat a </a:t>
+            </a:r>
+            <a:r>
+              <a:rPr lang="hu-HU" b="1" dirty="0"/>
+              <a:t>ParKing/main </a:t>
+            </a:r>
+            <a:r>
+              <a:rPr lang="hu-HU" dirty="0"/>
+              <a:t>mappán belül kell megadni!</a:t>
+            </a:r>
+          </a:p>
+          <a:p>
+            <a:pPr lvl="2"/>
+            <a:r>
+              <a:rPr lang="hu-HU" b="1" dirty="0"/>
+              <a:t>npm update</a:t>
+            </a:r>
+          </a:p>
+          <a:p>
+            <a:pPr lvl="2"/>
+            <a:r>
+              <a:rPr lang="hu-HU" b="1" dirty="0"/>
+              <a:t>npm run setup</a:t>
+            </a:r>
+          </a:p>
+          <a:p>
+            <a:pPr lvl="2"/>
+            <a:r>
+              <a:rPr lang="hu-HU" b="1" dirty="0"/>
+              <a:t>node server.js</a:t>
+            </a:r>
+          </a:p>
+          <a:p>
+            <a:pPr marL="971550" lvl="1" indent="-514350">
+              <a:buFont typeface="+mj-lt"/>
+              <a:buAutoNum type="arabicPeriod"/>
+            </a:pPr>
             <a:endParaRPr lang="hu-HU" dirty="0"/>
           </a:p>
-          <a:p>
-            <a:endParaRPr lang="hu-HU" dirty="0"/>
-          </a:p>
-          <a:p>
-            <a:endParaRPr lang="hu-HU" dirty="0"/>
-          </a:p>
-        </p:txBody>
-      </p:sp>
-      <p:pic>
-        <p:nvPicPr>
-          <p:cNvPr id="1026" name="Picture 2" descr="HTML5 - Wikipedia">
-            <a:extLst>
-              <a:ext uri="{FF2B5EF4-FFF2-40B4-BE49-F238E27FC236}">
-                <a16:creationId xmlns:a16="http://schemas.microsoft.com/office/drawing/2014/main" id="{D66D0830-2FEF-41EB-8F66-886D742D73A5}"/>
-              </a:ext>
-            </a:extLst>
-          </p:cNvPr>
-          <p:cNvPicPr>
-            <a:picLocks noGrp="1" noChangeAspect="1" noChangeArrowheads="1"/>
-          </p:cNvPicPr>
-          <p:nvPr>
-            <p:ph sz="half" idx="2"/>
-          </p:nvPr>
-        </p:nvPicPr>
-        <p:blipFill>
-          <a:blip r:embed="rId2">
-            <a:extLst>
-              <a:ext uri="{28A0092B-C50C-407E-A947-70E740481C1C}">
-                <a14:useLocalDpi xmlns:a14="http://schemas.microsoft.com/office/drawing/2010/main" val="0"/>
-              </a:ext>
-            </a:extLst>
-          </a:blip>
-          <a:srcRect/>
-          <a:stretch>
-            <a:fillRect/>
-          </a:stretch>
-        </p:blipFill>
-        <p:spPr bwMode="auto">
-          <a:xfrm>
-            <a:off x="8094889" y="2697458"/>
-            <a:ext cx="2381250" cy="2381250"/>
-          </a:xfrm>
-          <a:prstGeom prst="rect">
-            <a:avLst/>
-          </a:prstGeom>
-          <a:noFill/>
-          <a:extLst>
-            <a:ext uri="{909E8E84-426E-40DD-AFC4-6F175D3DCCD1}">
-              <a14:hiddenFill xmlns:a14="http://schemas.microsoft.com/office/drawing/2010/main">
-                <a:solidFill>
-                  <a:srgbClr val="FFFFFF"/>
-                </a:solidFill>
-              </a14:hiddenFill>
-            </a:ext>
-          </a:extLst>
-        </p:spPr>
-      </p:pic>
+        </p:txBody>
+      </p:sp>
     </p:spTree>
     <p:extLst>
       <p:ext uri="{BB962C8B-B14F-4D97-AF65-F5344CB8AC3E}">
-        <p14:creationId xmlns:p14="http://schemas.microsoft.com/office/powerpoint/2010/main" val="281084775"/>
+        <p14:creationId xmlns:p14="http://schemas.microsoft.com/office/powerpoint/2010/main" val="4221804046"/>
       </p:ext>
     </p:extLst>
   </p:cSld>
@@ -8096,7 +6112,7 @@
           <p:cNvPr id="2" name="Cím 1">
             <a:extLst>
               <a:ext uri="{FF2B5EF4-FFF2-40B4-BE49-F238E27FC236}">
-                <a16:creationId xmlns:a16="http://schemas.microsoft.com/office/drawing/2014/main" id="{5C3DEFC1-5713-4667-AA91-D5948EC16CC7}"/>
+                <a16:creationId xmlns:a16="http://schemas.microsoft.com/office/drawing/2014/main" id="{2D5701B9-334C-48B2-8DCB-F146D1579426}"/>
               </a:ext>
             </a:extLst>
           </p:cNvPr>
@@ -8115,353 +6131,104 @@
             <a:pPr algn="ctr"/>
             <a:r>
               <a:rPr lang="hu-HU" b="1" dirty="0"/>
-              <a:t>CSS</a:t>
-            </a:r>
-          </a:p>
-        </p:txBody>
-      </p:sp>
-      <p:sp>
-        <p:nvSpPr>
-          <p:cNvPr id="3" name="Tartalom helye 2">
-            <a:extLst>
-              <a:ext uri="{FF2B5EF4-FFF2-40B4-BE49-F238E27FC236}">
-                <a16:creationId xmlns:a16="http://schemas.microsoft.com/office/drawing/2014/main" id="{6E007366-14AD-4673-8BB0-5AF3CC280237}"/>
-              </a:ext>
-            </a:extLst>
-          </p:cNvPr>
-          <p:cNvSpPr>
-            <a:spLocks noGrp="1"/>
-          </p:cNvSpPr>
-          <p:nvPr>
-            <p:ph sz="half" idx="1"/>
-          </p:nvPr>
-        </p:nvSpPr>
-        <p:spPr>
-          <a:xfrm>
-            <a:off x="838199" y="1825625"/>
-            <a:ext cx="5980611" cy="3358310"/>
-          </a:xfrm>
-        </p:spPr>
-        <p:txBody>
-          <a:bodyPr/>
-          <a:lstStyle/>
-          <a:p>
-            <a:r>
-              <a:rPr lang="hu-HU" b="1" dirty="0"/>
-              <a:t>Cascading Style Sheets</a:t>
-            </a:r>
-          </a:p>
-          <a:p>
-            <a:r>
-              <a:rPr lang="hu-HU" b="1" dirty="0"/>
-              <a:t>Kinézet formázása </a:t>
-            </a:r>
-            <a:r>
-              <a:rPr lang="hu-HU" dirty="0"/>
-              <a:t>(szövegszín, betűtípus, betűméret, háttérszín…)</a:t>
-            </a:r>
-          </a:p>
-          <a:p>
-            <a:r>
-              <a:rPr lang="hu-HU" b="1" dirty="0"/>
-              <a:t>Elrendezés</a:t>
-            </a:r>
-            <a:r>
-              <a:rPr lang="hu-HU" dirty="0"/>
-              <a:t> (középre igazítás, elemek egymás mellett/alatt, oszlopok…)</a:t>
-            </a:r>
-          </a:p>
-          <a:p>
-            <a:r>
-              <a:rPr lang="hu-HU" b="1" dirty="0"/>
-              <a:t>Reszponzív</a:t>
-            </a:r>
-            <a:r>
-              <a:rPr lang="hu-HU" dirty="0"/>
-              <a:t> dizájn</a:t>
-            </a:r>
-          </a:p>
-          <a:p>
-            <a:r>
-              <a:rPr lang="hu-HU" b="1" dirty="0"/>
-              <a:t>Átláthatóbb</a:t>
-            </a:r>
-            <a:r>
-              <a:rPr lang="hu-HU" dirty="0"/>
-              <a:t> weboldal</a:t>
+              <a:t>A weboldal bemutatása</a:t>
             </a:r>
           </a:p>
         </p:txBody>
       </p:sp>
       <p:pic>
         <p:nvPicPr>
-          <p:cNvPr id="2050" name="Picture 2">
-            <a:extLst>
-              <a:ext uri="{FF2B5EF4-FFF2-40B4-BE49-F238E27FC236}">
-                <a16:creationId xmlns:a16="http://schemas.microsoft.com/office/drawing/2014/main" id="{36E4622C-1D4B-4C5A-A663-6F8CDFE03700}"/>
+          <p:cNvPr id="5" name="Tartalom helye 4">
+            <a:extLst>
+              <a:ext uri="{FF2B5EF4-FFF2-40B4-BE49-F238E27FC236}">
+                <a16:creationId xmlns:a16="http://schemas.microsoft.com/office/drawing/2014/main" id="{5E975318-F171-47CA-BD46-FFB26D2FD5E0}"/>
               </a:ext>
             </a:extLst>
           </p:cNvPr>
           <p:cNvPicPr>
-            <a:picLocks noGrp="1" noChangeAspect="1" noChangeArrowheads="1"/>
+            <a:picLocks noGrp="1" noChangeAspect="1"/>
           </p:cNvPicPr>
           <p:nvPr>
-            <p:ph sz="half" idx="2"/>
+            <p:ph idx="1"/>
           </p:nvPr>
         </p:nvPicPr>
         <p:blipFill>
-          <a:blip r:embed="rId2">
-            <a:extLst>
-              <a:ext uri="{28A0092B-C50C-407E-A947-70E740481C1C}">
-                <a14:useLocalDpi xmlns:a14="http://schemas.microsoft.com/office/drawing/2010/main" val="0"/>
-              </a:ext>
-            </a:extLst>
-          </a:blip>
-          <a:srcRect/>
+          <a:blip r:embed="rId2"/>
           <a:stretch>
             <a:fillRect/>
           </a:stretch>
         </p:blipFill>
-        <p:spPr bwMode="auto">
+        <p:spPr>
           <a:xfrm>
-            <a:off x="8458074" y="2110128"/>
-            <a:ext cx="2176146" cy="3073807"/>
+            <a:off x="968619" y="1514842"/>
+            <a:ext cx="5676901" cy="3193257"/>
+          </a:xfrm>
+        </p:spPr>
+      </p:pic>
+      <p:pic>
+        <p:nvPicPr>
+          <p:cNvPr id="7" name="Kép 6">
+            <a:extLst>
+              <a:ext uri="{FF2B5EF4-FFF2-40B4-BE49-F238E27FC236}">
+                <a16:creationId xmlns:a16="http://schemas.microsoft.com/office/drawing/2014/main" id="{74FBFF79-483C-48DF-AD92-FEB22EA5B2D7}"/>
+              </a:ext>
+            </a:extLst>
+          </p:cNvPr>
+          <p:cNvPicPr>
+            <a:picLocks noChangeAspect="1"/>
+          </p:cNvPicPr>
+          <p:nvPr/>
+        </p:nvPicPr>
+        <p:blipFill>
+          <a:blip r:embed="rId3"/>
+          <a:stretch>
+            <a:fillRect/>
+          </a:stretch>
+        </p:blipFill>
+        <p:spPr>
+          <a:xfrm>
+            <a:off x="3042136" y="2449940"/>
+            <a:ext cx="5676902" cy="3193258"/>
           </a:xfrm>
           <a:prstGeom prst="rect">
             <a:avLst/>
           </a:prstGeom>
-          <a:noFill/>
-          <a:extLst>
-            <a:ext uri="{909E8E84-426E-40DD-AFC4-6F175D3DCCD1}">
-              <a14:hiddenFill xmlns:a14="http://schemas.microsoft.com/office/drawing/2010/main">
-                <a:solidFill>
-                  <a:srgbClr val="FFFFFF"/>
-                </a:solidFill>
-              </a14:hiddenFill>
-            </a:ext>
-          </a:extLst>
+        </p:spPr>
+      </p:pic>
+      <p:pic>
+        <p:nvPicPr>
+          <p:cNvPr id="9" name="Kép 8">
+            <a:extLst>
+              <a:ext uri="{FF2B5EF4-FFF2-40B4-BE49-F238E27FC236}">
+                <a16:creationId xmlns:a16="http://schemas.microsoft.com/office/drawing/2014/main" id="{18D477BE-AD14-40F3-A5BE-E4EF28291297}"/>
+              </a:ext>
+            </a:extLst>
+          </p:cNvPr>
+          <p:cNvPicPr>
+            <a:picLocks noChangeAspect="1"/>
+          </p:cNvPicPr>
+          <p:nvPr/>
+        </p:nvPicPr>
+        <p:blipFill>
+          <a:blip r:embed="rId4"/>
+          <a:stretch>
+            <a:fillRect/>
+          </a:stretch>
+        </p:blipFill>
+        <p:spPr>
+          <a:xfrm>
+            <a:off x="5546479" y="3299617"/>
+            <a:ext cx="5676902" cy="3193258"/>
+          </a:xfrm>
+          <a:prstGeom prst="rect">
+            <a:avLst/>
+          </a:prstGeom>
         </p:spPr>
       </p:pic>
     </p:spTree>
     <p:extLst>
       <p:ext uri="{BB962C8B-B14F-4D97-AF65-F5344CB8AC3E}">
-        <p14:creationId xmlns:p14="http://schemas.microsoft.com/office/powerpoint/2010/main" val="3564087514"/>
-      </p:ext>
-    </p:extLst>
-  </p:cSld>
-  <p:clrMapOvr>
-    <a:masterClrMapping/>
-  </p:clrMapOvr>
-</p:sld>
-</file>
-
-<file path=ppt/slides/slide9.xml><?xml version="1.0" encoding="utf-8"?>
-<p:sld xmlns:a="http://schemas.openxmlformats.org/drawingml/2006/main" xmlns:r="http://schemas.openxmlformats.org/officeDocument/2006/relationships" xmlns:p="http://schemas.openxmlformats.org/presentationml/2006/main">
-  <p:cSld>
-    <p:spTree>
-      <p:nvGrpSpPr>
-        <p:cNvPr id="1" name=""/>
-        <p:cNvGrpSpPr/>
-        <p:nvPr/>
-      </p:nvGrpSpPr>
-      <p:grpSpPr>
-        <a:xfrm>
-          <a:off x="0" y="0"/>
-          <a:ext cx="0" cy="0"/>
-          <a:chOff x="0" y="0"/>
-          <a:chExt cx="0" cy="0"/>
-        </a:xfrm>
-      </p:grpSpPr>
-      <p:sp>
-        <p:nvSpPr>
-          <p:cNvPr id="2" name="Cím 1">
-            <a:extLst>
-              <a:ext uri="{FF2B5EF4-FFF2-40B4-BE49-F238E27FC236}">
-                <a16:creationId xmlns:a16="http://schemas.microsoft.com/office/drawing/2014/main" id="{8A486FBC-1CDA-42DC-80F4-CE7D64C6E46F}"/>
-              </a:ext>
-            </a:extLst>
-          </p:cNvPr>
-          <p:cNvSpPr>
-            <a:spLocks noGrp="1"/>
-          </p:cNvSpPr>
-          <p:nvPr>
-            <p:ph type="title"/>
-          </p:nvPr>
-        </p:nvSpPr>
-        <p:spPr/>
-        <p:txBody>
-          <a:bodyPr/>
-          <a:lstStyle/>
-          <a:p>
-            <a:pPr algn="ctr"/>
-            <a:r>
-              <a:rPr lang="hu-HU" b="1" dirty="0"/>
-              <a:t>JavaScript</a:t>
-            </a:r>
-          </a:p>
-        </p:txBody>
-      </p:sp>
-      <p:sp>
-        <p:nvSpPr>
-          <p:cNvPr id="3" name="Tartalom helye 2">
-            <a:extLst>
-              <a:ext uri="{FF2B5EF4-FFF2-40B4-BE49-F238E27FC236}">
-                <a16:creationId xmlns:a16="http://schemas.microsoft.com/office/drawing/2014/main" id="{D5280050-7E42-44A8-B8D3-E53262A2C112}"/>
-              </a:ext>
-            </a:extLst>
-          </p:cNvPr>
-          <p:cNvSpPr>
-            <a:spLocks noGrp="1"/>
-          </p:cNvSpPr>
-          <p:nvPr>
-            <p:ph sz="half" idx="1"/>
-          </p:nvPr>
-        </p:nvSpPr>
-        <p:spPr>
-          <a:xfrm>
-            <a:off x="838199" y="1825625"/>
-            <a:ext cx="7313023" cy="4351338"/>
-          </a:xfrm>
-        </p:spPr>
-        <p:txBody>
-          <a:bodyPr>
-            <a:normAutofit lnSpcReduction="10000"/>
-          </a:bodyPr>
-          <a:lstStyle/>
-          <a:p>
-            <a:r>
-              <a:rPr lang="hu-HU" b="1" dirty="0"/>
-              <a:t>Sokoldalú</a:t>
-            </a:r>
-            <a:r>
-              <a:rPr lang="hu-HU" dirty="0"/>
-              <a:t> programozási nyelv</a:t>
-            </a:r>
-          </a:p>
-          <a:p>
-            <a:r>
-              <a:rPr lang="hu-HU" b="1" dirty="0"/>
-              <a:t>Interaktív, dinamikus </a:t>
-            </a:r>
-            <a:r>
-              <a:rPr lang="hu-HU" dirty="0"/>
-              <a:t>és </a:t>
-            </a:r>
-            <a:r>
-              <a:rPr lang="hu-HU" b="1" dirty="0"/>
-              <a:t>modern</a:t>
-            </a:r>
-            <a:r>
-              <a:rPr lang="hu-HU" dirty="0"/>
-              <a:t> alkalmazások készítésére használják</a:t>
-            </a:r>
-          </a:p>
-          <a:p>
-            <a:r>
-              <a:rPr lang="hu-HU" b="1" dirty="0"/>
-              <a:t>Komplex alkalmazások </a:t>
-            </a:r>
-            <a:r>
-              <a:rPr lang="hu-HU" dirty="0"/>
-              <a:t>fejlesztése (Facebook, YouTube, Gmail)</a:t>
-            </a:r>
-          </a:p>
-          <a:p>
-            <a:r>
-              <a:rPr lang="hu-HU" b="1" dirty="0"/>
-              <a:t>Szerveroldali</a:t>
-            </a:r>
-            <a:r>
-              <a:rPr lang="hu-HU" dirty="0"/>
-              <a:t> fejlesztés Node.js segítségével (backend, API, Adatbázis)</a:t>
-            </a:r>
-          </a:p>
-          <a:p>
-            <a:r>
-              <a:rPr lang="hu-HU" b="1" dirty="0"/>
-              <a:t>Mobilalkalmazások</a:t>
-            </a:r>
-            <a:r>
-              <a:rPr lang="hu-HU" dirty="0"/>
-              <a:t> (Android, iOs appok)</a:t>
-            </a:r>
-          </a:p>
-          <a:p>
-            <a:r>
-              <a:rPr lang="hu-HU" b="1" dirty="0"/>
-              <a:t>Asztali alkalmazások</a:t>
-            </a:r>
-          </a:p>
-          <a:p>
-            <a:r>
-              <a:rPr lang="hu-HU" dirty="0"/>
-              <a:t>Minden modern böngésző támogatja</a:t>
-            </a:r>
-          </a:p>
-          <a:p>
-            <a:endParaRPr lang="hu-HU" dirty="0"/>
-          </a:p>
-          <a:p>
-            <a:endParaRPr lang="hu-HU" dirty="0"/>
-          </a:p>
-          <a:p>
-            <a:endParaRPr lang="hu-HU" dirty="0"/>
-          </a:p>
-        </p:txBody>
-      </p:sp>
-      <p:pic>
-        <p:nvPicPr>
-          <p:cNvPr id="3074" name="Picture 2" descr="Live Instructor-Led JavaScript Training - Hands-on Interactive Course">
-            <a:extLst>
-              <a:ext uri="{FF2B5EF4-FFF2-40B4-BE49-F238E27FC236}">
-                <a16:creationId xmlns:a16="http://schemas.microsoft.com/office/drawing/2014/main" id="{676174F6-53DA-4FA2-815C-0A332A532B10}"/>
-              </a:ext>
-            </a:extLst>
-          </p:cNvPr>
-          <p:cNvPicPr>
-            <a:picLocks noGrp="1" noChangeAspect="1" noChangeArrowheads="1"/>
-          </p:cNvPicPr>
-          <p:nvPr>
-            <p:ph sz="half" idx="2"/>
-          </p:nvPr>
-        </p:nvPicPr>
-        <p:blipFill>
-          <a:blip r:embed="rId2">
-            <a:extLst>
-              <a:ext uri="{28A0092B-C50C-407E-A947-70E740481C1C}">
-                <a14:useLocalDpi xmlns:a14="http://schemas.microsoft.com/office/drawing/2010/main" val="0"/>
-              </a:ext>
-            </a:extLst>
-          </a:blip>
-          <a:srcRect/>
-          <a:stretch>
-            <a:fillRect/>
-          </a:stretch>
-        </p:blipFill>
-        <p:spPr bwMode="auto">
-          <a:xfrm>
-            <a:off x="8247016" y="2565853"/>
-            <a:ext cx="2594321" cy="2924108"/>
-          </a:xfrm>
-          <a:prstGeom prst="rect">
-            <a:avLst/>
-          </a:prstGeom>
-          <a:noFill/>
-          <a:extLst>
-            <a:ext uri="{909E8E84-426E-40DD-AFC4-6F175D3DCCD1}">
-              <a14:hiddenFill xmlns:a14="http://schemas.microsoft.com/office/drawing/2010/main">
-                <a:solidFill>
-                  <a:srgbClr val="FFFFFF"/>
-                </a:solidFill>
-              </a14:hiddenFill>
-            </a:ext>
-          </a:extLst>
-        </p:spPr>
-      </p:pic>
-    </p:spTree>
-    <p:extLst>
-      <p:ext uri="{BB962C8B-B14F-4D97-AF65-F5344CB8AC3E}">
-        <p14:creationId xmlns:p14="http://schemas.microsoft.com/office/powerpoint/2010/main" val="50528300"/>
+        <p14:creationId xmlns:p14="http://schemas.microsoft.com/office/powerpoint/2010/main" val="4264932517"/>
       </p:ext>
     </p:extLst>
   </p:cSld>

</xml_diff>